<commit_message>
started work on powerpoint
</commit_message>
<xml_diff>
--- a/Presentation.pptx
+++ b/Presentation.pptx
@@ -4,12 +4,14 @@
   <p:sldMasterIdLst>
     <p:sldMasterId id="2147483804" r:id="rId1"/>
   </p:sldMasterIdLst>
+  <p:notesMasterIdLst>
+    <p:notesMasterId r:id="rId6"/>
+  </p:notesMasterIdLst>
   <p:sldIdLst>
     <p:sldId id="256" r:id="rId2"/>
-    <p:sldId id="258" r:id="rId3"/>
+    <p:sldId id="260" r:id="rId3"/>
     <p:sldId id="259" r:id="rId4"/>
-    <p:sldId id="257" r:id="rId5"/>
-    <p:sldId id="260" r:id="rId6"/>
+    <p:sldId id="258" r:id="rId5"/>
   </p:sldIdLst>
   <p:sldSz cx="12192000" cy="6858000"/>
   <p:notesSz cx="6858000" cy="9144000"/>
@@ -108,7 +110,362 @@
       </a:defRPr>
     </a:lvl9pPr>
   </p:defaultTextStyle>
+  <p:extLst>
+    <p:ext uri="{EFAFB233-063F-42B5-8137-9DF3F51BA10A}">
+      <p15:sldGuideLst xmlns:p15="http://schemas.microsoft.com/office/powerpoint/2012/main"/>
+    </p:ext>
+  </p:extLst>
 </p:presentation>
+</file>
+
+<file path=ppt/notesMasters/notesMaster1.xml><?xml version="1.0" encoding="utf-8"?>
+<p:notesMaster xmlns:a="http://schemas.openxmlformats.org/drawingml/2006/main" xmlns:r="http://schemas.openxmlformats.org/officeDocument/2006/relationships" xmlns:p="http://schemas.openxmlformats.org/presentationml/2006/main">
+  <p:cSld>
+    <p:bg>
+      <p:bgRef idx="1001">
+        <a:schemeClr val="bg1"/>
+      </p:bgRef>
+    </p:bg>
+    <p:spTree>
+      <p:nvGrpSpPr>
+        <p:cNvPr id="1" name=""/>
+        <p:cNvGrpSpPr/>
+        <p:nvPr/>
+      </p:nvGrpSpPr>
+      <p:grpSpPr>
+        <a:xfrm>
+          <a:off x="0" y="0"/>
+          <a:ext cx="0" cy="0"/>
+          <a:chOff x="0" y="0"/>
+          <a:chExt cx="0" cy="0"/>
+        </a:xfrm>
+      </p:grpSpPr>
+      <p:sp>
+        <p:nvSpPr>
+          <p:cNvPr id="2" name="Header Placeholder 1"/>
+          <p:cNvSpPr>
+            <a:spLocks noGrp="1"/>
+          </p:cNvSpPr>
+          <p:nvPr>
+            <p:ph type="hdr" sz="quarter"/>
+          </p:nvPr>
+        </p:nvSpPr>
+        <p:spPr>
+          <a:xfrm>
+            <a:off x="0" y="0"/>
+            <a:ext cx="2971800" cy="458788"/>
+          </a:xfrm>
+          <a:prstGeom prst="rect">
+            <a:avLst/>
+          </a:prstGeom>
+        </p:spPr>
+        <p:txBody>
+          <a:bodyPr vert="horz" lIns="91440" tIns="45720" rIns="91440" bIns="45720" rtlCol="0"/>
+          <a:lstStyle>
+            <a:lvl1pPr algn="l">
+              <a:defRPr sz="1200"/>
+            </a:lvl1pPr>
+          </a:lstStyle>
+          <a:p>
+            <a:endParaRPr lang="en-AU"/>
+          </a:p>
+        </p:txBody>
+      </p:sp>
+      <p:sp>
+        <p:nvSpPr>
+          <p:cNvPr id="3" name="Date Placeholder 2"/>
+          <p:cNvSpPr>
+            <a:spLocks noGrp="1"/>
+          </p:cNvSpPr>
+          <p:nvPr>
+            <p:ph type="dt" idx="1"/>
+          </p:nvPr>
+        </p:nvSpPr>
+        <p:spPr>
+          <a:xfrm>
+            <a:off x="3884613" y="0"/>
+            <a:ext cx="2971800" cy="458788"/>
+          </a:xfrm>
+          <a:prstGeom prst="rect">
+            <a:avLst/>
+          </a:prstGeom>
+        </p:spPr>
+        <p:txBody>
+          <a:bodyPr vert="horz" lIns="91440" tIns="45720" rIns="91440" bIns="45720" rtlCol="0"/>
+          <a:lstStyle>
+            <a:lvl1pPr algn="r">
+              <a:defRPr sz="1200"/>
+            </a:lvl1pPr>
+          </a:lstStyle>
+          <a:p>
+            <a:fld id="{52C5C6AE-D154-4E11-B603-A07971901444}" type="datetimeFigureOut">
+              <a:rPr lang="en-AU" smtClean="0"/>
+              <a:t>14/04/2024</a:t>
+            </a:fld>
+            <a:endParaRPr lang="en-AU"/>
+          </a:p>
+        </p:txBody>
+      </p:sp>
+      <p:sp>
+        <p:nvSpPr>
+          <p:cNvPr id="4" name="Slide Image Placeholder 3"/>
+          <p:cNvSpPr>
+            <a:spLocks noGrp="1" noRot="1" noChangeAspect="1"/>
+          </p:cNvSpPr>
+          <p:nvPr>
+            <p:ph type="sldImg" idx="2"/>
+          </p:nvPr>
+        </p:nvSpPr>
+        <p:spPr>
+          <a:xfrm>
+            <a:off x="685800" y="1143000"/>
+            <a:ext cx="5486400" cy="3086100"/>
+          </a:xfrm>
+          <a:prstGeom prst="rect">
+            <a:avLst/>
+          </a:prstGeom>
+          <a:noFill/>
+          <a:ln w="12700">
+            <a:solidFill>
+              <a:prstClr val="black"/>
+            </a:solidFill>
+          </a:ln>
+        </p:spPr>
+        <p:txBody>
+          <a:bodyPr vert="horz" lIns="91440" tIns="45720" rIns="91440" bIns="45720" rtlCol="0" anchor="ctr"/>
+          <a:lstStyle/>
+          <a:p>
+            <a:endParaRPr lang="en-AU"/>
+          </a:p>
+        </p:txBody>
+      </p:sp>
+      <p:sp>
+        <p:nvSpPr>
+          <p:cNvPr id="5" name="Notes Placeholder 4"/>
+          <p:cNvSpPr>
+            <a:spLocks noGrp="1"/>
+          </p:cNvSpPr>
+          <p:nvPr>
+            <p:ph type="body" sz="quarter" idx="3"/>
+          </p:nvPr>
+        </p:nvSpPr>
+        <p:spPr>
+          <a:xfrm>
+            <a:off x="685800" y="4400550"/>
+            <a:ext cx="5486400" cy="3600450"/>
+          </a:xfrm>
+          <a:prstGeom prst="rect">
+            <a:avLst/>
+          </a:prstGeom>
+        </p:spPr>
+        <p:txBody>
+          <a:bodyPr vert="horz" lIns="91440" tIns="45720" rIns="91440" bIns="45720" rtlCol="0"/>
+          <a:lstStyle/>
+          <a:p>
+            <a:pPr lvl="0"/>
+            <a:r>
+              <a:rPr lang="en-US"/>
+              <a:t>Click to edit Master text styles</a:t>
+            </a:r>
+          </a:p>
+          <a:p>
+            <a:pPr lvl="1"/>
+            <a:r>
+              <a:rPr lang="en-US"/>
+              <a:t>Second level</a:t>
+            </a:r>
+          </a:p>
+          <a:p>
+            <a:pPr lvl="2"/>
+            <a:r>
+              <a:rPr lang="en-US"/>
+              <a:t>Third level</a:t>
+            </a:r>
+          </a:p>
+          <a:p>
+            <a:pPr lvl="3"/>
+            <a:r>
+              <a:rPr lang="en-US"/>
+              <a:t>Fourth level</a:t>
+            </a:r>
+          </a:p>
+          <a:p>
+            <a:pPr lvl="4"/>
+            <a:r>
+              <a:rPr lang="en-US"/>
+              <a:t>Fifth level</a:t>
+            </a:r>
+            <a:endParaRPr lang="en-AU"/>
+          </a:p>
+        </p:txBody>
+      </p:sp>
+      <p:sp>
+        <p:nvSpPr>
+          <p:cNvPr id="6" name="Footer Placeholder 5"/>
+          <p:cNvSpPr>
+            <a:spLocks noGrp="1"/>
+          </p:cNvSpPr>
+          <p:nvPr>
+            <p:ph type="ftr" sz="quarter" idx="4"/>
+          </p:nvPr>
+        </p:nvSpPr>
+        <p:spPr>
+          <a:xfrm>
+            <a:off x="0" y="8685213"/>
+            <a:ext cx="2971800" cy="458787"/>
+          </a:xfrm>
+          <a:prstGeom prst="rect">
+            <a:avLst/>
+          </a:prstGeom>
+        </p:spPr>
+        <p:txBody>
+          <a:bodyPr vert="horz" lIns="91440" tIns="45720" rIns="91440" bIns="45720" rtlCol="0" anchor="b"/>
+          <a:lstStyle>
+            <a:lvl1pPr algn="l">
+              <a:defRPr sz="1200"/>
+            </a:lvl1pPr>
+          </a:lstStyle>
+          <a:p>
+            <a:endParaRPr lang="en-AU"/>
+          </a:p>
+        </p:txBody>
+      </p:sp>
+      <p:sp>
+        <p:nvSpPr>
+          <p:cNvPr id="7" name="Slide Number Placeholder 6"/>
+          <p:cNvSpPr>
+            <a:spLocks noGrp="1"/>
+          </p:cNvSpPr>
+          <p:nvPr>
+            <p:ph type="sldNum" sz="quarter" idx="5"/>
+          </p:nvPr>
+        </p:nvSpPr>
+        <p:spPr>
+          <a:xfrm>
+            <a:off x="3884613" y="8685213"/>
+            <a:ext cx="2971800" cy="458787"/>
+          </a:xfrm>
+          <a:prstGeom prst="rect">
+            <a:avLst/>
+          </a:prstGeom>
+        </p:spPr>
+        <p:txBody>
+          <a:bodyPr vert="horz" lIns="91440" tIns="45720" rIns="91440" bIns="45720" rtlCol="0" anchor="b"/>
+          <a:lstStyle>
+            <a:lvl1pPr algn="r">
+              <a:defRPr sz="1200"/>
+            </a:lvl1pPr>
+          </a:lstStyle>
+          <a:p>
+            <a:fld id="{010CE597-78A0-4769-A8FA-42EAD8C3E8D3}" type="slidenum">
+              <a:rPr lang="en-AU" smtClean="0"/>
+              <a:t>‹#›</a:t>
+            </a:fld>
+            <a:endParaRPr lang="en-AU"/>
+          </a:p>
+        </p:txBody>
+      </p:sp>
+    </p:spTree>
+    <p:extLst>
+      <p:ext uri="{BB962C8B-B14F-4D97-AF65-F5344CB8AC3E}">
+        <p14:creationId xmlns:p14="http://schemas.microsoft.com/office/powerpoint/2010/main" val="2380740024"/>
+      </p:ext>
+    </p:extLst>
+  </p:cSld>
+  <p:clrMap bg1="lt1" tx1="dk1" bg2="lt2" tx2="dk2" accent1="accent1" accent2="accent2" accent3="accent3" accent4="accent4" accent5="accent5" accent6="accent6" hlink="hlink" folHlink="folHlink"/>
+  <p:notesStyle>
+    <a:lvl1pPr marL="0" algn="l" defTabSz="914400" rtl="0" eaLnBrk="1" latinLnBrk="0" hangingPunct="1">
+      <a:defRPr sz="1200" kern="1200">
+        <a:solidFill>
+          <a:schemeClr val="tx1"/>
+        </a:solidFill>
+        <a:latin typeface="+mn-lt"/>
+        <a:ea typeface="+mn-ea"/>
+        <a:cs typeface="+mn-cs"/>
+      </a:defRPr>
+    </a:lvl1pPr>
+    <a:lvl2pPr marL="457200" algn="l" defTabSz="914400" rtl="0" eaLnBrk="1" latinLnBrk="0" hangingPunct="1">
+      <a:defRPr sz="1200" kern="1200">
+        <a:solidFill>
+          <a:schemeClr val="tx1"/>
+        </a:solidFill>
+        <a:latin typeface="+mn-lt"/>
+        <a:ea typeface="+mn-ea"/>
+        <a:cs typeface="+mn-cs"/>
+      </a:defRPr>
+    </a:lvl2pPr>
+    <a:lvl3pPr marL="914400" algn="l" defTabSz="914400" rtl="0" eaLnBrk="1" latinLnBrk="0" hangingPunct="1">
+      <a:defRPr sz="1200" kern="1200">
+        <a:solidFill>
+          <a:schemeClr val="tx1"/>
+        </a:solidFill>
+        <a:latin typeface="+mn-lt"/>
+        <a:ea typeface="+mn-ea"/>
+        <a:cs typeface="+mn-cs"/>
+      </a:defRPr>
+    </a:lvl3pPr>
+    <a:lvl4pPr marL="1371600" algn="l" defTabSz="914400" rtl="0" eaLnBrk="1" latinLnBrk="0" hangingPunct="1">
+      <a:defRPr sz="1200" kern="1200">
+        <a:solidFill>
+          <a:schemeClr val="tx1"/>
+        </a:solidFill>
+        <a:latin typeface="+mn-lt"/>
+        <a:ea typeface="+mn-ea"/>
+        <a:cs typeface="+mn-cs"/>
+      </a:defRPr>
+    </a:lvl4pPr>
+    <a:lvl5pPr marL="1828800" algn="l" defTabSz="914400" rtl="0" eaLnBrk="1" latinLnBrk="0" hangingPunct="1">
+      <a:defRPr sz="1200" kern="1200">
+        <a:solidFill>
+          <a:schemeClr val="tx1"/>
+        </a:solidFill>
+        <a:latin typeface="+mn-lt"/>
+        <a:ea typeface="+mn-ea"/>
+        <a:cs typeface="+mn-cs"/>
+      </a:defRPr>
+    </a:lvl5pPr>
+    <a:lvl6pPr marL="2286000" algn="l" defTabSz="914400" rtl="0" eaLnBrk="1" latinLnBrk="0" hangingPunct="1">
+      <a:defRPr sz="1200" kern="1200">
+        <a:solidFill>
+          <a:schemeClr val="tx1"/>
+        </a:solidFill>
+        <a:latin typeface="+mn-lt"/>
+        <a:ea typeface="+mn-ea"/>
+        <a:cs typeface="+mn-cs"/>
+      </a:defRPr>
+    </a:lvl6pPr>
+    <a:lvl7pPr marL="2743200" algn="l" defTabSz="914400" rtl="0" eaLnBrk="1" latinLnBrk="0" hangingPunct="1">
+      <a:defRPr sz="1200" kern="1200">
+        <a:solidFill>
+          <a:schemeClr val="tx1"/>
+        </a:solidFill>
+        <a:latin typeface="+mn-lt"/>
+        <a:ea typeface="+mn-ea"/>
+        <a:cs typeface="+mn-cs"/>
+      </a:defRPr>
+    </a:lvl7pPr>
+    <a:lvl8pPr marL="3200400" algn="l" defTabSz="914400" rtl="0" eaLnBrk="1" latinLnBrk="0" hangingPunct="1">
+      <a:defRPr sz="1200" kern="1200">
+        <a:solidFill>
+          <a:schemeClr val="tx1"/>
+        </a:solidFill>
+        <a:latin typeface="+mn-lt"/>
+        <a:ea typeface="+mn-ea"/>
+        <a:cs typeface="+mn-cs"/>
+      </a:defRPr>
+    </a:lvl8pPr>
+    <a:lvl9pPr marL="3657600" algn="l" defTabSz="914400" rtl="0" eaLnBrk="1" latinLnBrk="0" hangingPunct="1">
+      <a:defRPr sz="1200" kern="1200">
+        <a:solidFill>
+          <a:schemeClr val="tx1"/>
+        </a:solidFill>
+        <a:latin typeface="+mn-lt"/>
+        <a:ea typeface="+mn-ea"/>
+        <a:cs typeface="+mn-cs"/>
+      </a:defRPr>
+    </a:lvl9pPr>
+  </p:notesStyle>
+</p:notesMaster>
 </file>
 
 <file path=ppt/slideLayouts/slideLayout1.xml><?xml version="1.0" encoding="utf-8"?>
@@ -613,7 +970,7 @@
           <a:p>
             <a:fld id="{DEBF3073-9E6E-4508-B4E4-15B5E03E6116}" type="datetimeFigureOut">
               <a:rPr lang="en-AU" smtClean="0"/>
-              <a:t>13/04/2024</a:t>
+              <a:t>14/04/2024</a:t>
             </a:fld>
             <a:endParaRPr lang="en-AU"/>
           </a:p>
@@ -909,7 +1266,7 @@
           <a:p>
             <a:fld id="{DEBF3073-9E6E-4508-B4E4-15B5E03E6116}" type="datetimeFigureOut">
               <a:rPr lang="en-AU" smtClean="0"/>
-              <a:t>13/04/2024</a:t>
+              <a:t>14/04/2024</a:t>
             </a:fld>
             <a:endParaRPr lang="en-AU"/>
           </a:p>
@@ -1157,7 +1514,7 @@
           <a:p>
             <a:fld id="{DEBF3073-9E6E-4508-B4E4-15B5E03E6116}" type="datetimeFigureOut">
               <a:rPr lang="en-AU" smtClean="0"/>
-              <a:t>13/04/2024</a:t>
+              <a:t>14/04/2024</a:t>
             </a:fld>
             <a:endParaRPr lang="en-AU"/>
           </a:p>
@@ -1697,7 +2054,7 @@
           <a:p>
             <a:fld id="{DEBF3073-9E6E-4508-B4E4-15B5E03E6116}" type="datetimeFigureOut">
               <a:rPr lang="en-AU" smtClean="0"/>
-              <a:t>13/04/2024</a:t>
+              <a:t>14/04/2024</a:t>
             </a:fld>
             <a:endParaRPr lang="en-AU"/>
           </a:p>
@@ -1945,7 +2302,7 @@
           <a:p>
             <a:fld id="{DEBF3073-9E6E-4508-B4E4-15B5E03E6116}" type="datetimeFigureOut">
               <a:rPr lang="en-AU" smtClean="0"/>
-              <a:t>13/04/2024</a:t>
+              <a:t>14/04/2024</a:t>
             </a:fld>
             <a:endParaRPr lang="en-AU"/>
           </a:p>
@@ -2477,7 +2834,7 @@
           <a:p>
             <a:fld id="{DEBF3073-9E6E-4508-B4E4-15B5E03E6116}" type="datetimeFigureOut">
               <a:rPr lang="en-AU" smtClean="0"/>
-              <a:t>13/04/2024</a:t>
+              <a:t>14/04/2024</a:t>
             </a:fld>
             <a:endParaRPr lang="en-AU"/>
           </a:p>
@@ -2774,7 +3131,7 @@
           <a:p>
             <a:fld id="{DEBF3073-9E6E-4508-B4E4-15B5E03E6116}" type="datetimeFigureOut">
               <a:rPr lang="en-AU" smtClean="0"/>
-              <a:t>13/04/2024</a:t>
+              <a:t>14/04/2024</a:t>
             </a:fld>
             <a:endParaRPr lang="en-AU"/>
           </a:p>
@@ -2948,7 +3305,7 @@
           <a:p>
             <a:fld id="{DEBF3073-9E6E-4508-B4E4-15B5E03E6116}" type="datetimeFigureOut">
               <a:rPr lang="en-AU" smtClean="0"/>
-              <a:t>13/04/2024</a:t>
+              <a:t>14/04/2024</a:t>
             </a:fld>
             <a:endParaRPr lang="en-AU"/>
           </a:p>
@@ -3128,7 +3485,7 @@
           <a:p>
             <a:fld id="{DEBF3073-9E6E-4508-B4E4-15B5E03E6116}" type="datetimeFigureOut">
               <a:rPr lang="en-AU" smtClean="0"/>
-              <a:t>13/04/2024</a:t>
+              <a:t>14/04/2024</a:t>
             </a:fld>
             <a:endParaRPr lang="en-AU"/>
           </a:p>
@@ -3298,7 +3655,7 @@
           <a:p>
             <a:fld id="{DEBF3073-9E6E-4508-B4E4-15B5E03E6116}" type="datetimeFigureOut">
               <a:rPr lang="en-AU" smtClean="0"/>
-              <a:t>13/04/2024</a:t>
+              <a:t>14/04/2024</a:t>
             </a:fld>
             <a:endParaRPr lang="en-AU"/>
           </a:p>
@@ -3549,7 +3906,7 @@
           <a:p>
             <a:fld id="{DEBF3073-9E6E-4508-B4E4-15B5E03E6116}" type="datetimeFigureOut">
               <a:rPr lang="en-AU" smtClean="0"/>
-              <a:t>13/04/2024</a:t>
+              <a:t>14/04/2024</a:t>
             </a:fld>
             <a:endParaRPr lang="en-AU"/>
           </a:p>
@@ -3846,7 +4203,7 @@
           <a:p>
             <a:fld id="{DEBF3073-9E6E-4508-B4E4-15B5E03E6116}" type="datetimeFigureOut">
               <a:rPr lang="en-AU" smtClean="0"/>
-              <a:t>13/04/2024</a:t>
+              <a:t>14/04/2024</a:t>
             </a:fld>
             <a:endParaRPr lang="en-AU"/>
           </a:p>
@@ -4288,7 +4645,7 @@
           <a:p>
             <a:fld id="{DEBF3073-9E6E-4508-B4E4-15B5E03E6116}" type="datetimeFigureOut">
               <a:rPr lang="en-AU" smtClean="0"/>
-              <a:t>13/04/2024</a:t>
+              <a:t>14/04/2024</a:t>
             </a:fld>
             <a:endParaRPr lang="en-AU"/>
           </a:p>
@@ -4406,7 +4763,7 @@
           <a:p>
             <a:fld id="{DEBF3073-9E6E-4508-B4E4-15B5E03E6116}" type="datetimeFigureOut">
               <a:rPr lang="en-AU" smtClean="0"/>
-              <a:t>13/04/2024</a:t>
+              <a:t>14/04/2024</a:t>
             </a:fld>
             <a:endParaRPr lang="en-AU"/>
           </a:p>
@@ -4501,7 +4858,7 @@
           <a:p>
             <a:fld id="{DEBF3073-9E6E-4508-B4E4-15B5E03E6116}" type="datetimeFigureOut">
               <a:rPr lang="en-AU" smtClean="0"/>
-              <a:t>13/04/2024</a:t>
+              <a:t>14/04/2024</a:t>
             </a:fld>
             <a:endParaRPr lang="en-AU"/>
           </a:p>
@@ -4784,7 +5141,7 @@
           <a:p>
             <a:fld id="{DEBF3073-9E6E-4508-B4E4-15B5E03E6116}" type="datetimeFigureOut">
               <a:rPr lang="en-AU" smtClean="0"/>
-              <a:t>13/04/2024</a:t>
+              <a:t>14/04/2024</a:t>
             </a:fld>
             <a:endParaRPr lang="en-AU"/>
           </a:p>
@@ -5075,7 +5432,7 @@
           <a:p>
             <a:fld id="{DEBF3073-9E6E-4508-B4E4-15B5E03E6116}" type="datetimeFigureOut">
               <a:rPr lang="en-AU" smtClean="0"/>
-              <a:t>13/04/2024</a:t>
+              <a:t>14/04/2024</a:t>
             </a:fld>
             <a:endParaRPr lang="en-AU"/>
           </a:p>
@@ -5605,7 +5962,7 @@
           <a:p>
             <a:fld id="{DEBF3073-9E6E-4508-B4E4-15B5E03E6116}" type="datetimeFigureOut">
               <a:rPr lang="en-AU" smtClean="0"/>
-              <a:t>13/04/2024</a:t>
+              <a:t>14/04/2024</a:t>
             </a:fld>
             <a:endParaRPr lang="en-AU"/>
           </a:p>
@@ -6201,7 +6558,11 @@
             <a:pPr algn="r"/>
             <a:r>
               <a:rPr lang="en-US" sz="6600" dirty="0">
-                <a:ln w="0"/>
+                <a:ln w="3175">
+                  <a:solidFill>
+                    <a:schemeClr val="tx1"/>
+                  </a:solidFill>
+                </a:ln>
                 <a:solidFill>
                   <a:schemeClr val="accent1"/>
                 </a:solidFill>
@@ -6216,7 +6577,11 @@
               <a:t>Exploration of Global CO2 Emissions</a:t>
             </a:r>
             <a:endParaRPr lang="en-AU" sz="6600" dirty="0">
-              <a:ln w="0"/>
+              <a:ln w="3175">
+                <a:solidFill>
+                  <a:schemeClr val="tx1"/>
+                </a:solidFill>
+              </a:ln>
               <a:solidFill>
                 <a:schemeClr val="accent1"/>
               </a:solidFill>
@@ -6263,10 +6628,10 @@
       </p:grpSpPr>
       <p:sp>
         <p:nvSpPr>
-          <p:cNvPr id="4" name="Title 3">
+          <p:cNvPr id="5" name="Title 4">
             <a:extLst>
               <a:ext uri="{FF2B5EF4-FFF2-40B4-BE49-F238E27FC236}">
-                <a16:creationId xmlns:a16="http://schemas.microsoft.com/office/drawing/2014/main" id="{A447B10E-53B0-0B57-85F1-AF093CB4E140}"/>
+                <a16:creationId xmlns:a16="http://schemas.microsoft.com/office/drawing/2014/main" id="{379F4DD7-6CEB-6EC9-4290-D6F96A971961}"/>
               </a:ext>
             </a:extLst>
           </p:cNvPr>
@@ -6279,19 +6644,57 @@
         </p:nvSpPr>
         <p:spPr/>
         <p:txBody>
-          <a:bodyPr/>
+          <a:bodyPr>
+            <a:normAutofit/>
+          </a:bodyPr>
           <a:lstStyle/>
           <a:p>
-            <a:endParaRPr lang="en-AU" dirty="0"/>
-          </a:p>
-        </p:txBody>
-      </p:sp>
-      <p:sp>
-        <p:nvSpPr>
-          <p:cNvPr id="5" name="Content Placeholder 4">
+            <a:r>
+              <a:rPr lang="en-US" sz="4800" dirty="0">
+                <a:ln w="0">
+                  <a:solidFill>
+                    <a:schemeClr val="tx1"/>
+                  </a:solidFill>
+                </a:ln>
+                <a:solidFill>
+                  <a:schemeClr val="accent1"/>
+                </a:solidFill>
+                <a:effectLst>
+                  <a:outerShdw blurRad="38100" dist="25400" dir="5400000" algn="ctr" rotWithShape="0">
+                    <a:srgbClr val="6E747A">
+                      <a:alpha val="43000"/>
+                    </a:srgbClr>
+                  </a:outerShdw>
+                </a:effectLst>
+              </a:rPr>
+              <a:t>Purpose Driven </a:t>
+            </a:r>
+            <a:endParaRPr lang="en-AU" sz="4800" dirty="0">
+              <a:ln w="0">
+                <a:solidFill>
+                  <a:schemeClr val="tx1"/>
+                </a:solidFill>
+              </a:ln>
+              <a:solidFill>
+                <a:schemeClr val="accent1"/>
+              </a:solidFill>
+              <a:effectLst>
+                <a:outerShdw blurRad="38100" dist="25400" dir="5400000" algn="ctr" rotWithShape="0">
+                  <a:srgbClr val="6E747A">
+                    <a:alpha val="43000"/>
+                  </a:srgbClr>
+                </a:outerShdw>
+              </a:effectLst>
+            </a:endParaRPr>
+          </a:p>
+        </p:txBody>
+      </p:sp>
+      <p:sp>
+        <p:nvSpPr>
+          <p:cNvPr id="6" name="Content Placeholder 5">
             <a:extLst>
               <a:ext uri="{FF2B5EF4-FFF2-40B4-BE49-F238E27FC236}">
-                <a16:creationId xmlns:a16="http://schemas.microsoft.com/office/drawing/2014/main" id="{2DCD4CEC-D8AB-A950-508D-C6BC2B55234D}"/>
+                <a16:creationId xmlns:a16="http://schemas.microsoft.com/office/drawing/2014/main" id="{6A69788C-3DA3-59C9-D25D-7F0B224BD867}"/>
               </a:ext>
             </a:extLst>
           </p:cNvPr>
@@ -6302,21 +6705,113 @@
             <p:ph sz="half" idx="1"/>
           </p:nvPr>
         </p:nvSpPr>
-        <p:spPr/>
-        <p:txBody>
-          <a:bodyPr/>
+        <p:spPr>
+          <a:xfrm>
+            <a:off x="2049795" y="2438399"/>
+            <a:ext cx="2570331" cy="3124201"/>
+          </a:xfrm>
+        </p:spPr>
+        <p:txBody>
+          <a:bodyPr>
+            <a:normAutofit lnSpcReduction="10000"/>
+          </a:bodyPr>
           <a:lstStyle/>
           <a:p>
-            <a:endParaRPr lang="en-AU"/>
-          </a:p>
-        </p:txBody>
-      </p:sp>
-      <p:sp>
-        <p:nvSpPr>
-          <p:cNvPr id="6" name="Content Placeholder 5">
+            <a:pPr marL="0" indent="0">
+              <a:buNone/>
+            </a:pPr>
+            <a:r>
+              <a:rPr lang="en-US" dirty="0"/>
+              <a:t>CO2 emissions growth:</a:t>
+            </a:r>
+          </a:p>
+          <a:p>
+            <a:pPr>
+              <a:buFont typeface="Wingdings" panose="05000000000000000000" pitchFamily="2" charset="2"/>
+              <a:buChar char="Ø"/>
+            </a:pPr>
+            <a:r>
+              <a:rPr lang="en-US" dirty="0"/>
+              <a:t>1950’s – </a:t>
+            </a:r>
+            <a:r>
+              <a:rPr lang="en-US" b="1" dirty="0"/>
+              <a:t>42.15%</a:t>
+            </a:r>
+          </a:p>
+          <a:p>
+            <a:pPr>
+              <a:buFont typeface="Wingdings" panose="05000000000000000000" pitchFamily="2" charset="2"/>
+              <a:buChar char="Ø"/>
+            </a:pPr>
+            <a:r>
+              <a:rPr lang="en-US" dirty="0"/>
+              <a:t>1960’s – 16.33%</a:t>
+            </a:r>
+          </a:p>
+          <a:p>
+            <a:pPr>
+              <a:buFont typeface="Wingdings" panose="05000000000000000000" pitchFamily="2" charset="2"/>
+              <a:buChar char="Ø"/>
+            </a:pPr>
+            <a:r>
+              <a:rPr lang="en-US" dirty="0"/>
+              <a:t>1970’s – 8.28%</a:t>
+            </a:r>
+          </a:p>
+          <a:p>
+            <a:pPr>
+              <a:buFont typeface="Wingdings" panose="05000000000000000000" pitchFamily="2" charset="2"/>
+              <a:buChar char="Ø"/>
+            </a:pPr>
+            <a:r>
+              <a:rPr lang="en-US" dirty="0"/>
+              <a:t>1980’s – 4.39%</a:t>
+            </a:r>
+          </a:p>
+          <a:p>
+            <a:pPr>
+              <a:buFont typeface="Wingdings" panose="05000000000000000000" pitchFamily="2" charset="2"/>
+              <a:buChar char="Ø"/>
+            </a:pPr>
+            <a:r>
+              <a:rPr lang="en-US" dirty="0"/>
+              <a:t>1990’s – 4.95%</a:t>
+            </a:r>
+          </a:p>
+          <a:p>
+            <a:pPr>
+              <a:buFont typeface="Wingdings" panose="05000000000000000000" pitchFamily="2" charset="2"/>
+              <a:buChar char="Ø"/>
+            </a:pPr>
+            <a:r>
+              <a:rPr lang="en-US" dirty="0"/>
+              <a:t>2000’s - </a:t>
+            </a:r>
+            <a:r>
+              <a:rPr lang="en-US" b="1" dirty="0"/>
+              <a:t>5.26%</a:t>
+            </a:r>
+          </a:p>
+          <a:p>
+            <a:pPr>
+              <a:buFont typeface="Wingdings" panose="05000000000000000000" pitchFamily="2" charset="2"/>
+              <a:buChar char="Ø"/>
+            </a:pPr>
+            <a:r>
+              <a:rPr lang="en-US" dirty="0"/>
+              <a:t>2010’s - 2.92%</a:t>
+            </a:r>
+            <a:endParaRPr lang="en-AU" dirty="0"/>
+          </a:p>
+        </p:txBody>
+      </p:sp>
+      <p:sp>
+        <p:nvSpPr>
+          <p:cNvPr id="9" name="Content Placeholder 8">
             <a:extLst>
               <a:ext uri="{FF2B5EF4-FFF2-40B4-BE49-F238E27FC236}">
-                <a16:creationId xmlns:a16="http://schemas.microsoft.com/office/drawing/2014/main" id="{F0CBBD30-7D91-7A50-D105-3193BB846B3A}"/>
+                <a16:creationId xmlns:a16="http://schemas.microsoft.com/office/drawing/2014/main" id="{7A74DDC6-86A9-E378-D2B7-93E27478167F}"/>
               </a:ext>
             </a:extLst>
           </p:cNvPr>
@@ -6339,7 +6834,7 @@
     </p:spTree>
     <p:extLst>
       <p:ext uri="{BB962C8B-B14F-4D97-AF65-F5344CB8AC3E}">
-        <p14:creationId xmlns:p14="http://schemas.microsoft.com/office/powerpoint/2010/main" val="1330347484"/>
+        <p14:creationId xmlns:p14="http://schemas.microsoft.com/office/powerpoint/2010/main" val="1821918453"/>
       </p:ext>
     </p:extLst>
   </p:cSld>
@@ -6352,89 +6847,9 @@
 <file path=ppt/slides/slide3.xml><?xml version="1.0" encoding="utf-8"?>
 <p:sld xmlns:a="http://schemas.openxmlformats.org/drawingml/2006/main" xmlns:r="http://schemas.openxmlformats.org/officeDocument/2006/relationships" xmlns:p="http://schemas.openxmlformats.org/presentationml/2006/main">
   <p:cSld>
-    <p:spTree>
-      <p:nvGrpSpPr>
-        <p:cNvPr id="1" name=""/>
-        <p:cNvGrpSpPr/>
-        <p:nvPr/>
-      </p:nvGrpSpPr>
-      <p:grpSpPr>
-        <a:xfrm>
-          <a:off x="0" y="0"/>
-          <a:ext cx="0" cy="0"/>
-          <a:chOff x="0" y="0"/>
-          <a:chExt cx="0" cy="0"/>
-        </a:xfrm>
-      </p:grpSpPr>
-      <p:sp>
-        <p:nvSpPr>
-          <p:cNvPr id="2" name="Title 1">
-            <a:extLst>
-              <a:ext uri="{FF2B5EF4-FFF2-40B4-BE49-F238E27FC236}">
-                <a16:creationId xmlns:a16="http://schemas.microsoft.com/office/drawing/2014/main" id="{FFA21A59-A2DA-96CB-BB4C-AABB34747C37}"/>
-              </a:ext>
-            </a:extLst>
-          </p:cNvPr>
-          <p:cNvSpPr>
-            <a:spLocks noGrp="1"/>
-          </p:cNvSpPr>
-          <p:nvPr>
-            <p:ph type="title"/>
-          </p:nvPr>
-        </p:nvSpPr>
-        <p:spPr/>
-        <p:txBody>
-          <a:bodyPr/>
-          <a:lstStyle/>
-          <a:p>
-            <a:endParaRPr lang="en-AU"/>
-          </a:p>
-        </p:txBody>
-      </p:sp>
-      <p:sp>
-        <p:nvSpPr>
-          <p:cNvPr id="3" name="Content Placeholder 2">
-            <a:extLst>
-              <a:ext uri="{FF2B5EF4-FFF2-40B4-BE49-F238E27FC236}">
-                <a16:creationId xmlns:a16="http://schemas.microsoft.com/office/drawing/2014/main" id="{4D592B78-BE14-AF46-B4F0-E7CBFEB20D4D}"/>
-              </a:ext>
-            </a:extLst>
-          </p:cNvPr>
-          <p:cNvSpPr>
-            <a:spLocks noGrp="1"/>
-          </p:cNvSpPr>
-          <p:nvPr>
-            <p:ph idx="1"/>
-          </p:nvPr>
-        </p:nvSpPr>
-        <p:spPr/>
-        <p:txBody>
-          <a:bodyPr/>
-          <a:lstStyle/>
-          <a:p>
-            <a:endParaRPr lang="en-AU"/>
-          </a:p>
-        </p:txBody>
-      </p:sp>
-    </p:spTree>
-    <p:extLst>
-      <p:ext uri="{BB962C8B-B14F-4D97-AF65-F5344CB8AC3E}">
-        <p14:creationId xmlns:p14="http://schemas.microsoft.com/office/powerpoint/2010/main" val="2694325006"/>
-      </p:ext>
-    </p:extLst>
-  </p:cSld>
-  <p:clrMapOvr>
-    <a:masterClrMapping/>
-  </p:clrMapOvr>
-</p:sld>
-</file>
-
-<file path=ppt/slides/slide4.xml><?xml version="1.0" encoding="utf-8"?>
-<p:sld xmlns:a="http://schemas.openxmlformats.org/drawingml/2006/main" xmlns:r="http://schemas.openxmlformats.org/officeDocument/2006/relationships" xmlns:p="http://schemas.openxmlformats.org/presentationml/2006/main">
-  <p:cSld>
     <p:bg>
       <p:bgPr>
-        <a:blipFill rotWithShape="1">
+        <a:blipFill dpi="0" rotWithShape="1">
           <a:blip r:embed="rId2">
             <a:duotone>
               <a:schemeClr val="bg2">
@@ -6447,8 +6862,12 @@
                 <a:lumMod val="180000"/>
               </a:schemeClr>
             </a:duotone>
+            <a:lum/>
           </a:blip>
-          <a:stretch/>
+          <a:srcRect/>
+          <a:stretch>
+            <a:fillRect/>
+          </a:stretch>
         </a:blipFill>
         <a:effectLst/>
       </p:bgPr>
@@ -6467,66 +6886,15 @@
           <a:chExt cx="0" cy="0"/>
         </a:xfrm>
       </p:grpSpPr>
-      <p:pic>
-        <p:nvPicPr>
-          <p:cNvPr id="5" name="Content Placeholder 4" descr="A map of the world&#10;&#10;Description automatically generated">
+      <p:sp>
+        <p:nvSpPr>
+          <p:cNvPr id="13" name="Title 12">
             <a:extLst>
               <a:ext uri="{FF2B5EF4-FFF2-40B4-BE49-F238E27FC236}">
-                <a16:creationId xmlns:a16="http://schemas.microsoft.com/office/drawing/2014/main" id="{C2B92FCF-C666-DAC7-AFD8-40913A55F03B}"/>
+                <a16:creationId xmlns:a16="http://schemas.microsoft.com/office/drawing/2014/main" id="{9843AC1B-6679-3685-C925-9EE69154550D}"/>
               </a:ext>
             </a:extLst>
           </p:cNvPr>
-          <p:cNvPicPr>
-            <a:picLocks noChangeAspect="1"/>
-          </p:cNvPicPr>
-          <p:nvPr/>
-        </p:nvPicPr>
-        <p:blipFill rotWithShape="1">
-          <a:blip r:embed="rId3">
-            <a:extLst>
-              <a:ext uri="{28A0092B-C50C-407E-A947-70E740481C1C}">
-                <a14:useLocalDpi xmlns:a14="http://schemas.microsoft.com/office/drawing/2010/main" val="0"/>
-              </a:ext>
-            </a:extLst>
-          </a:blip>
-          <a:srcRect b="3621"/>
-          <a:stretch/>
-        </p:blipFill>
-        <p:spPr>
-          <a:xfrm>
-            <a:off x="0" y="0"/>
-            <a:ext cx="12155657" cy="6858000"/>
-          </a:xfrm>
-          <a:prstGeom prst="rect">
-            <a:avLst/>
-          </a:prstGeom>
-          <a:ln w="28575">
-            <a:solidFill>
-              <a:schemeClr val="accent1">
-                <a:lumMod val="60000"/>
-                <a:lumOff val="40000"/>
-              </a:schemeClr>
-            </a:solidFill>
-          </a:ln>
-          <a:effectLst>
-            <a:innerShdw blurRad="279400">
-              <a:schemeClr val="accent1">
-                <a:lumMod val="75000"/>
-              </a:schemeClr>
-            </a:innerShdw>
-            <a:softEdge rad="31750"/>
-          </a:effectLst>
-        </p:spPr>
-      </p:pic>
-      <p:sp>
-        <p:nvSpPr>
-          <p:cNvPr id="11" name="Title 10">
-            <a:extLst>
-              <a:ext uri="{FF2B5EF4-FFF2-40B4-BE49-F238E27FC236}">
-                <a16:creationId xmlns:a16="http://schemas.microsoft.com/office/drawing/2014/main" id="{0BF320EA-FD2C-CA08-7E1D-0FE6CD651FBD}"/>
-              </a:ext>
-            </a:extLst>
-          </p:cNvPr>
           <p:cNvSpPr>
             <a:spLocks noGrp="1"/>
           </p:cNvSpPr>
@@ -6536,70 +6904,18 @@
         </p:nvSpPr>
         <p:spPr/>
         <p:txBody>
-          <a:bodyPr/>
-          <a:lstStyle/>
-          <a:p>
-            <a:endParaRPr lang="en-AU"/>
-          </a:p>
-        </p:txBody>
-      </p:sp>
-      <p:sp>
-        <p:nvSpPr>
-          <p:cNvPr id="19" name="Text Placeholder 18">
-            <a:extLst>
-              <a:ext uri="{FF2B5EF4-FFF2-40B4-BE49-F238E27FC236}">
-                <a16:creationId xmlns:a16="http://schemas.microsoft.com/office/drawing/2014/main" id="{DD34270D-FDEB-287A-775D-55185E9D321E}"/>
-              </a:ext>
-            </a:extLst>
-          </p:cNvPr>
-          <p:cNvSpPr>
-            <a:spLocks noGrp="1"/>
-          </p:cNvSpPr>
-          <p:nvPr>
-            <p:ph type="body" sz="half" idx="2"/>
-          </p:nvPr>
-        </p:nvSpPr>
-        <p:spPr/>
-        <p:txBody>
-          <a:bodyPr/>
-          <a:lstStyle/>
-          <a:p>
-            <a:endParaRPr lang="en-AU"/>
-          </a:p>
-        </p:txBody>
-      </p:sp>
-      <p:sp>
-        <p:nvSpPr>
-          <p:cNvPr id="7" name="Rectangle 6">
-            <a:extLst>
-              <a:ext uri="{FF2B5EF4-FFF2-40B4-BE49-F238E27FC236}">
-                <a16:creationId xmlns:a16="http://schemas.microsoft.com/office/drawing/2014/main" id="{147F3E7D-922B-BEB2-24F2-7AC97A144F8E}"/>
-              </a:ext>
-            </a:extLst>
-          </p:cNvPr>
-          <p:cNvSpPr/>
-          <p:nvPr/>
-        </p:nvSpPr>
-        <p:spPr>
-          <a:xfrm>
-            <a:off x="3837192" y="4922520"/>
-            <a:ext cx="6305127" cy="1754326"/>
-          </a:xfrm>
-          <a:prstGeom prst="rect">
-            <a:avLst/>
-          </a:prstGeom>
-          <a:noFill/>
-        </p:spPr>
-        <p:txBody>
-          <a:bodyPr wrap="square" lIns="91440" tIns="45720" rIns="91440" bIns="45720">
-            <a:spAutoFit/>
+          <a:bodyPr>
+            <a:normAutofit/>
           </a:bodyPr>
           <a:lstStyle/>
           <a:p>
-            <a:pPr algn="ctr"/>
-            <a:r>
-              <a:rPr lang="en-US" sz="5400" dirty="0">
-                <a:ln w="0"/>
+            <a:r>
+              <a:rPr lang="en-US" sz="4800" dirty="0">
+                <a:ln w="0">
+                  <a:solidFill>
+                    <a:schemeClr val="tx2"/>
+                  </a:solidFill>
+                </a:ln>
                 <a:solidFill>
                   <a:schemeClr val="accent1"/>
                 </a:solidFill>
@@ -6611,10 +6927,14 @@
                   </a:outerShdw>
                 </a:effectLst>
               </a:rPr>
-              <a:t>Country Classifications</a:t>
-            </a:r>
-            <a:endParaRPr lang="en-AU" sz="5400" dirty="0">
-              <a:ln w="0"/>
+              <a:t>Investigate Trends In Emission Data</a:t>
+            </a:r>
+            <a:endParaRPr lang="en-AU" sz="4800" dirty="0">
+              <a:ln w="0">
+                <a:solidFill>
+                  <a:schemeClr val="tx2"/>
+                </a:solidFill>
+              </a:ln>
               <a:solidFill>
                 <a:schemeClr val="accent1"/>
               </a:solidFill>
@@ -6629,389 +6949,249 @@
           </a:p>
         </p:txBody>
       </p:sp>
-      <p:graphicFrame>
-        <p:nvGraphicFramePr>
-          <p:cNvPr id="6" name="Content Placeholder 5">
+      <p:sp>
+        <p:nvSpPr>
+          <p:cNvPr id="14" name="Text Placeholder 13">
             <a:extLst>
               <a:ext uri="{FF2B5EF4-FFF2-40B4-BE49-F238E27FC236}">
-                <a16:creationId xmlns:a16="http://schemas.microsoft.com/office/drawing/2014/main" id="{1ECE1675-290E-C74B-82BC-C740DF2C6F3E}"/>
+                <a16:creationId xmlns:a16="http://schemas.microsoft.com/office/drawing/2014/main" id="{C4F5B6E4-5417-E08B-12D8-855217586E5D}"/>
               </a:ext>
             </a:extLst>
           </p:cNvPr>
-          <p:cNvGraphicFramePr>
-            <a:graphicFrameLocks noGrp="1"/>
-          </p:cNvGraphicFramePr>
-          <p:nvPr>
-            <p:ph idx="1"/>
-            <p:extLst>
-              <p:ext uri="{D42A27DB-BD31-4B8C-83A1-F6EECF244321}">
-                <p14:modId xmlns:p14="http://schemas.microsoft.com/office/powerpoint/2010/main" val="59940209"/>
-              </p:ext>
-            </p:extLst>
-          </p:nvPr>
-        </p:nvGraphicFramePr>
-        <p:xfrm>
-          <a:off x="176192" y="4757778"/>
-          <a:ext cx="4488018" cy="1950720"/>
-        </p:xfrm>
-        <a:graphic>
-          <a:graphicData uri="http://schemas.openxmlformats.org/drawingml/2006/table">
-            <a:tbl>
-              <a:tblPr firstRow="1" bandRow="1">
-                <a:tableStyleId>{5C22544A-7EE6-4342-B048-85BDC9FD1C3A}</a:tableStyleId>
-              </a:tblPr>
-              <a:tblGrid>
-                <a:gridCol w="1288224">
-                  <a:extLst>
-                    <a:ext uri="{9D8B030D-6E8A-4147-A177-3AD203B41FA5}">
-                      <a16:colId xmlns:a16="http://schemas.microsoft.com/office/drawing/2014/main" val="3525465877"/>
-                    </a:ext>
-                  </a:extLst>
-                </a:gridCol>
-                <a:gridCol w="1578877">
-                  <a:extLst>
-                    <a:ext uri="{9D8B030D-6E8A-4147-A177-3AD203B41FA5}">
-                      <a16:colId xmlns:a16="http://schemas.microsoft.com/office/drawing/2014/main" val="1266575097"/>
-                    </a:ext>
-                  </a:extLst>
-                </a:gridCol>
-                <a:gridCol w="1620917">
-                  <a:extLst>
-                    <a:ext uri="{9D8B030D-6E8A-4147-A177-3AD203B41FA5}">
-                      <a16:colId xmlns:a16="http://schemas.microsoft.com/office/drawing/2014/main" val="614180652"/>
-                    </a:ext>
-                  </a:extLst>
-                </a:gridCol>
-              </a:tblGrid>
-              <a:tr h="304800">
-                <a:tc>
-                  <a:txBody>
-                    <a:bodyPr/>
-                    <a:lstStyle/>
-                    <a:p>
-                      <a:pPr algn="ctr"/>
-                      <a:r>
-                        <a:rPr lang="en-US" dirty="0"/>
-                        <a:t>Developed</a:t>
-                      </a:r>
-                      <a:endParaRPr lang="en-AU" dirty="0"/>
-                    </a:p>
-                  </a:txBody>
-                  <a:tcPr>
-                    <a:solidFill>
-                      <a:schemeClr val="accent5">
-                        <a:lumMod val="75000"/>
-                      </a:schemeClr>
-                    </a:solidFill>
-                  </a:tcPr>
-                </a:tc>
-                <a:tc>
-                  <a:txBody>
-                    <a:bodyPr/>
-                    <a:lstStyle/>
-                    <a:p>
-                      <a:pPr algn="ctr"/>
-                      <a:r>
-                        <a:rPr lang="en-US" dirty="0"/>
-                        <a:t>Developing</a:t>
-                      </a:r>
-                      <a:endParaRPr lang="en-AU" dirty="0"/>
-                    </a:p>
-                  </a:txBody>
-                  <a:tcPr>
-                    <a:solidFill>
-                      <a:srgbClr val="0070C0"/>
-                    </a:solidFill>
-                  </a:tcPr>
-                </a:tc>
-                <a:tc>
-                  <a:txBody>
-                    <a:bodyPr/>
-                    <a:lstStyle/>
-                    <a:p>
-                      <a:pPr algn="ctr"/>
-                      <a:r>
-                        <a:rPr lang="en-US" sz="1400" dirty="0"/>
-                        <a:t>Underdeveloped</a:t>
-                      </a:r>
-                      <a:endParaRPr lang="en-AU" sz="1400" dirty="0"/>
-                    </a:p>
-                  </a:txBody>
-                  <a:tcPr>
-                    <a:solidFill>
-                      <a:schemeClr val="accent1">
-                        <a:lumMod val="75000"/>
-                      </a:schemeClr>
-                    </a:solidFill>
-                  </a:tcPr>
-                </a:tc>
-                <a:extLst>
-                  <a:ext uri="{0D108BD9-81ED-4DB2-BD59-A6C34878D82A}">
-                    <a16:rowId xmlns:a16="http://schemas.microsoft.com/office/drawing/2014/main" val="1319713481"/>
-                  </a:ext>
-                </a:extLst>
-              </a:tr>
-              <a:tr h="304800">
-                <a:tc>
-                  <a:txBody>
-                    <a:bodyPr/>
-                    <a:lstStyle/>
-                    <a:p>
-                      <a:r>
-                        <a:rPr lang="en-US" sz="1400" dirty="0"/>
-                        <a:t>Australia</a:t>
-                      </a:r>
-                      <a:endParaRPr lang="en-AU" dirty="0"/>
-                    </a:p>
-                  </a:txBody>
-                  <a:tcPr/>
-                </a:tc>
-                <a:tc>
-                  <a:txBody>
-                    <a:bodyPr/>
-                    <a:lstStyle/>
-                    <a:p>
-                      <a:r>
-                        <a:rPr lang="en-US" sz="1400" dirty="0"/>
-                        <a:t>Brazil</a:t>
-                      </a:r>
-                      <a:endParaRPr lang="en-AU" dirty="0"/>
-                    </a:p>
-                  </a:txBody>
-                  <a:tcPr/>
-                </a:tc>
-                <a:tc>
-                  <a:txBody>
-                    <a:bodyPr/>
-                    <a:lstStyle/>
-                    <a:p>
-                      <a:r>
-                        <a:rPr lang="en-US" sz="1400" dirty="0"/>
-                        <a:t>Ethiopia</a:t>
-                      </a:r>
-                      <a:endParaRPr lang="en-AU" dirty="0"/>
-                    </a:p>
-                  </a:txBody>
-                  <a:tcPr/>
-                </a:tc>
-                <a:extLst>
-                  <a:ext uri="{0D108BD9-81ED-4DB2-BD59-A6C34878D82A}">
-                    <a16:rowId xmlns:a16="http://schemas.microsoft.com/office/drawing/2014/main" val="1644931643"/>
-                  </a:ext>
-                </a:extLst>
-              </a:tr>
-              <a:tr h="304800">
-                <a:tc>
-                  <a:txBody>
-                    <a:bodyPr/>
-                    <a:lstStyle/>
-                    <a:p>
-                      <a:r>
-                        <a:rPr lang="en-US" sz="1400" b="0" dirty="0"/>
-                        <a:t>Sweden</a:t>
-                      </a:r>
-                      <a:endParaRPr lang="en-AU" b="0" dirty="0"/>
-                    </a:p>
-                  </a:txBody>
-                  <a:tcPr/>
-                </a:tc>
-                <a:tc>
-                  <a:txBody>
-                    <a:bodyPr/>
-                    <a:lstStyle/>
-                    <a:p>
-                      <a:r>
-                        <a:rPr lang="en-US" sz="1400" dirty="0"/>
-                        <a:t>India</a:t>
-                      </a:r>
-                      <a:endParaRPr lang="en-AU" dirty="0"/>
-                    </a:p>
-                  </a:txBody>
-                  <a:tcPr/>
-                </a:tc>
-                <a:tc>
-                  <a:txBody>
-                    <a:bodyPr/>
-                    <a:lstStyle/>
-                    <a:p>
-                      <a:r>
-                        <a:rPr lang="en-US" sz="1400" dirty="0"/>
-                        <a:t>Senegal</a:t>
-                      </a:r>
-                      <a:endParaRPr lang="en-AU" dirty="0"/>
-                    </a:p>
-                  </a:txBody>
-                  <a:tcPr/>
-                </a:tc>
-                <a:extLst>
-                  <a:ext uri="{0D108BD9-81ED-4DB2-BD59-A6C34878D82A}">
-                    <a16:rowId xmlns:a16="http://schemas.microsoft.com/office/drawing/2014/main" val="39174299"/>
-                  </a:ext>
-                </a:extLst>
-              </a:tr>
-              <a:tr h="304800">
-                <a:tc>
-                  <a:txBody>
-                    <a:bodyPr/>
-                    <a:lstStyle/>
-                    <a:p>
-                      <a:r>
-                        <a:rPr lang="en-US" sz="1400" dirty="0"/>
-                        <a:t>Japan</a:t>
-                      </a:r>
-                      <a:endParaRPr lang="en-AU" sz="1400" dirty="0"/>
-                    </a:p>
-                  </a:txBody>
-                  <a:tcPr/>
-                </a:tc>
-                <a:tc>
-                  <a:txBody>
-                    <a:bodyPr/>
-                    <a:lstStyle/>
-                    <a:p>
-                      <a:r>
-                        <a:rPr lang="en-US" sz="1400" dirty="0"/>
-                        <a:t>Egypt</a:t>
-                      </a:r>
-                      <a:endParaRPr lang="en-AU" dirty="0"/>
-                    </a:p>
-                  </a:txBody>
-                  <a:tcPr/>
-                </a:tc>
-                <a:tc>
-                  <a:txBody>
-                    <a:bodyPr/>
-                    <a:lstStyle/>
-                    <a:p>
-                      <a:r>
-                        <a:rPr lang="en-US" sz="1400" dirty="0"/>
-                        <a:t>Cambodia</a:t>
-                      </a:r>
-                      <a:endParaRPr lang="en-AU" dirty="0"/>
-                    </a:p>
-                  </a:txBody>
-                  <a:tcPr/>
-                </a:tc>
-                <a:extLst>
-                  <a:ext uri="{0D108BD9-81ED-4DB2-BD59-A6C34878D82A}">
-                    <a16:rowId xmlns:a16="http://schemas.microsoft.com/office/drawing/2014/main" val="2678225684"/>
-                  </a:ext>
-                </a:extLst>
-              </a:tr>
-              <a:tr h="304800">
-                <a:tc>
-                  <a:txBody>
-                    <a:bodyPr/>
-                    <a:lstStyle/>
-                    <a:p>
-                      <a:r>
-                        <a:rPr lang="en-US" sz="1400" dirty="0"/>
-                        <a:t>Switzerland</a:t>
-                      </a:r>
-                      <a:endParaRPr lang="en-AU" dirty="0"/>
-                    </a:p>
-                  </a:txBody>
-                  <a:tcPr/>
-                </a:tc>
-                <a:tc>
-                  <a:txBody>
-                    <a:bodyPr/>
-                    <a:lstStyle/>
-                    <a:p>
-                      <a:r>
-                        <a:rPr lang="en-US" sz="1400" dirty="0"/>
-                        <a:t>Greece</a:t>
-                      </a:r>
-                      <a:endParaRPr lang="en-AU" dirty="0"/>
-                    </a:p>
-                  </a:txBody>
-                  <a:tcPr/>
-                </a:tc>
-                <a:tc>
-                  <a:txBody>
-                    <a:bodyPr/>
-                    <a:lstStyle/>
-                    <a:p>
-                      <a:r>
-                        <a:rPr lang="en-US" sz="1400" dirty="0"/>
-                        <a:t>Bangladesh</a:t>
-                      </a:r>
-                      <a:endParaRPr lang="en-AU" dirty="0"/>
-                    </a:p>
-                  </a:txBody>
-                  <a:tcPr/>
-                </a:tc>
-                <a:extLst>
-                  <a:ext uri="{0D108BD9-81ED-4DB2-BD59-A6C34878D82A}">
-                    <a16:rowId xmlns:a16="http://schemas.microsoft.com/office/drawing/2014/main" val="1988145626"/>
-                  </a:ext>
-                </a:extLst>
-              </a:tr>
-              <a:tr h="304800">
-                <a:tc>
-                  <a:txBody>
-                    <a:bodyPr/>
-                    <a:lstStyle/>
-                    <a:p>
-                      <a:r>
-                        <a:rPr lang="en-US" sz="1400" dirty="0"/>
-                        <a:t>USA</a:t>
-                      </a:r>
-                      <a:endParaRPr lang="en-AU" dirty="0"/>
-                    </a:p>
-                  </a:txBody>
-                  <a:tcPr/>
-                </a:tc>
-                <a:tc>
-                  <a:txBody>
-                    <a:bodyPr/>
-                    <a:lstStyle/>
-                    <a:p>
-                      <a:r>
-                        <a:rPr lang="en-US" sz="1400" dirty="0"/>
-                        <a:t>South</a:t>
-                      </a:r>
-                      <a:r>
-                        <a:rPr lang="en-US" dirty="0"/>
-                        <a:t> </a:t>
-                      </a:r>
-                      <a:r>
-                        <a:rPr lang="en-US" sz="1400" dirty="0"/>
-                        <a:t>Africa</a:t>
-                      </a:r>
-                      <a:endParaRPr lang="en-AU" dirty="0"/>
-                    </a:p>
-                  </a:txBody>
-                  <a:tcPr/>
-                </a:tc>
-                <a:tc>
-                  <a:txBody>
-                    <a:bodyPr/>
-                    <a:lstStyle/>
-                    <a:p>
-                      <a:r>
-                        <a:rPr lang="en-US" sz="1400" dirty="0"/>
-                        <a:t>Afghanistan</a:t>
-                      </a:r>
-                      <a:endParaRPr lang="en-AU" dirty="0"/>
-                    </a:p>
-                  </a:txBody>
-                  <a:tcPr/>
-                </a:tc>
-                <a:extLst>
-                  <a:ext uri="{0D108BD9-81ED-4DB2-BD59-A6C34878D82A}">
-                    <a16:rowId xmlns:a16="http://schemas.microsoft.com/office/drawing/2014/main" val="3144892520"/>
-                  </a:ext>
-                </a:extLst>
-              </a:tr>
-            </a:tbl>
-          </a:graphicData>
-        </a:graphic>
-      </p:graphicFrame>
+          <p:cNvSpPr>
+            <a:spLocks noGrp="1"/>
+          </p:cNvSpPr>
+          <p:nvPr>
+            <p:ph type="body" idx="1"/>
+          </p:nvPr>
+        </p:nvSpPr>
+        <p:spPr>
+          <a:xfrm>
+            <a:off x="1484311" y="2746597"/>
+            <a:ext cx="4607188" cy="576262"/>
+          </a:xfrm>
+        </p:spPr>
+        <p:txBody>
+          <a:bodyPr/>
+          <a:lstStyle/>
+          <a:p>
+            <a:r>
+              <a:rPr lang="en-US" dirty="0"/>
+              <a:t>Trends?</a:t>
+            </a:r>
+          </a:p>
+        </p:txBody>
+      </p:sp>
+      <p:sp>
+        <p:nvSpPr>
+          <p:cNvPr id="15" name="Content Placeholder 14">
+            <a:extLst>
+              <a:ext uri="{FF2B5EF4-FFF2-40B4-BE49-F238E27FC236}">
+                <a16:creationId xmlns:a16="http://schemas.microsoft.com/office/drawing/2014/main" id="{411AC09D-918F-1DE4-92CE-D5A7FFE016FB}"/>
+              </a:ext>
+            </a:extLst>
+          </p:cNvPr>
+          <p:cNvSpPr>
+            <a:spLocks noGrp="1"/>
+          </p:cNvSpPr>
+          <p:nvPr>
+            <p:ph sz="half" idx="2"/>
+          </p:nvPr>
+        </p:nvSpPr>
+        <p:spPr/>
+        <p:txBody>
+          <a:bodyPr/>
+          <a:lstStyle/>
+          <a:p>
+            <a:pPr>
+              <a:buFont typeface="Wingdings" panose="05000000000000000000" pitchFamily="2" charset="2"/>
+              <a:buChar char="Ø"/>
+            </a:pPr>
+            <a:r>
+              <a:rPr lang="en-US" dirty="0"/>
+              <a:t> Population vs Total emissions</a:t>
+            </a:r>
+          </a:p>
+          <a:p>
+            <a:pPr>
+              <a:buFont typeface="Wingdings" panose="05000000000000000000" pitchFamily="2" charset="2"/>
+              <a:buChar char="Ø"/>
+            </a:pPr>
+            <a:r>
+              <a:rPr lang="en-US" dirty="0"/>
+              <a:t>GDP vs Total emissions</a:t>
+            </a:r>
+          </a:p>
+          <a:p>
+            <a:pPr>
+              <a:buFont typeface="Wingdings" panose="05000000000000000000" pitchFamily="2" charset="2"/>
+              <a:buChar char="Ø"/>
+            </a:pPr>
+            <a:r>
+              <a:rPr lang="en-US" dirty="0"/>
+              <a:t>GDP  vs  Total Emissions ratio</a:t>
+            </a:r>
+          </a:p>
+          <a:p>
+            <a:pPr>
+              <a:buFont typeface="Wingdings" panose="05000000000000000000" pitchFamily="2" charset="2"/>
+              <a:buChar char="Ø"/>
+            </a:pPr>
+            <a:r>
+              <a:rPr lang="en-US" dirty="0"/>
+              <a:t>Emissions Per Person vs Daily Income</a:t>
+            </a:r>
+          </a:p>
+          <a:p>
+            <a:pPr>
+              <a:buFont typeface="Wingdings" panose="05000000000000000000" pitchFamily="2" charset="2"/>
+              <a:buChar char="Ø"/>
+            </a:pPr>
+            <a:r>
+              <a:rPr lang="en-US" dirty="0"/>
+              <a:t>Change over time?</a:t>
+            </a:r>
+          </a:p>
+          <a:p>
+            <a:pPr>
+              <a:buFont typeface="Wingdings" panose="05000000000000000000" pitchFamily="2" charset="2"/>
+              <a:buChar char="Ø"/>
+            </a:pPr>
+            <a:endParaRPr lang="en-US" dirty="0"/>
+          </a:p>
+          <a:p>
+            <a:pPr>
+              <a:buFont typeface="Wingdings" panose="05000000000000000000" pitchFamily="2" charset="2"/>
+              <a:buChar char="Ø"/>
+            </a:pPr>
+            <a:endParaRPr lang="en-AU" dirty="0"/>
+          </a:p>
+        </p:txBody>
+      </p:sp>
+      <p:sp>
+        <p:nvSpPr>
+          <p:cNvPr id="16" name="Text Placeholder 15">
+            <a:extLst>
+              <a:ext uri="{FF2B5EF4-FFF2-40B4-BE49-F238E27FC236}">
+                <a16:creationId xmlns:a16="http://schemas.microsoft.com/office/drawing/2014/main" id="{08F1A80E-02D1-C542-21BD-8EF82BCA9363}"/>
+              </a:ext>
+            </a:extLst>
+          </p:cNvPr>
+          <p:cNvSpPr>
+            <a:spLocks noGrp="1"/>
+          </p:cNvSpPr>
+          <p:nvPr>
+            <p:ph type="body" sz="quarter" idx="3"/>
+          </p:nvPr>
+        </p:nvSpPr>
+        <p:spPr>
+          <a:xfrm>
+            <a:off x="6607967" y="2746597"/>
+            <a:ext cx="4895056" cy="576262"/>
+          </a:xfrm>
+        </p:spPr>
+        <p:txBody>
+          <a:bodyPr/>
+          <a:lstStyle/>
+          <a:p>
+            <a:r>
+              <a:rPr lang="en-US" dirty="0"/>
+              <a:t>Major Contributors?</a:t>
+            </a:r>
+          </a:p>
+        </p:txBody>
+      </p:sp>
+      <p:sp>
+        <p:nvSpPr>
+          <p:cNvPr id="17" name="Content Placeholder 16">
+            <a:extLst>
+              <a:ext uri="{FF2B5EF4-FFF2-40B4-BE49-F238E27FC236}">
+                <a16:creationId xmlns:a16="http://schemas.microsoft.com/office/drawing/2014/main" id="{400F3555-92B0-41A4-B265-726493F82DD2}"/>
+              </a:ext>
+            </a:extLst>
+          </p:cNvPr>
+          <p:cNvSpPr>
+            <a:spLocks noGrp="1"/>
+          </p:cNvSpPr>
+          <p:nvPr>
+            <p:ph sz="quarter" idx="4"/>
+          </p:nvPr>
+        </p:nvSpPr>
+        <p:spPr/>
+        <p:txBody>
+          <a:bodyPr/>
+          <a:lstStyle/>
+          <a:p>
+            <a:pPr>
+              <a:buFont typeface="Wingdings" panose="05000000000000000000" pitchFamily="2" charset="2"/>
+              <a:buChar char="Ø"/>
+            </a:pPr>
+            <a:r>
+              <a:rPr lang="en-US" dirty="0"/>
+              <a:t>Economic conditions</a:t>
+            </a:r>
+          </a:p>
+          <a:p>
+            <a:pPr lvl="1">
+              <a:buFont typeface="Wingdings" panose="05000000000000000000" pitchFamily="2" charset="2"/>
+              <a:buChar char="§"/>
+            </a:pPr>
+            <a:r>
+              <a:rPr lang="en-US" dirty="0"/>
+              <a:t>Average income</a:t>
+            </a:r>
+          </a:p>
+          <a:p>
+            <a:pPr lvl="1">
+              <a:buFont typeface="Wingdings" panose="05000000000000000000" pitchFamily="2" charset="2"/>
+              <a:buChar char="§"/>
+            </a:pPr>
+            <a:r>
+              <a:rPr lang="en-US" dirty="0"/>
+              <a:t>GDP vs Population</a:t>
+            </a:r>
+          </a:p>
+          <a:p>
+            <a:pPr>
+              <a:buFont typeface="Wingdings" panose="05000000000000000000" pitchFamily="2" charset="2"/>
+              <a:buChar char="Ø"/>
+            </a:pPr>
+            <a:r>
+              <a:rPr lang="en-US" dirty="0"/>
+              <a:t>Country </a:t>
+            </a:r>
+            <a:r>
+              <a:rPr lang="en-US" dirty="0" err="1"/>
+              <a:t>categorisation</a:t>
+            </a:r>
+            <a:r>
+              <a:rPr lang="en-US" dirty="0"/>
+              <a:t> </a:t>
+            </a:r>
+          </a:p>
+          <a:p>
+            <a:pPr lvl="1">
+              <a:buFont typeface="Wingdings" panose="05000000000000000000" pitchFamily="2" charset="2"/>
+              <a:buChar char="§"/>
+            </a:pPr>
+            <a:r>
+              <a:rPr lang="en-US" dirty="0"/>
+              <a:t>Better or worse?</a:t>
+            </a:r>
+          </a:p>
+          <a:p>
+            <a:pPr>
+              <a:buFont typeface="Wingdings" panose="05000000000000000000" pitchFamily="2" charset="2"/>
+              <a:buChar char="§"/>
+            </a:pPr>
+            <a:endParaRPr lang="en-AU" dirty="0"/>
+          </a:p>
+        </p:txBody>
+      </p:sp>
     </p:spTree>
     <p:extLst>
       <p:ext uri="{BB962C8B-B14F-4D97-AF65-F5344CB8AC3E}">
-        <p14:creationId xmlns:p14="http://schemas.microsoft.com/office/powerpoint/2010/main" val="1621679698"/>
+        <p14:creationId xmlns:p14="http://schemas.microsoft.com/office/powerpoint/2010/main" val="2694325006"/>
       </p:ext>
     </p:extLst>
   </p:cSld>
@@ -7021,7 +7201,7 @@
 </p:sld>
 </file>
 
-<file path=ppt/slides/slide5.xml><?xml version="1.0" encoding="utf-8"?>
+<file path=ppt/slides/slide4.xml><?xml version="1.0" encoding="utf-8"?>
 <p:sld xmlns:a="http://schemas.openxmlformats.org/drawingml/2006/main" xmlns:r="http://schemas.openxmlformats.org/officeDocument/2006/relationships" xmlns:p="http://schemas.openxmlformats.org/presentationml/2006/main">
   <p:cSld>
     <p:spTree>
@@ -7040,10 +7220,10 @@
       </p:grpSpPr>
       <p:sp>
         <p:nvSpPr>
-          <p:cNvPr id="2" name="Title 1">
+          <p:cNvPr id="4" name="Title 3">
             <a:extLst>
               <a:ext uri="{FF2B5EF4-FFF2-40B4-BE49-F238E27FC236}">
-                <a16:creationId xmlns:a16="http://schemas.microsoft.com/office/drawing/2014/main" id="{1099A8FC-2303-8D10-E993-989A45A4E2A9}"/>
+                <a16:creationId xmlns:a16="http://schemas.microsoft.com/office/drawing/2014/main" id="{A447B10E-53B0-0B57-85F1-AF093CB4E140}"/>
               </a:ext>
             </a:extLst>
           </p:cNvPr>
@@ -7054,46 +7234,539 @@
             <p:ph type="title"/>
           </p:nvPr>
         </p:nvSpPr>
-        <p:spPr/>
-        <p:txBody>
-          <a:bodyPr/>
+        <p:spPr>
+          <a:xfrm>
+            <a:off x="1895025" y="1288121"/>
+            <a:ext cx="4102661" cy="1702932"/>
+          </a:xfrm>
+        </p:spPr>
+        <p:txBody>
+          <a:bodyPr>
+            <a:noAutofit/>
+          </a:bodyPr>
           <a:lstStyle/>
           <a:p>
-            <a:endParaRPr lang="en-AU"/>
-          </a:p>
-        </p:txBody>
-      </p:sp>
-      <p:sp>
-        <p:nvSpPr>
-          <p:cNvPr id="3" name="Content Placeholder 2">
+            <a:r>
+              <a:rPr lang="en-US" sz="3200" dirty="0">
+                <a:ln w="0">
+                  <a:solidFill>
+                    <a:schemeClr val="tx1"/>
+                  </a:solidFill>
+                </a:ln>
+                <a:solidFill>
+                  <a:schemeClr val="accent1"/>
+                </a:solidFill>
+                <a:effectLst>
+                  <a:outerShdw blurRad="38100" dist="25400" dir="5400000" algn="ctr" rotWithShape="0">
+                    <a:srgbClr val="6E747A">
+                      <a:alpha val="43000"/>
+                    </a:srgbClr>
+                  </a:outerShdw>
+                </a:effectLst>
+              </a:rPr>
+              <a:t>Countries classified into three categories:</a:t>
+            </a:r>
+            <a:br>
+              <a:rPr lang="en-US" sz="3200" dirty="0">
+                <a:ln w="0">
+                  <a:solidFill>
+                    <a:schemeClr val="tx1"/>
+                  </a:solidFill>
+                </a:ln>
+                <a:solidFill>
+                  <a:schemeClr val="accent1"/>
+                </a:solidFill>
+                <a:effectLst>
+                  <a:outerShdw blurRad="38100" dist="25400" dir="5400000" algn="ctr" rotWithShape="0">
+                    <a:srgbClr val="6E747A">
+                      <a:alpha val="43000"/>
+                    </a:srgbClr>
+                  </a:outerShdw>
+                </a:effectLst>
+              </a:rPr>
+            </a:br>
+            <a:endParaRPr lang="en-AU" sz="3200" dirty="0">
+              <a:ln w="0">
+                <a:solidFill>
+                  <a:schemeClr val="tx1"/>
+                </a:solidFill>
+              </a:ln>
+              <a:solidFill>
+                <a:schemeClr val="accent1"/>
+              </a:solidFill>
+              <a:effectLst>
+                <a:outerShdw blurRad="38100" dist="25400" dir="5400000" algn="ctr" rotWithShape="0">
+                  <a:srgbClr val="6E747A">
+                    <a:alpha val="43000"/>
+                  </a:srgbClr>
+                </a:outerShdw>
+              </a:effectLst>
+            </a:endParaRPr>
+          </a:p>
+        </p:txBody>
+      </p:sp>
+      <p:graphicFrame>
+        <p:nvGraphicFramePr>
+          <p:cNvPr id="13" name="Content Placeholder 12">
             <a:extLst>
               <a:ext uri="{FF2B5EF4-FFF2-40B4-BE49-F238E27FC236}">
-                <a16:creationId xmlns:a16="http://schemas.microsoft.com/office/drawing/2014/main" id="{387A8AFE-EB1F-93F4-10D2-D7394E98459F}"/>
+                <a16:creationId xmlns:a16="http://schemas.microsoft.com/office/drawing/2014/main" id="{9145005B-82AD-8AA3-5878-B872D4E08B97}"/>
               </a:ext>
             </a:extLst>
           </p:cNvPr>
-          <p:cNvSpPr>
-            <a:spLocks noGrp="1"/>
-          </p:cNvSpPr>
+          <p:cNvGraphicFramePr>
+            <a:graphicFrameLocks noGrp="1"/>
+          </p:cNvGraphicFramePr>
           <p:nvPr>
             <p:ph idx="1"/>
-          </p:nvPr>
-        </p:nvSpPr>
-        <p:spPr/>
-        <p:txBody>
-          <a:bodyPr/>
-          <a:lstStyle/>
-          <a:p>
-            <a:endParaRPr lang="en-AU"/>
-          </a:p>
-        </p:txBody>
-      </p:sp>
-      <p:sp>
-        <p:nvSpPr>
-          <p:cNvPr id="4" name="Text Placeholder 3">
+            <p:extLst>
+              <p:ext uri="{D42A27DB-BD31-4B8C-83A1-F6EECF244321}">
+                <p14:modId xmlns:p14="http://schemas.microsoft.com/office/powerpoint/2010/main" val="1681065864"/>
+              </p:ext>
+            </p:extLst>
+          </p:nvPr>
+        </p:nvGraphicFramePr>
+        <p:xfrm>
+          <a:off x="1082840" y="3375319"/>
+          <a:ext cx="5727033" cy="2194560"/>
+        </p:xfrm>
+        <a:graphic>
+          <a:graphicData uri="http://schemas.openxmlformats.org/drawingml/2006/table">
+            <a:tbl>
+              <a:tblPr firstRow="1" bandRow="1">
+                <a:tableStyleId>{5C22544A-7EE6-4342-B048-85BDC9FD1C3A}</a:tableStyleId>
+              </a:tblPr>
+              <a:tblGrid>
+                <a:gridCol w="1909011">
+                  <a:extLst>
+                    <a:ext uri="{9D8B030D-6E8A-4147-A177-3AD203B41FA5}">
+                      <a16:colId xmlns:a16="http://schemas.microsoft.com/office/drawing/2014/main" val="1217594041"/>
+                    </a:ext>
+                  </a:extLst>
+                </a:gridCol>
+                <a:gridCol w="1909011">
+                  <a:extLst>
+                    <a:ext uri="{9D8B030D-6E8A-4147-A177-3AD203B41FA5}">
+                      <a16:colId xmlns:a16="http://schemas.microsoft.com/office/drawing/2014/main" val="1548029660"/>
+                    </a:ext>
+                  </a:extLst>
+                </a:gridCol>
+                <a:gridCol w="1909011">
+                  <a:extLst>
+                    <a:ext uri="{9D8B030D-6E8A-4147-A177-3AD203B41FA5}">
+                      <a16:colId xmlns:a16="http://schemas.microsoft.com/office/drawing/2014/main" val="1344721005"/>
+                    </a:ext>
+                  </a:extLst>
+                </a:gridCol>
+              </a:tblGrid>
+              <a:tr h="213258">
+                <a:tc>
+                  <a:txBody>
+                    <a:bodyPr/>
+                    <a:lstStyle/>
+                    <a:p>
+                      <a:r>
+                        <a:rPr lang="en-US" dirty="0">
+                          <a:solidFill>
+                            <a:schemeClr val="tx1"/>
+                          </a:solidFill>
+                        </a:rPr>
+                        <a:t>Developed</a:t>
+                      </a:r>
+                      <a:endParaRPr lang="en-AU" dirty="0">
+                        <a:solidFill>
+                          <a:schemeClr val="tx1"/>
+                        </a:solidFill>
+                      </a:endParaRPr>
+                    </a:p>
+                  </a:txBody>
+                  <a:tcPr>
+                    <a:gradFill flip="none" rotWithShape="1">
+                      <a:gsLst>
+                        <a:gs pos="0">
+                          <a:schemeClr val="accent5">
+                            <a:lumMod val="40000"/>
+                            <a:lumOff val="60000"/>
+                            <a:shade val="30000"/>
+                            <a:satMod val="115000"/>
+                          </a:schemeClr>
+                        </a:gs>
+                        <a:gs pos="50000">
+                          <a:schemeClr val="accent5">
+                            <a:lumMod val="40000"/>
+                            <a:lumOff val="60000"/>
+                            <a:shade val="67500"/>
+                            <a:satMod val="115000"/>
+                          </a:schemeClr>
+                        </a:gs>
+                        <a:gs pos="100000">
+                          <a:schemeClr val="accent5">
+                            <a:lumMod val="40000"/>
+                            <a:lumOff val="60000"/>
+                            <a:shade val="100000"/>
+                            <a:satMod val="115000"/>
+                          </a:schemeClr>
+                        </a:gs>
+                      </a:gsLst>
+                      <a:lin ang="18900000" scaled="1"/>
+                      <a:tileRect/>
+                    </a:gradFill>
+                  </a:tcPr>
+                </a:tc>
+                <a:tc>
+                  <a:txBody>
+                    <a:bodyPr/>
+                    <a:lstStyle/>
+                    <a:p>
+                      <a:r>
+                        <a:rPr lang="en-US" dirty="0">
+                          <a:solidFill>
+                            <a:sysClr val="windowText" lastClr="000000"/>
+                          </a:solidFill>
+                        </a:rPr>
+                        <a:t>Developing</a:t>
+                      </a:r>
+                      <a:endParaRPr lang="en-AU" dirty="0">
+                        <a:solidFill>
+                          <a:sysClr val="windowText" lastClr="000000"/>
+                        </a:solidFill>
+                      </a:endParaRPr>
+                    </a:p>
+                  </a:txBody>
+                  <a:tcPr>
+                    <a:gradFill flip="none" rotWithShape="1">
+                      <a:gsLst>
+                        <a:gs pos="0">
+                          <a:srgbClr val="0070C0">
+                            <a:tint val="66000"/>
+                            <a:satMod val="160000"/>
+                          </a:srgbClr>
+                        </a:gs>
+                        <a:gs pos="50000">
+                          <a:srgbClr val="0070C0">
+                            <a:tint val="44500"/>
+                            <a:satMod val="160000"/>
+                          </a:srgbClr>
+                        </a:gs>
+                        <a:gs pos="100000">
+                          <a:srgbClr val="0070C0">
+                            <a:tint val="23500"/>
+                            <a:satMod val="160000"/>
+                          </a:srgbClr>
+                        </a:gs>
+                      </a:gsLst>
+                      <a:lin ang="18900000" scaled="1"/>
+                      <a:tileRect/>
+                    </a:gradFill>
+                  </a:tcPr>
+                </a:tc>
+                <a:tc>
+                  <a:txBody>
+                    <a:bodyPr/>
+                    <a:lstStyle/>
+                    <a:p>
+                      <a:r>
+                        <a:rPr lang="en-US" dirty="0">
+                          <a:solidFill>
+                            <a:sysClr val="windowText" lastClr="000000"/>
+                          </a:solidFill>
+                        </a:rPr>
+                        <a:t>Underdeveloped</a:t>
+                      </a:r>
+                      <a:endParaRPr lang="en-AU" dirty="0">
+                        <a:solidFill>
+                          <a:sysClr val="windowText" lastClr="000000"/>
+                        </a:solidFill>
+                      </a:endParaRPr>
+                    </a:p>
+                  </a:txBody>
+                  <a:tcPr>
+                    <a:gradFill flip="none" rotWithShape="1">
+                      <a:gsLst>
+                        <a:gs pos="0">
+                          <a:srgbClr val="92D050">
+                            <a:shade val="30000"/>
+                            <a:satMod val="115000"/>
+                          </a:srgbClr>
+                        </a:gs>
+                        <a:gs pos="50000">
+                          <a:srgbClr val="92D050">
+                            <a:shade val="67500"/>
+                            <a:satMod val="115000"/>
+                          </a:srgbClr>
+                        </a:gs>
+                        <a:gs pos="100000">
+                          <a:srgbClr val="92D050">
+                            <a:shade val="100000"/>
+                            <a:satMod val="115000"/>
+                          </a:srgbClr>
+                        </a:gs>
+                      </a:gsLst>
+                      <a:lin ang="18900000" scaled="1"/>
+                      <a:tileRect/>
+                    </a:gradFill>
+                  </a:tcPr>
+                </a:tc>
+                <a:extLst>
+                  <a:ext uri="{0D108BD9-81ED-4DB2-BD59-A6C34878D82A}">
+                    <a16:rowId xmlns:a16="http://schemas.microsoft.com/office/drawing/2014/main" val="2111374699"/>
+                  </a:ext>
+                </a:extLst>
+              </a:tr>
+              <a:tr h="362819">
+                <a:tc>
+                  <a:txBody>
+                    <a:bodyPr/>
+                    <a:lstStyle/>
+                    <a:p>
+                      <a:r>
+                        <a:rPr lang="en-US" dirty="0"/>
+                        <a:t>Australia</a:t>
+                      </a:r>
+                    </a:p>
+                  </a:txBody>
+                  <a:tcPr/>
+                </a:tc>
+                <a:tc>
+                  <a:txBody>
+                    <a:bodyPr/>
+                    <a:lstStyle/>
+                    <a:p>
+                      <a:r>
+                        <a:rPr lang="en-US" dirty="0"/>
+                        <a:t>India</a:t>
+                      </a:r>
+                      <a:endParaRPr lang="en-AU" dirty="0"/>
+                    </a:p>
+                  </a:txBody>
+                  <a:tcPr/>
+                </a:tc>
+                <a:tc>
+                  <a:txBody>
+                    <a:bodyPr/>
+                    <a:lstStyle/>
+                    <a:p>
+                      <a:r>
+                        <a:rPr lang="en-US" dirty="0"/>
+                        <a:t>Bangladesh</a:t>
+                      </a:r>
+                      <a:endParaRPr lang="en-AU" dirty="0"/>
+                    </a:p>
+                  </a:txBody>
+                  <a:tcPr/>
+                </a:tc>
+                <a:extLst>
+                  <a:ext uri="{0D108BD9-81ED-4DB2-BD59-A6C34878D82A}">
+                    <a16:rowId xmlns:a16="http://schemas.microsoft.com/office/drawing/2014/main" val="1642590269"/>
+                  </a:ext>
+                </a:extLst>
+              </a:tr>
+              <a:tr h="362819">
+                <a:tc>
+                  <a:txBody>
+                    <a:bodyPr/>
+                    <a:lstStyle/>
+                    <a:p>
+                      <a:r>
+                        <a:rPr lang="en-US" dirty="0"/>
+                        <a:t>Sweden</a:t>
+                      </a:r>
+                      <a:endParaRPr lang="en-AU" dirty="0"/>
+                    </a:p>
+                  </a:txBody>
+                  <a:tcPr/>
+                </a:tc>
+                <a:tc>
+                  <a:txBody>
+                    <a:bodyPr/>
+                    <a:lstStyle/>
+                    <a:p>
+                      <a:r>
+                        <a:rPr lang="en-US" dirty="0"/>
+                        <a:t>Greece</a:t>
+                      </a:r>
+                      <a:endParaRPr lang="en-AU" dirty="0"/>
+                    </a:p>
+                  </a:txBody>
+                  <a:tcPr/>
+                </a:tc>
+                <a:tc>
+                  <a:txBody>
+                    <a:bodyPr/>
+                    <a:lstStyle/>
+                    <a:p>
+                      <a:r>
+                        <a:rPr lang="en-US" dirty="0"/>
+                        <a:t>Afghanistan</a:t>
+                      </a:r>
+                      <a:endParaRPr lang="en-AU" dirty="0"/>
+                    </a:p>
+                  </a:txBody>
+                  <a:tcPr/>
+                </a:tc>
+                <a:extLst>
+                  <a:ext uri="{0D108BD9-81ED-4DB2-BD59-A6C34878D82A}">
+                    <a16:rowId xmlns:a16="http://schemas.microsoft.com/office/drawing/2014/main" val="3237284897"/>
+                  </a:ext>
+                </a:extLst>
+              </a:tr>
+              <a:tr h="362819">
+                <a:tc>
+                  <a:txBody>
+                    <a:bodyPr/>
+                    <a:lstStyle/>
+                    <a:p>
+                      <a:r>
+                        <a:rPr lang="en-US" dirty="0"/>
+                        <a:t>Japan</a:t>
+                      </a:r>
+                      <a:endParaRPr lang="en-AU" dirty="0"/>
+                    </a:p>
+                  </a:txBody>
+                  <a:tcPr/>
+                </a:tc>
+                <a:tc>
+                  <a:txBody>
+                    <a:bodyPr/>
+                    <a:lstStyle/>
+                    <a:p>
+                      <a:r>
+                        <a:rPr lang="en-US" dirty="0"/>
+                        <a:t>Egypt</a:t>
+                      </a:r>
+                      <a:endParaRPr lang="en-AU" dirty="0"/>
+                    </a:p>
+                  </a:txBody>
+                  <a:tcPr/>
+                </a:tc>
+                <a:tc>
+                  <a:txBody>
+                    <a:bodyPr/>
+                    <a:lstStyle/>
+                    <a:p>
+                      <a:r>
+                        <a:rPr lang="en-US" dirty="0"/>
+                        <a:t>Senegal</a:t>
+                      </a:r>
+                      <a:endParaRPr lang="en-AU" dirty="0"/>
+                    </a:p>
+                  </a:txBody>
+                  <a:tcPr/>
+                </a:tc>
+                <a:extLst>
+                  <a:ext uri="{0D108BD9-81ED-4DB2-BD59-A6C34878D82A}">
+                    <a16:rowId xmlns:a16="http://schemas.microsoft.com/office/drawing/2014/main" val="1603244518"/>
+                  </a:ext>
+                </a:extLst>
+              </a:tr>
+              <a:tr h="362819">
+                <a:tc>
+                  <a:txBody>
+                    <a:bodyPr/>
+                    <a:lstStyle/>
+                    <a:p>
+                      <a:r>
+                        <a:rPr lang="en-US" dirty="0"/>
+                        <a:t>Switzerland</a:t>
+                      </a:r>
+                      <a:endParaRPr lang="en-AU" dirty="0"/>
+                    </a:p>
+                  </a:txBody>
+                  <a:tcPr/>
+                </a:tc>
+                <a:tc>
+                  <a:txBody>
+                    <a:bodyPr/>
+                    <a:lstStyle/>
+                    <a:p>
+                      <a:r>
+                        <a:rPr lang="en-US" dirty="0"/>
+                        <a:t>Brazil</a:t>
+                      </a:r>
+                      <a:endParaRPr lang="en-AU" dirty="0"/>
+                    </a:p>
+                  </a:txBody>
+                  <a:tcPr/>
+                </a:tc>
+                <a:tc>
+                  <a:txBody>
+                    <a:bodyPr/>
+                    <a:lstStyle/>
+                    <a:p>
+                      <a:r>
+                        <a:rPr lang="en-US" dirty="0"/>
+                        <a:t>Ethiopia</a:t>
+                      </a:r>
+                      <a:endParaRPr lang="en-AU" dirty="0"/>
+                    </a:p>
+                  </a:txBody>
+                  <a:tcPr/>
+                </a:tc>
+                <a:extLst>
+                  <a:ext uri="{0D108BD9-81ED-4DB2-BD59-A6C34878D82A}">
+                    <a16:rowId xmlns:a16="http://schemas.microsoft.com/office/drawing/2014/main" val="4249757131"/>
+                  </a:ext>
+                </a:extLst>
+              </a:tr>
+              <a:tr h="362819">
+                <a:tc>
+                  <a:txBody>
+                    <a:bodyPr/>
+                    <a:lstStyle/>
+                    <a:p>
+                      <a:r>
+                        <a:rPr lang="en-US" dirty="0"/>
+                        <a:t>USA</a:t>
+                      </a:r>
+                      <a:endParaRPr lang="en-AU" dirty="0"/>
+                    </a:p>
+                  </a:txBody>
+                  <a:tcPr/>
+                </a:tc>
+                <a:tc>
+                  <a:txBody>
+                    <a:bodyPr/>
+                    <a:lstStyle/>
+                    <a:p>
+                      <a:r>
+                        <a:rPr lang="en-US" dirty="0"/>
+                        <a:t>South Africa</a:t>
+                      </a:r>
+                      <a:endParaRPr lang="en-AU" dirty="0"/>
+                    </a:p>
+                  </a:txBody>
+                  <a:tcPr/>
+                </a:tc>
+                <a:tc>
+                  <a:txBody>
+                    <a:bodyPr/>
+                    <a:lstStyle/>
+                    <a:p>
+                      <a:r>
+                        <a:rPr lang="en-US" dirty="0"/>
+                        <a:t>Cambodia</a:t>
+                      </a:r>
+                      <a:endParaRPr lang="en-AU" dirty="0"/>
+                    </a:p>
+                  </a:txBody>
+                  <a:tcPr/>
+                </a:tc>
+                <a:extLst>
+                  <a:ext uri="{0D108BD9-81ED-4DB2-BD59-A6C34878D82A}">
+                    <a16:rowId xmlns:a16="http://schemas.microsoft.com/office/drawing/2014/main" val="3678473552"/>
+                  </a:ext>
+                </a:extLst>
+              </a:tr>
+            </a:tbl>
+          </a:graphicData>
+        </a:graphic>
+      </p:graphicFrame>
+      <p:sp>
+        <p:nvSpPr>
+          <p:cNvPr id="15" name="Text Placeholder 14">
             <a:extLst>
               <a:ext uri="{FF2B5EF4-FFF2-40B4-BE49-F238E27FC236}">
-                <a16:creationId xmlns:a16="http://schemas.microsoft.com/office/drawing/2014/main" id="{51C168F2-721D-79B4-D6AC-B1B9B534AD9E}"/>
+                <a16:creationId xmlns:a16="http://schemas.microsoft.com/office/drawing/2014/main" id="{8B168662-6C6A-A037-2932-75E436B36135}"/>
               </a:ext>
             </a:extLst>
           </p:cNvPr>
@@ -7104,19 +7777,199 @@
             <p:ph type="body" sz="half" idx="2"/>
           </p:nvPr>
         </p:nvSpPr>
-        <p:spPr/>
+        <p:spPr>
+          <a:xfrm>
+            <a:off x="7062537" y="2939717"/>
+            <a:ext cx="4046623" cy="2708648"/>
+          </a:xfrm>
+        </p:spPr>
         <p:txBody>
           <a:bodyPr/>
           <a:lstStyle/>
           <a:p>
-            <a:endParaRPr lang="en-AU"/>
+            <a:pPr marL="285750" indent="-285750" algn="l">
+              <a:buFont typeface="Wingdings" panose="05000000000000000000" pitchFamily="2" charset="2"/>
+              <a:buChar char="Ø"/>
+            </a:pPr>
+            <a:r>
+              <a:rPr lang="en-US" dirty="0"/>
+              <a:t> Annual GDP ($USD)</a:t>
+            </a:r>
+          </a:p>
+          <a:p>
+            <a:pPr marL="285750" indent="-285750" algn="l">
+              <a:buFont typeface="Wingdings" panose="05000000000000000000" pitchFamily="2" charset="2"/>
+              <a:buChar char="Ø"/>
+            </a:pPr>
+            <a:r>
+              <a:rPr lang="en-US" dirty="0"/>
+              <a:t>Population Size</a:t>
+            </a:r>
+          </a:p>
+          <a:p>
+            <a:pPr marL="285750" indent="-285750" algn="l">
+              <a:buFont typeface="Wingdings" panose="05000000000000000000" pitchFamily="2" charset="2"/>
+              <a:buChar char="Ø"/>
+            </a:pPr>
+            <a:r>
+              <a:rPr lang="en-US" dirty="0"/>
+              <a:t>Average Daily Income ($USD)</a:t>
+            </a:r>
+          </a:p>
+          <a:p>
+            <a:pPr marL="285750" indent="-285750" algn="l">
+              <a:buFont typeface="Wingdings" panose="05000000000000000000" pitchFamily="2" charset="2"/>
+              <a:buChar char="Ø"/>
+            </a:pPr>
+            <a:r>
+              <a:rPr lang="en-AU" dirty="0"/>
+              <a:t>Total CO2 Emissions (millions of tonnes)</a:t>
+            </a:r>
+          </a:p>
+          <a:p>
+            <a:pPr marL="285750" indent="-285750" algn="l">
+              <a:buFont typeface="Wingdings" panose="05000000000000000000" pitchFamily="2" charset="2"/>
+              <a:buChar char="Ø"/>
+            </a:pPr>
+            <a:r>
+              <a:rPr lang="en-AU" dirty="0"/>
+              <a:t>Annual CO2 Emissions Per Capita (tonnes)</a:t>
+            </a:r>
+          </a:p>
+        </p:txBody>
+      </p:sp>
+      <p:sp>
+        <p:nvSpPr>
+          <p:cNvPr id="17" name="Title 3">
+            <a:extLst>
+              <a:ext uri="{FF2B5EF4-FFF2-40B4-BE49-F238E27FC236}">
+                <a16:creationId xmlns:a16="http://schemas.microsoft.com/office/drawing/2014/main" id="{434780C7-F6B6-88DE-4A75-E655DB38B046}"/>
+              </a:ext>
+            </a:extLst>
+          </p:cNvPr>
+          <p:cNvSpPr txBox="1">
+            <a:spLocks/>
+          </p:cNvSpPr>
+          <p:nvPr/>
+        </p:nvSpPr>
+        <p:spPr>
+          <a:xfrm>
+            <a:off x="7062537" y="1014664"/>
+            <a:ext cx="4050535" cy="1467856"/>
+          </a:xfrm>
+          <a:prstGeom prst="rect">
+            <a:avLst/>
+          </a:prstGeom>
+          <a:effectLst/>
+        </p:spPr>
+        <p:txBody>
+          <a:bodyPr vert="horz" lIns="91440" tIns="45720" rIns="91440" bIns="45720" rtlCol="0" anchor="b">
+            <a:normAutofit/>
+          </a:bodyPr>
+          <a:lstStyle>
+            <a:lvl1pPr algn="ctr" defTabSz="457200" rtl="0" eaLnBrk="1" latinLnBrk="0" hangingPunct="1">
+              <a:spcBef>
+                <a:spcPct val="0"/>
+              </a:spcBef>
+              <a:buNone/>
+              <a:defRPr sz="2400" b="0" kern="1200" cap="none">
+                <a:ln w="3175" cmpd="sng">
+                  <a:noFill/>
+                </a:ln>
+                <a:solidFill>
+                  <a:schemeClr val="tx1"/>
+                </a:solidFill>
+                <a:effectLst/>
+                <a:latin typeface="+mj-lt"/>
+                <a:ea typeface="+mj-ea"/>
+                <a:cs typeface="+mj-cs"/>
+              </a:defRPr>
+            </a:lvl1pPr>
+            <a:lvl2pPr eaLnBrk="1" hangingPunct="1">
+              <a:defRPr>
+                <a:solidFill>
+                  <a:schemeClr val="tx2"/>
+                </a:solidFill>
+              </a:defRPr>
+            </a:lvl2pPr>
+            <a:lvl3pPr eaLnBrk="1" hangingPunct="1">
+              <a:defRPr>
+                <a:solidFill>
+                  <a:schemeClr val="tx2"/>
+                </a:solidFill>
+              </a:defRPr>
+            </a:lvl3pPr>
+            <a:lvl4pPr eaLnBrk="1" hangingPunct="1">
+              <a:defRPr>
+                <a:solidFill>
+                  <a:schemeClr val="tx2"/>
+                </a:solidFill>
+              </a:defRPr>
+            </a:lvl4pPr>
+            <a:lvl5pPr eaLnBrk="1" hangingPunct="1">
+              <a:defRPr>
+                <a:solidFill>
+                  <a:schemeClr val="tx2"/>
+                </a:solidFill>
+              </a:defRPr>
+            </a:lvl5pPr>
+            <a:lvl6pPr eaLnBrk="1" hangingPunct="1">
+              <a:defRPr>
+                <a:solidFill>
+                  <a:schemeClr val="tx2"/>
+                </a:solidFill>
+              </a:defRPr>
+            </a:lvl6pPr>
+            <a:lvl7pPr eaLnBrk="1" hangingPunct="1">
+              <a:defRPr>
+                <a:solidFill>
+                  <a:schemeClr val="tx2"/>
+                </a:solidFill>
+              </a:defRPr>
+            </a:lvl7pPr>
+            <a:lvl8pPr eaLnBrk="1" hangingPunct="1">
+              <a:defRPr>
+                <a:solidFill>
+                  <a:schemeClr val="tx2"/>
+                </a:solidFill>
+              </a:defRPr>
+            </a:lvl8pPr>
+            <a:lvl9pPr eaLnBrk="1" hangingPunct="1">
+              <a:defRPr>
+                <a:solidFill>
+                  <a:schemeClr val="tx2"/>
+                </a:solidFill>
+              </a:defRPr>
+            </a:lvl9pPr>
+          </a:lstStyle>
+          <a:p>
+            <a:r>
+              <a:rPr lang="en-US" sz="3200" dirty="0">
+                <a:ln w="3175">
+                  <a:solidFill>
+                    <a:schemeClr val="tx1"/>
+                  </a:solidFill>
+                </a:ln>
+                <a:solidFill>
+                  <a:schemeClr val="accent1"/>
+                </a:solidFill>
+                <a:effectLst>
+                  <a:outerShdw blurRad="38100" dist="25400" dir="5400000" algn="ctr" rotWithShape="0">
+                    <a:srgbClr val="6E747A">
+                      <a:alpha val="43000"/>
+                    </a:srgbClr>
+                  </a:outerShdw>
+                </a:effectLst>
+              </a:rPr>
+              <a:t>Economic &amp; Emission Markers:</a:t>
+            </a:r>
           </a:p>
         </p:txBody>
       </p:sp>
     </p:spTree>
     <p:extLst>
       <p:ext uri="{BB962C8B-B14F-4D97-AF65-F5344CB8AC3E}">
-        <p14:creationId xmlns:p14="http://schemas.microsoft.com/office/powerpoint/2010/main" val="1821918453"/>
+        <p14:creationId xmlns:p14="http://schemas.microsoft.com/office/powerpoint/2010/main" val="1330347484"/>
       </p:ext>
     </p:extLst>
   </p:cSld>
@@ -7380,4 +8233,319 @@
     </a:ext>
   </a:extLst>
 </a:theme>
+</file>
+
+<file path=ppt/theme/theme2.xml><?xml version="1.0" encoding="utf-8"?>
+<a:theme xmlns:a="http://schemas.openxmlformats.org/drawingml/2006/main" name="Office Theme">
+  <a:themeElements>
+    <a:clrScheme name="Office">
+      <a:dk1>
+        <a:sysClr val="windowText" lastClr="000000"/>
+      </a:dk1>
+      <a:lt1>
+        <a:sysClr val="window" lastClr="FFFFFF"/>
+      </a:lt1>
+      <a:dk2>
+        <a:srgbClr val="0E2841"/>
+      </a:dk2>
+      <a:lt2>
+        <a:srgbClr val="E8E8E8"/>
+      </a:lt2>
+      <a:accent1>
+        <a:srgbClr val="156082"/>
+      </a:accent1>
+      <a:accent2>
+        <a:srgbClr val="E97132"/>
+      </a:accent2>
+      <a:accent3>
+        <a:srgbClr val="196B24"/>
+      </a:accent3>
+      <a:accent4>
+        <a:srgbClr val="0F9ED5"/>
+      </a:accent4>
+      <a:accent5>
+        <a:srgbClr val="A02B93"/>
+      </a:accent5>
+      <a:accent6>
+        <a:srgbClr val="4EA72E"/>
+      </a:accent6>
+      <a:hlink>
+        <a:srgbClr val="467886"/>
+      </a:hlink>
+      <a:folHlink>
+        <a:srgbClr val="96607D"/>
+      </a:folHlink>
+    </a:clrScheme>
+    <a:fontScheme name="Office">
+      <a:majorFont>
+        <a:latin typeface="Aptos Display" panose="02110004020202020204"/>
+        <a:ea typeface=""/>
+        <a:cs typeface=""/>
+        <a:font script="Jpan" typeface="游ゴシック Light"/>
+        <a:font script="Hang" typeface="맑은 고딕"/>
+        <a:font script="Hans" typeface="等线 Light"/>
+        <a:font script="Hant" typeface="新細明體"/>
+        <a:font script="Arab" typeface="Times New Roman"/>
+        <a:font script="Hebr" typeface="Times New Roman"/>
+        <a:font script="Thai" typeface="Angsana New"/>
+        <a:font script="Ethi" typeface="Nyala"/>
+        <a:font script="Beng" typeface="Vrinda"/>
+        <a:font script="Gujr" typeface="Shruti"/>
+        <a:font script="Khmr" typeface="MoolBoran"/>
+        <a:font script="Knda" typeface="Tunga"/>
+        <a:font script="Guru" typeface="Raavi"/>
+        <a:font script="Cans" typeface="Euphemia"/>
+        <a:font script="Cher" typeface="Plantagenet Cherokee"/>
+        <a:font script="Yiii" typeface="Microsoft Yi Baiti"/>
+        <a:font script="Tibt" typeface="Microsoft Himalaya"/>
+        <a:font script="Thaa" typeface="MV Boli"/>
+        <a:font script="Deva" typeface="Mangal"/>
+        <a:font script="Telu" typeface="Gautami"/>
+        <a:font script="Taml" typeface="Latha"/>
+        <a:font script="Syrc" typeface="Estrangelo Edessa"/>
+        <a:font script="Orya" typeface="Kalinga"/>
+        <a:font script="Mlym" typeface="Kartika"/>
+        <a:font script="Laoo" typeface="DokChampa"/>
+        <a:font script="Sinh" typeface="Iskoola Pota"/>
+        <a:font script="Mong" typeface="Mongolian Baiti"/>
+        <a:font script="Viet" typeface="Times New Roman"/>
+        <a:font script="Uigh" typeface="Microsoft Uighur"/>
+        <a:font script="Geor" typeface="Sylfaen"/>
+        <a:font script="Armn" typeface="Arial"/>
+        <a:font script="Bugi" typeface="Leelawadee UI"/>
+        <a:font script="Bopo" typeface="Microsoft JhengHei"/>
+        <a:font script="Java" typeface="Javanese Text"/>
+        <a:font script="Lisu" typeface="Segoe UI"/>
+        <a:font script="Mymr" typeface="Myanmar Text"/>
+        <a:font script="Nkoo" typeface="Ebrima"/>
+        <a:font script="Olck" typeface="Nirmala UI"/>
+        <a:font script="Osma" typeface="Ebrima"/>
+        <a:font script="Phag" typeface="Phagspa"/>
+        <a:font script="Syrn" typeface="Estrangelo Edessa"/>
+        <a:font script="Syrj" typeface="Estrangelo Edessa"/>
+        <a:font script="Syre" typeface="Estrangelo Edessa"/>
+        <a:font script="Sora" typeface="Nirmala UI"/>
+        <a:font script="Tale" typeface="Microsoft Tai Le"/>
+        <a:font script="Talu" typeface="Microsoft New Tai Lue"/>
+        <a:font script="Tfng" typeface="Ebrima"/>
+      </a:majorFont>
+      <a:minorFont>
+        <a:latin typeface="Aptos" panose="02110004020202020204"/>
+        <a:ea typeface=""/>
+        <a:cs typeface=""/>
+        <a:font script="Jpan" typeface="游ゴシック"/>
+        <a:font script="Hang" typeface="맑은 고딕"/>
+        <a:font script="Hans" typeface="等线"/>
+        <a:font script="Hant" typeface="新細明體"/>
+        <a:font script="Arab" typeface="Arial"/>
+        <a:font script="Hebr" typeface="Arial"/>
+        <a:font script="Thai" typeface="Cordia New"/>
+        <a:font script="Ethi" typeface="Nyala"/>
+        <a:font script="Beng" typeface="Vrinda"/>
+        <a:font script="Gujr" typeface="Shruti"/>
+        <a:font script="Khmr" typeface="DaunPenh"/>
+        <a:font script="Knda" typeface="Tunga"/>
+        <a:font script="Guru" typeface="Raavi"/>
+        <a:font script="Cans" typeface="Euphemia"/>
+        <a:font script="Cher" typeface="Plantagenet Cherokee"/>
+        <a:font script="Yiii" typeface="Microsoft Yi Baiti"/>
+        <a:font script="Tibt" typeface="Microsoft Himalaya"/>
+        <a:font script="Thaa" typeface="MV Boli"/>
+        <a:font script="Deva" typeface="Mangal"/>
+        <a:font script="Telu" typeface="Gautami"/>
+        <a:font script="Taml" typeface="Latha"/>
+        <a:font script="Syrc" typeface="Estrangelo Edessa"/>
+        <a:font script="Orya" typeface="Kalinga"/>
+        <a:font script="Mlym" typeface="Kartika"/>
+        <a:font script="Laoo" typeface="DokChampa"/>
+        <a:font script="Sinh" typeface="Iskoola Pota"/>
+        <a:font script="Mong" typeface="Mongolian Baiti"/>
+        <a:font script="Viet" typeface="Arial"/>
+        <a:font script="Uigh" typeface="Microsoft Uighur"/>
+        <a:font script="Geor" typeface="Sylfaen"/>
+        <a:font script="Armn" typeface="Arial"/>
+        <a:font script="Bugi" typeface="Leelawadee UI"/>
+        <a:font script="Bopo" typeface="Microsoft JhengHei"/>
+        <a:font script="Java" typeface="Javanese Text"/>
+        <a:font script="Lisu" typeface="Segoe UI"/>
+        <a:font script="Mymr" typeface="Myanmar Text"/>
+        <a:font script="Nkoo" typeface="Ebrima"/>
+        <a:font script="Olck" typeface="Nirmala UI"/>
+        <a:font script="Osma" typeface="Ebrima"/>
+        <a:font script="Phag" typeface="Phagspa"/>
+        <a:font script="Syrn" typeface="Estrangelo Edessa"/>
+        <a:font script="Syrj" typeface="Estrangelo Edessa"/>
+        <a:font script="Syre" typeface="Estrangelo Edessa"/>
+        <a:font script="Sora" typeface="Nirmala UI"/>
+        <a:font script="Tale" typeface="Microsoft Tai Le"/>
+        <a:font script="Talu" typeface="Microsoft New Tai Lue"/>
+        <a:font script="Tfng" typeface="Ebrima"/>
+      </a:minorFont>
+    </a:fontScheme>
+    <a:fmtScheme name="Office">
+      <a:fillStyleLst>
+        <a:solidFill>
+          <a:schemeClr val="phClr"/>
+        </a:solidFill>
+        <a:gradFill rotWithShape="1">
+          <a:gsLst>
+            <a:gs pos="0">
+              <a:schemeClr val="phClr">
+                <a:lumMod val="110000"/>
+                <a:satMod val="105000"/>
+                <a:tint val="67000"/>
+              </a:schemeClr>
+            </a:gs>
+            <a:gs pos="50000">
+              <a:schemeClr val="phClr">
+                <a:lumMod val="105000"/>
+                <a:satMod val="103000"/>
+                <a:tint val="73000"/>
+              </a:schemeClr>
+            </a:gs>
+            <a:gs pos="100000">
+              <a:schemeClr val="phClr">
+                <a:lumMod val="105000"/>
+                <a:satMod val="109000"/>
+                <a:tint val="81000"/>
+              </a:schemeClr>
+            </a:gs>
+          </a:gsLst>
+          <a:lin ang="5400000" scaled="0"/>
+        </a:gradFill>
+        <a:gradFill rotWithShape="1">
+          <a:gsLst>
+            <a:gs pos="0">
+              <a:schemeClr val="phClr">
+                <a:satMod val="103000"/>
+                <a:lumMod val="102000"/>
+                <a:tint val="94000"/>
+              </a:schemeClr>
+            </a:gs>
+            <a:gs pos="50000">
+              <a:schemeClr val="phClr">
+                <a:satMod val="110000"/>
+                <a:lumMod val="100000"/>
+                <a:shade val="100000"/>
+              </a:schemeClr>
+            </a:gs>
+            <a:gs pos="100000">
+              <a:schemeClr val="phClr">
+                <a:lumMod val="99000"/>
+                <a:satMod val="120000"/>
+                <a:shade val="78000"/>
+              </a:schemeClr>
+            </a:gs>
+          </a:gsLst>
+          <a:lin ang="5400000" scaled="0"/>
+        </a:gradFill>
+      </a:fillStyleLst>
+      <a:lnStyleLst>
+        <a:ln w="12700" cap="flat" cmpd="sng" algn="ctr">
+          <a:solidFill>
+            <a:schemeClr val="phClr"/>
+          </a:solidFill>
+          <a:prstDash val="solid"/>
+          <a:miter lim="800000"/>
+        </a:ln>
+        <a:ln w="19050" cap="flat" cmpd="sng" algn="ctr">
+          <a:solidFill>
+            <a:schemeClr val="phClr"/>
+          </a:solidFill>
+          <a:prstDash val="solid"/>
+          <a:miter lim="800000"/>
+        </a:ln>
+        <a:ln w="25400" cap="flat" cmpd="sng" algn="ctr">
+          <a:solidFill>
+            <a:schemeClr val="phClr"/>
+          </a:solidFill>
+          <a:prstDash val="solid"/>
+          <a:miter lim="800000"/>
+        </a:ln>
+      </a:lnStyleLst>
+      <a:effectStyleLst>
+        <a:effectStyle>
+          <a:effectLst/>
+        </a:effectStyle>
+        <a:effectStyle>
+          <a:effectLst/>
+        </a:effectStyle>
+        <a:effectStyle>
+          <a:effectLst>
+            <a:outerShdw blurRad="57150" dist="19050" dir="5400000" algn="ctr" rotWithShape="0">
+              <a:srgbClr val="000000">
+                <a:alpha val="63000"/>
+              </a:srgbClr>
+            </a:outerShdw>
+          </a:effectLst>
+        </a:effectStyle>
+      </a:effectStyleLst>
+      <a:bgFillStyleLst>
+        <a:solidFill>
+          <a:schemeClr val="phClr"/>
+        </a:solidFill>
+        <a:solidFill>
+          <a:schemeClr val="phClr">
+            <a:tint val="95000"/>
+            <a:satMod val="170000"/>
+          </a:schemeClr>
+        </a:solidFill>
+        <a:gradFill rotWithShape="1">
+          <a:gsLst>
+            <a:gs pos="0">
+              <a:schemeClr val="phClr">
+                <a:tint val="93000"/>
+                <a:satMod val="150000"/>
+                <a:shade val="98000"/>
+                <a:lumMod val="102000"/>
+              </a:schemeClr>
+            </a:gs>
+            <a:gs pos="50000">
+              <a:schemeClr val="phClr">
+                <a:tint val="98000"/>
+                <a:satMod val="130000"/>
+                <a:shade val="90000"/>
+                <a:lumMod val="103000"/>
+              </a:schemeClr>
+            </a:gs>
+            <a:gs pos="100000">
+              <a:schemeClr val="phClr">
+                <a:shade val="63000"/>
+                <a:satMod val="120000"/>
+              </a:schemeClr>
+            </a:gs>
+          </a:gsLst>
+          <a:lin ang="5400000" scaled="0"/>
+        </a:gradFill>
+      </a:bgFillStyleLst>
+    </a:fmtScheme>
+  </a:themeElements>
+  <a:objectDefaults>
+    <a:lnDef>
+      <a:spPr/>
+      <a:bodyPr/>
+      <a:lstStyle/>
+      <a:style>
+        <a:lnRef idx="2">
+          <a:schemeClr val="accent1"/>
+        </a:lnRef>
+        <a:fillRef idx="0">
+          <a:schemeClr val="accent1"/>
+        </a:fillRef>
+        <a:effectRef idx="1">
+          <a:schemeClr val="accent1"/>
+        </a:effectRef>
+        <a:fontRef idx="minor">
+          <a:schemeClr val="tx1"/>
+        </a:fontRef>
+      </a:style>
+    </a:lnDef>
+  </a:objectDefaults>
+  <a:extraClrSchemeLst/>
+  <a:extLst>
+    <a:ext uri="{05A4C25C-085E-4340-85A3-A5531E510DB2}">
+      <thm15:themeFamily xmlns:thm15="http://schemas.microsoft.com/office/thememl/2012/main" name="Office Theme" id="{2E142A2C-CD16-42D6-873A-C26D2A0506FA}" vid="{1BDDFF52-6CD6-40A5-AB3C-68EB2F1E4D0A}"/>
+    </a:ext>
+  </a:extLst>
+</a:theme>
 </file>
</xml_diff>

<commit_message>
updated readme & ppt
</commit_message>
<xml_diff>
--- a/Presentation.pptx
+++ b/Presentation.pptx
@@ -5,13 +5,15 @@
     <p:sldMasterId id="2147483804" r:id="rId1"/>
   </p:sldMasterIdLst>
   <p:notesMasterIdLst>
-    <p:notesMasterId r:id="rId6"/>
+    <p:notesMasterId r:id="rId8"/>
   </p:notesMasterIdLst>
   <p:sldIdLst>
     <p:sldId id="256" r:id="rId2"/>
     <p:sldId id="260" r:id="rId3"/>
-    <p:sldId id="259" r:id="rId4"/>
-    <p:sldId id="258" r:id="rId5"/>
+    <p:sldId id="258" r:id="rId4"/>
+    <p:sldId id="259" r:id="rId5"/>
+    <p:sldId id="261" r:id="rId6"/>
+    <p:sldId id="262" r:id="rId7"/>
   </p:sldIdLst>
   <p:sldSz cx="12192000" cy="6858000"/>
   <p:notesSz cx="6858000" cy="9144000"/>
@@ -200,7 +202,7 @@
           <a:p>
             <a:fld id="{52C5C6AE-D154-4E11-B603-A07971901444}" type="datetimeFigureOut">
               <a:rPr lang="en-AU" smtClean="0"/>
-              <a:t>14/04/2024</a:t>
+              <a:t>17/04/2024</a:t>
             </a:fld>
             <a:endParaRPr lang="en-AU"/>
           </a:p>
@@ -970,7 +972,7 @@
           <a:p>
             <a:fld id="{DEBF3073-9E6E-4508-B4E4-15B5E03E6116}" type="datetimeFigureOut">
               <a:rPr lang="en-AU" smtClean="0"/>
-              <a:t>14/04/2024</a:t>
+              <a:t>17/04/2024</a:t>
             </a:fld>
             <a:endParaRPr lang="en-AU"/>
           </a:p>
@@ -1266,7 +1268,7 @@
           <a:p>
             <a:fld id="{DEBF3073-9E6E-4508-B4E4-15B5E03E6116}" type="datetimeFigureOut">
               <a:rPr lang="en-AU" smtClean="0"/>
-              <a:t>14/04/2024</a:t>
+              <a:t>17/04/2024</a:t>
             </a:fld>
             <a:endParaRPr lang="en-AU"/>
           </a:p>
@@ -1514,7 +1516,7 @@
           <a:p>
             <a:fld id="{DEBF3073-9E6E-4508-B4E4-15B5E03E6116}" type="datetimeFigureOut">
               <a:rPr lang="en-AU" smtClean="0"/>
-              <a:t>14/04/2024</a:t>
+              <a:t>17/04/2024</a:t>
             </a:fld>
             <a:endParaRPr lang="en-AU"/>
           </a:p>
@@ -2054,7 +2056,7 @@
           <a:p>
             <a:fld id="{DEBF3073-9E6E-4508-B4E4-15B5E03E6116}" type="datetimeFigureOut">
               <a:rPr lang="en-AU" smtClean="0"/>
-              <a:t>14/04/2024</a:t>
+              <a:t>17/04/2024</a:t>
             </a:fld>
             <a:endParaRPr lang="en-AU"/>
           </a:p>
@@ -2302,7 +2304,7 @@
           <a:p>
             <a:fld id="{DEBF3073-9E6E-4508-B4E4-15B5E03E6116}" type="datetimeFigureOut">
               <a:rPr lang="en-AU" smtClean="0"/>
-              <a:t>14/04/2024</a:t>
+              <a:t>17/04/2024</a:t>
             </a:fld>
             <a:endParaRPr lang="en-AU"/>
           </a:p>
@@ -2834,7 +2836,7 @@
           <a:p>
             <a:fld id="{DEBF3073-9E6E-4508-B4E4-15B5E03E6116}" type="datetimeFigureOut">
               <a:rPr lang="en-AU" smtClean="0"/>
-              <a:t>14/04/2024</a:t>
+              <a:t>17/04/2024</a:t>
             </a:fld>
             <a:endParaRPr lang="en-AU"/>
           </a:p>
@@ -3131,7 +3133,7 @@
           <a:p>
             <a:fld id="{DEBF3073-9E6E-4508-B4E4-15B5E03E6116}" type="datetimeFigureOut">
               <a:rPr lang="en-AU" smtClean="0"/>
-              <a:t>14/04/2024</a:t>
+              <a:t>17/04/2024</a:t>
             </a:fld>
             <a:endParaRPr lang="en-AU"/>
           </a:p>
@@ -3305,7 +3307,7 @@
           <a:p>
             <a:fld id="{DEBF3073-9E6E-4508-B4E4-15B5E03E6116}" type="datetimeFigureOut">
               <a:rPr lang="en-AU" smtClean="0"/>
-              <a:t>14/04/2024</a:t>
+              <a:t>17/04/2024</a:t>
             </a:fld>
             <a:endParaRPr lang="en-AU"/>
           </a:p>
@@ -3485,7 +3487,7 @@
           <a:p>
             <a:fld id="{DEBF3073-9E6E-4508-B4E4-15B5E03E6116}" type="datetimeFigureOut">
               <a:rPr lang="en-AU" smtClean="0"/>
-              <a:t>14/04/2024</a:t>
+              <a:t>17/04/2024</a:t>
             </a:fld>
             <a:endParaRPr lang="en-AU"/>
           </a:p>
@@ -3655,7 +3657,7 @@
           <a:p>
             <a:fld id="{DEBF3073-9E6E-4508-B4E4-15B5E03E6116}" type="datetimeFigureOut">
               <a:rPr lang="en-AU" smtClean="0"/>
-              <a:t>14/04/2024</a:t>
+              <a:t>17/04/2024</a:t>
             </a:fld>
             <a:endParaRPr lang="en-AU"/>
           </a:p>
@@ -3906,7 +3908,7 @@
           <a:p>
             <a:fld id="{DEBF3073-9E6E-4508-B4E4-15B5E03E6116}" type="datetimeFigureOut">
               <a:rPr lang="en-AU" smtClean="0"/>
-              <a:t>14/04/2024</a:t>
+              <a:t>17/04/2024</a:t>
             </a:fld>
             <a:endParaRPr lang="en-AU"/>
           </a:p>
@@ -4203,7 +4205,7 @@
           <a:p>
             <a:fld id="{DEBF3073-9E6E-4508-B4E4-15B5E03E6116}" type="datetimeFigureOut">
               <a:rPr lang="en-AU" smtClean="0"/>
-              <a:t>14/04/2024</a:t>
+              <a:t>17/04/2024</a:t>
             </a:fld>
             <a:endParaRPr lang="en-AU"/>
           </a:p>
@@ -4645,7 +4647,7 @@
           <a:p>
             <a:fld id="{DEBF3073-9E6E-4508-B4E4-15B5E03E6116}" type="datetimeFigureOut">
               <a:rPr lang="en-AU" smtClean="0"/>
-              <a:t>14/04/2024</a:t>
+              <a:t>17/04/2024</a:t>
             </a:fld>
             <a:endParaRPr lang="en-AU"/>
           </a:p>
@@ -4763,7 +4765,7 @@
           <a:p>
             <a:fld id="{DEBF3073-9E6E-4508-B4E4-15B5E03E6116}" type="datetimeFigureOut">
               <a:rPr lang="en-AU" smtClean="0"/>
-              <a:t>14/04/2024</a:t>
+              <a:t>17/04/2024</a:t>
             </a:fld>
             <a:endParaRPr lang="en-AU"/>
           </a:p>
@@ -4858,7 +4860,7 @@
           <a:p>
             <a:fld id="{DEBF3073-9E6E-4508-B4E4-15B5E03E6116}" type="datetimeFigureOut">
               <a:rPr lang="en-AU" smtClean="0"/>
-              <a:t>14/04/2024</a:t>
+              <a:t>17/04/2024</a:t>
             </a:fld>
             <a:endParaRPr lang="en-AU"/>
           </a:p>
@@ -5141,7 +5143,7 @@
           <a:p>
             <a:fld id="{DEBF3073-9E6E-4508-B4E4-15B5E03E6116}" type="datetimeFigureOut">
               <a:rPr lang="en-AU" smtClean="0"/>
-              <a:t>14/04/2024</a:t>
+              <a:t>17/04/2024</a:t>
             </a:fld>
             <a:endParaRPr lang="en-AU"/>
           </a:p>
@@ -5432,7 +5434,7 @@
           <a:p>
             <a:fld id="{DEBF3073-9E6E-4508-B4E4-15B5E03E6116}" type="datetimeFigureOut">
               <a:rPr lang="en-AU" smtClean="0"/>
-              <a:t>14/04/2024</a:t>
+              <a:t>17/04/2024</a:t>
             </a:fld>
             <a:endParaRPr lang="en-AU"/>
           </a:p>
@@ -5962,7 +5964,7 @@
           <a:p>
             <a:fld id="{DEBF3073-9E6E-4508-B4E4-15B5E03E6116}" type="datetimeFigureOut">
               <a:rPr lang="en-AU" smtClean="0"/>
-              <a:t>14/04/2024</a:t>
+              <a:t>17/04/2024</a:t>
             </a:fld>
             <a:endParaRPr lang="en-AU"/>
           </a:p>
@@ -6612,263 +6614,11 @@
 <file path=ppt/slides/slide2.xml><?xml version="1.0" encoding="utf-8"?>
 <p:sld xmlns:a="http://schemas.openxmlformats.org/drawingml/2006/main" xmlns:r="http://schemas.openxmlformats.org/officeDocument/2006/relationships" xmlns:p="http://schemas.openxmlformats.org/presentationml/2006/main">
   <p:cSld>
-    <p:spTree>
-      <p:nvGrpSpPr>
-        <p:cNvPr id="1" name=""/>
-        <p:cNvGrpSpPr/>
-        <p:nvPr/>
-      </p:nvGrpSpPr>
-      <p:grpSpPr>
-        <a:xfrm>
-          <a:off x="0" y="0"/>
-          <a:ext cx="0" cy="0"/>
-          <a:chOff x="0" y="0"/>
-          <a:chExt cx="0" cy="0"/>
-        </a:xfrm>
-      </p:grpSpPr>
-      <p:sp>
-        <p:nvSpPr>
-          <p:cNvPr id="5" name="Title 4">
-            <a:extLst>
-              <a:ext uri="{FF2B5EF4-FFF2-40B4-BE49-F238E27FC236}">
-                <a16:creationId xmlns:a16="http://schemas.microsoft.com/office/drawing/2014/main" id="{379F4DD7-6CEB-6EC9-4290-D6F96A971961}"/>
-              </a:ext>
-            </a:extLst>
-          </p:cNvPr>
-          <p:cNvSpPr>
-            <a:spLocks noGrp="1"/>
-          </p:cNvSpPr>
-          <p:nvPr>
-            <p:ph type="title"/>
-          </p:nvPr>
-        </p:nvSpPr>
-        <p:spPr/>
-        <p:txBody>
-          <a:bodyPr>
-            <a:normAutofit/>
-          </a:bodyPr>
-          <a:lstStyle/>
-          <a:p>
-            <a:r>
-              <a:rPr lang="en-US" sz="4800" dirty="0">
-                <a:ln w="0">
-                  <a:solidFill>
-                    <a:schemeClr val="tx1"/>
-                  </a:solidFill>
-                </a:ln>
-                <a:solidFill>
-                  <a:schemeClr val="accent1"/>
-                </a:solidFill>
-                <a:effectLst>
-                  <a:outerShdw blurRad="38100" dist="25400" dir="5400000" algn="ctr" rotWithShape="0">
-                    <a:srgbClr val="6E747A">
-                      <a:alpha val="43000"/>
-                    </a:srgbClr>
-                  </a:outerShdw>
-                </a:effectLst>
-              </a:rPr>
-              <a:t>Purpose Driven </a:t>
-            </a:r>
-            <a:endParaRPr lang="en-AU" sz="4800" dirty="0">
-              <a:ln w="0">
-                <a:solidFill>
-                  <a:schemeClr val="tx1"/>
-                </a:solidFill>
-              </a:ln>
-              <a:solidFill>
-                <a:schemeClr val="accent1"/>
-              </a:solidFill>
-              <a:effectLst>
-                <a:outerShdw blurRad="38100" dist="25400" dir="5400000" algn="ctr" rotWithShape="0">
-                  <a:srgbClr val="6E747A">
-                    <a:alpha val="43000"/>
-                  </a:srgbClr>
-                </a:outerShdw>
-              </a:effectLst>
-            </a:endParaRPr>
-          </a:p>
-        </p:txBody>
-      </p:sp>
-      <p:sp>
-        <p:nvSpPr>
-          <p:cNvPr id="6" name="Content Placeholder 5">
-            <a:extLst>
-              <a:ext uri="{FF2B5EF4-FFF2-40B4-BE49-F238E27FC236}">
-                <a16:creationId xmlns:a16="http://schemas.microsoft.com/office/drawing/2014/main" id="{6A69788C-3DA3-59C9-D25D-7F0B224BD867}"/>
-              </a:ext>
-            </a:extLst>
-          </p:cNvPr>
-          <p:cNvSpPr>
-            <a:spLocks noGrp="1"/>
-          </p:cNvSpPr>
-          <p:nvPr>
-            <p:ph sz="half" idx="1"/>
-          </p:nvPr>
-        </p:nvSpPr>
-        <p:spPr>
-          <a:xfrm>
-            <a:off x="2049795" y="2438399"/>
-            <a:ext cx="2570331" cy="3124201"/>
-          </a:xfrm>
-        </p:spPr>
-        <p:txBody>
-          <a:bodyPr>
-            <a:normAutofit lnSpcReduction="10000"/>
-          </a:bodyPr>
-          <a:lstStyle/>
-          <a:p>
-            <a:pPr marL="0" indent="0">
-              <a:buNone/>
-            </a:pPr>
-            <a:r>
-              <a:rPr lang="en-US" dirty="0"/>
-              <a:t>CO2 emissions growth:</a:t>
-            </a:r>
-          </a:p>
-          <a:p>
-            <a:pPr>
-              <a:buFont typeface="Wingdings" panose="05000000000000000000" pitchFamily="2" charset="2"/>
-              <a:buChar char="Ø"/>
-            </a:pPr>
-            <a:r>
-              <a:rPr lang="en-US" dirty="0"/>
-              <a:t>1950’s – </a:t>
-            </a:r>
-            <a:r>
-              <a:rPr lang="en-US" b="1" dirty="0"/>
-              <a:t>42.15%</a:t>
-            </a:r>
-          </a:p>
-          <a:p>
-            <a:pPr>
-              <a:buFont typeface="Wingdings" panose="05000000000000000000" pitchFamily="2" charset="2"/>
-              <a:buChar char="Ø"/>
-            </a:pPr>
-            <a:r>
-              <a:rPr lang="en-US" dirty="0"/>
-              <a:t>1960’s – 16.33%</a:t>
-            </a:r>
-          </a:p>
-          <a:p>
-            <a:pPr>
-              <a:buFont typeface="Wingdings" panose="05000000000000000000" pitchFamily="2" charset="2"/>
-              <a:buChar char="Ø"/>
-            </a:pPr>
-            <a:r>
-              <a:rPr lang="en-US" dirty="0"/>
-              <a:t>1970’s – 8.28%</a:t>
-            </a:r>
-          </a:p>
-          <a:p>
-            <a:pPr>
-              <a:buFont typeface="Wingdings" panose="05000000000000000000" pitchFamily="2" charset="2"/>
-              <a:buChar char="Ø"/>
-            </a:pPr>
-            <a:r>
-              <a:rPr lang="en-US" dirty="0"/>
-              <a:t>1980’s – 4.39%</a:t>
-            </a:r>
-          </a:p>
-          <a:p>
-            <a:pPr>
-              <a:buFont typeface="Wingdings" panose="05000000000000000000" pitchFamily="2" charset="2"/>
-              <a:buChar char="Ø"/>
-            </a:pPr>
-            <a:r>
-              <a:rPr lang="en-US" dirty="0"/>
-              <a:t>1990’s – 4.95%</a:t>
-            </a:r>
-          </a:p>
-          <a:p>
-            <a:pPr>
-              <a:buFont typeface="Wingdings" panose="05000000000000000000" pitchFamily="2" charset="2"/>
-              <a:buChar char="Ø"/>
-            </a:pPr>
-            <a:r>
-              <a:rPr lang="en-US" dirty="0"/>
-              <a:t>2000’s - </a:t>
-            </a:r>
-            <a:r>
-              <a:rPr lang="en-US" b="1" dirty="0"/>
-              <a:t>5.26%</a:t>
-            </a:r>
-          </a:p>
-          <a:p>
-            <a:pPr>
-              <a:buFont typeface="Wingdings" panose="05000000000000000000" pitchFamily="2" charset="2"/>
-              <a:buChar char="Ø"/>
-            </a:pPr>
-            <a:r>
-              <a:rPr lang="en-US" dirty="0"/>
-              <a:t>2010’s - 2.92%</a:t>
-            </a:r>
-            <a:endParaRPr lang="en-AU" dirty="0"/>
-          </a:p>
-        </p:txBody>
-      </p:sp>
-      <p:sp>
-        <p:nvSpPr>
-          <p:cNvPr id="9" name="Content Placeholder 8">
-            <a:extLst>
-              <a:ext uri="{FF2B5EF4-FFF2-40B4-BE49-F238E27FC236}">
-                <a16:creationId xmlns:a16="http://schemas.microsoft.com/office/drawing/2014/main" id="{7A74DDC6-86A9-E378-D2B7-93E27478167F}"/>
-              </a:ext>
-            </a:extLst>
-          </p:cNvPr>
-          <p:cNvSpPr>
-            <a:spLocks noGrp="1"/>
-          </p:cNvSpPr>
-          <p:nvPr>
-            <p:ph sz="half" idx="2"/>
-          </p:nvPr>
-        </p:nvSpPr>
-        <p:spPr/>
-        <p:txBody>
-          <a:bodyPr/>
-          <a:lstStyle/>
-          <a:p>
-            <a:endParaRPr lang="en-AU"/>
-          </a:p>
-        </p:txBody>
-      </p:sp>
-    </p:spTree>
-    <p:extLst>
-      <p:ext uri="{BB962C8B-B14F-4D97-AF65-F5344CB8AC3E}">
-        <p14:creationId xmlns:p14="http://schemas.microsoft.com/office/powerpoint/2010/main" val="1821918453"/>
-      </p:ext>
-    </p:extLst>
-  </p:cSld>
-  <p:clrMapOvr>
-    <a:masterClrMapping/>
-  </p:clrMapOvr>
-</p:sld>
-</file>
-
-<file path=ppt/slides/slide3.xml><?xml version="1.0" encoding="utf-8"?>
-<p:sld xmlns:a="http://schemas.openxmlformats.org/drawingml/2006/main" xmlns:r="http://schemas.openxmlformats.org/officeDocument/2006/relationships" xmlns:p="http://schemas.openxmlformats.org/presentationml/2006/main">
-  <p:cSld>
     <p:bg>
       <p:bgPr>
-        <a:blipFill dpi="0" rotWithShape="1">
-          <a:blip r:embed="rId2">
-            <a:duotone>
-              <a:schemeClr val="bg2">
-                <a:shade val="76000"/>
-                <a:satMod val="180000"/>
-              </a:schemeClr>
-              <a:schemeClr val="bg2">
-                <a:tint val="80000"/>
-                <a:satMod val="120000"/>
-                <a:lumMod val="180000"/>
-              </a:schemeClr>
-            </a:duotone>
-            <a:lum/>
-          </a:blip>
-          <a:srcRect/>
-          <a:stretch>
-            <a:fillRect/>
-          </a:stretch>
-        </a:blipFill>
+        <a:solidFill>
+          <a:schemeClr val="bg1"/>
+        </a:solidFill>
         <a:effectLst/>
       </p:bgPr>
     </p:bg>
@@ -6886,15 +6636,540 @@
           <a:chExt cx="0" cy="0"/>
         </a:xfrm>
       </p:grpSpPr>
-      <p:sp>
-        <p:nvSpPr>
-          <p:cNvPr id="13" name="Title 12">
+      <p:grpSp>
+        <p:nvGrpSpPr>
+          <p:cNvPr id="13" name="Group 12">
             <a:extLst>
               <a:ext uri="{FF2B5EF4-FFF2-40B4-BE49-F238E27FC236}">
-                <a16:creationId xmlns:a16="http://schemas.microsoft.com/office/drawing/2014/main" id="{9843AC1B-6679-3685-C925-9EE69154550D}"/>
+                <a16:creationId xmlns:a16="http://schemas.microsoft.com/office/drawing/2014/main" id="{71092D16-14DA-4606-831F-0DB3EEECB91C}"/>
+              </a:ext>
+              <a:ext uri="{C183D7F6-B498-43B3-948B-1728B52AA6E4}">
+                <adec:decorative xmlns:adec="http://schemas.microsoft.com/office/drawing/2017/decorative" val="1"/>
               </a:ext>
             </a:extLst>
           </p:cNvPr>
+          <p:cNvGrpSpPr>
+            <a:grpSpLocks noGrp="1" noUngrp="1" noRot="1" noChangeAspect="1" noMove="1" noResize="1"/>
+          </p:cNvGrpSpPr>
+          <p:nvPr>
+            <p:extLst>
+              <p:ext uri="{386F3935-93C4-4BCD-93E2-E3B085C9AB24}">
+                <p16:designElem xmlns:p16="http://schemas.microsoft.com/office/powerpoint/2015/main" val="1"/>
+              </p:ext>
+            </p:extLst>
+          </p:nvPr>
+        </p:nvGrpSpPr>
+        <p:grpSpPr>
+          <a:xfrm>
+            <a:off x="150812" y="0"/>
+            <a:ext cx="2436813" cy="6858001"/>
+            <a:chOff x="1320800" y="0"/>
+            <a:chExt cx="2436813" cy="6858001"/>
+          </a:xfrm>
+        </p:grpSpPr>
+        <p:sp>
+          <p:nvSpPr>
+            <p:cNvPr id="14" name="Freeform 6">
+              <a:extLst>
+                <a:ext uri="{FF2B5EF4-FFF2-40B4-BE49-F238E27FC236}">
+                  <a16:creationId xmlns:a16="http://schemas.microsoft.com/office/drawing/2014/main" id="{81806E72-5EFD-4407-B492-2EBC71FF5EDB}"/>
+                </a:ext>
+                <a:ext uri="{C183D7F6-B498-43B3-948B-1728B52AA6E4}">
+                  <adec:decorative xmlns:adec="http://schemas.microsoft.com/office/drawing/2017/decorative" val="1"/>
+                </a:ext>
+              </a:extLst>
+            </p:cNvPr>
+            <p:cNvSpPr/>
+            <p:nvPr>
+              <p:extLst>
+                <p:ext uri="{386F3935-93C4-4BCD-93E2-E3B085C9AB24}">
+                  <p16:designElem xmlns:p16="http://schemas.microsoft.com/office/powerpoint/2015/main" val="1"/>
+                </p:ext>
+              </p:extLst>
+            </p:nvPr>
+          </p:nvSpPr>
+          <p:spPr bwMode="auto">
+            <a:xfrm>
+              <a:off x="1627188" y="0"/>
+              <a:ext cx="1122363" cy="5329238"/>
+            </a:xfrm>
+            <a:custGeom>
+              <a:avLst/>
+              <a:gdLst/>
+              <a:ahLst/>
+              <a:cxnLst/>
+              <a:rect l="0" t="0" r="r" b="b"/>
+              <a:pathLst>
+                <a:path w="707" h="3357">
+                  <a:moveTo>
+                    <a:pt x="0" y="3330"/>
+                  </a:moveTo>
+                  <a:lnTo>
+                    <a:pt x="156" y="3357"/>
+                  </a:lnTo>
+                  <a:lnTo>
+                    <a:pt x="707" y="0"/>
+                  </a:lnTo>
+                  <a:lnTo>
+                    <a:pt x="547" y="0"/>
+                  </a:lnTo>
+                  <a:lnTo>
+                    <a:pt x="0" y="3330"/>
+                  </a:lnTo>
+                  <a:close/>
+                </a:path>
+              </a:pathLst>
+            </a:custGeom>
+            <a:solidFill>
+              <a:schemeClr val="accent1"/>
+            </a:solidFill>
+            <a:ln>
+              <a:noFill/>
+            </a:ln>
+          </p:spPr>
+          <p:txBody>
+            <a:bodyPr/>
+            <a:lstStyle/>
+            <a:p>
+              <a:endParaRPr lang="en-AU"/>
+            </a:p>
+          </p:txBody>
+        </p:sp>
+        <p:sp>
+          <p:nvSpPr>
+            <p:cNvPr id="15" name="Freeform 7">
+              <a:extLst>
+                <a:ext uri="{FF2B5EF4-FFF2-40B4-BE49-F238E27FC236}">
+                  <a16:creationId xmlns:a16="http://schemas.microsoft.com/office/drawing/2014/main" id="{BA81CA3B-9A2E-4F71-BF99-2C58BA76C2D6}"/>
+                </a:ext>
+                <a:ext uri="{C183D7F6-B498-43B3-948B-1728B52AA6E4}">
+                  <adec:decorative xmlns:adec="http://schemas.microsoft.com/office/drawing/2017/decorative" val="1"/>
+                </a:ext>
+              </a:extLst>
+            </p:cNvPr>
+            <p:cNvSpPr/>
+            <p:nvPr>
+              <p:extLst>
+                <p:ext uri="{386F3935-93C4-4BCD-93E2-E3B085C9AB24}">
+                  <p16:designElem xmlns:p16="http://schemas.microsoft.com/office/powerpoint/2015/main" val="1"/>
+                </p:ext>
+              </p:extLst>
+            </p:nvPr>
+          </p:nvSpPr>
+          <p:spPr bwMode="auto">
+            <a:xfrm>
+              <a:off x="1320800" y="0"/>
+              <a:ext cx="1117600" cy="5276850"/>
+            </a:xfrm>
+            <a:custGeom>
+              <a:avLst/>
+              <a:gdLst/>
+              <a:ahLst/>
+              <a:cxnLst/>
+              <a:rect l="0" t="0" r="r" b="b"/>
+              <a:pathLst>
+                <a:path w="704" h="3324">
+                  <a:moveTo>
+                    <a:pt x="704" y="0"/>
+                  </a:moveTo>
+                  <a:lnTo>
+                    <a:pt x="545" y="0"/>
+                  </a:lnTo>
+                  <a:lnTo>
+                    <a:pt x="0" y="3300"/>
+                  </a:lnTo>
+                  <a:lnTo>
+                    <a:pt x="157" y="3324"/>
+                  </a:lnTo>
+                  <a:lnTo>
+                    <a:pt x="704" y="0"/>
+                  </a:lnTo>
+                  <a:close/>
+                </a:path>
+              </a:pathLst>
+            </a:custGeom>
+            <a:solidFill>
+              <a:schemeClr val="tx1">
+                <a:lumMod val="65000"/>
+                <a:lumOff val="35000"/>
+              </a:schemeClr>
+            </a:solidFill>
+            <a:ln>
+              <a:noFill/>
+            </a:ln>
+          </p:spPr>
+          <p:txBody>
+            <a:bodyPr/>
+            <a:lstStyle/>
+            <a:p>
+              <a:endParaRPr lang="en-AU"/>
+            </a:p>
+          </p:txBody>
+        </p:sp>
+        <p:sp>
+          <p:nvSpPr>
+            <p:cNvPr id="16" name="Freeform 8">
+              <a:extLst>
+                <a:ext uri="{FF2B5EF4-FFF2-40B4-BE49-F238E27FC236}">
+                  <a16:creationId xmlns:a16="http://schemas.microsoft.com/office/drawing/2014/main" id="{D00EF4F3-D70F-44D5-A71C-69C3FA0D28D6}"/>
+                </a:ext>
+                <a:ext uri="{C183D7F6-B498-43B3-948B-1728B52AA6E4}">
+                  <adec:decorative xmlns:adec="http://schemas.microsoft.com/office/drawing/2017/decorative" val="1"/>
+                </a:ext>
+              </a:extLst>
+            </p:cNvPr>
+            <p:cNvSpPr/>
+            <p:nvPr>
+              <p:extLst>
+                <p:ext uri="{386F3935-93C4-4BCD-93E2-E3B085C9AB24}">
+                  <p16:designElem xmlns:p16="http://schemas.microsoft.com/office/powerpoint/2015/main" val="1"/>
+                </p:ext>
+              </p:extLst>
+            </p:nvPr>
+          </p:nvSpPr>
+          <p:spPr bwMode="auto">
+            <a:xfrm>
+              <a:off x="1320800" y="5238750"/>
+              <a:ext cx="1228725" cy="1619250"/>
+            </a:xfrm>
+            <a:custGeom>
+              <a:avLst/>
+              <a:gdLst/>
+              <a:ahLst/>
+              <a:cxnLst/>
+              <a:rect l="0" t="0" r="r" b="b"/>
+              <a:pathLst>
+                <a:path w="774" h="1020">
+                  <a:moveTo>
+                    <a:pt x="0" y="0"/>
+                  </a:moveTo>
+                  <a:lnTo>
+                    <a:pt x="740" y="1020"/>
+                  </a:lnTo>
+                  <a:lnTo>
+                    <a:pt x="774" y="1020"/>
+                  </a:lnTo>
+                  <a:lnTo>
+                    <a:pt x="0" y="0"/>
+                  </a:lnTo>
+                  <a:close/>
+                </a:path>
+              </a:pathLst>
+            </a:custGeom>
+            <a:solidFill>
+              <a:schemeClr val="tx1">
+                <a:lumMod val="85000"/>
+                <a:lumOff val="15000"/>
+              </a:schemeClr>
+            </a:solidFill>
+            <a:ln>
+              <a:noFill/>
+            </a:ln>
+          </p:spPr>
+          <p:txBody>
+            <a:bodyPr/>
+            <a:lstStyle/>
+            <a:p>
+              <a:endParaRPr lang="en-AU"/>
+            </a:p>
+          </p:txBody>
+        </p:sp>
+        <p:sp>
+          <p:nvSpPr>
+            <p:cNvPr id="17" name="Freeform 9">
+              <a:extLst>
+                <a:ext uri="{FF2B5EF4-FFF2-40B4-BE49-F238E27FC236}">
+                  <a16:creationId xmlns:a16="http://schemas.microsoft.com/office/drawing/2014/main" id="{2CC930FA-FD42-4EF1-A9AB-0F9C302383FE}"/>
+                </a:ext>
+                <a:ext uri="{C183D7F6-B498-43B3-948B-1728B52AA6E4}">
+                  <adec:decorative xmlns:adec="http://schemas.microsoft.com/office/drawing/2017/decorative" val="1"/>
+                </a:ext>
+              </a:extLst>
+            </p:cNvPr>
+            <p:cNvSpPr/>
+            <p:nvPr>
+              <p:extLst>
+                <p:ext uri="{386F3935-93C4-4BCD-93E2-E3B085C9AB24}">
+                  <p16:designElem xmlns:p16="http://schemas.microsoft.com/office/powerpoint/2015/main" val="1"/>
+                </p:ext>
+              </p:extLst>
+            </p:nvPr>
+          </p:nvSpPr>
+          <p:spPr bwMode="auto">
+            <a:xfrm>
+              <a:off x="1627188" y="5291138"/>
+              <a:ext cx="1495425" cy="1566863"/>
+            </a:xfrm>
+            <a:custGeom>
+              <a:avLst/>
+              <a:gdLst/>
+              <a:ahLst/>
+              <a:cxnLst/>
+              <a:rect l="0" t="0" r="r" b="b"/>
+              <a:pathLst>
+                <a:path w="942" h="987">
+                  <a:moveTo>
+                    <a:pt x="0" y="0"/>
+                  </a:moveTo>
+                  <a:lnTo>
+                    <a:pt x="909" y="987"/>
+                  </a:lnTo>
+                  <a:lnTo>
+                    <a:pt x="942" y="987"/>
+                  </a:lnTo>
+                  <a:lnTo>
+                    <a:pt x="0" y="0"/>
+                  </a:lnTo>
+                  <a:close/>
+                </a:path>
+              </a:pathLst>
+            </a:custGeom>
+            <a:solidFill>
+              <a:schemeClr val="accent1">
+                <a:lumMod val="50000"/>
+              </a:schemeClr>
+            </a:solidFill>
+            <a:ln>
+              <a:noFill/>
+            </a:ln>
+          </p:spPr>
+          <p:txBody>
+            <a:bodyPr/>
+            <a:lstStyle/>
+            <a:p>
+              <a:endParaRPr lang="en-AU"/>
+            </a:p>
+          </p:txBody>
+        </p:sp>
+        <p:sp>
+          <p:nvSpPr>
+            <p:cNvPr id="18" name="Freeform 10">
+              <a:extLst>
+                <a:ext uri="{FF2B5EF4-FFF2-40B4-BE49-F238E27FC236}">
+                  <a16:creationId xmlns:a16="http://schemas.microsoft.com/office/drawing/2014/main" id="{F18F276C-D13F-46CF-9880-2050C2DBF917}"/>
+                </a:ext>
+                <a:ext uri="{C183D7F6-B498-43B3-948B-1728B52AA6E4}">
+                  <adec:decorative xmlns:adec="http://schemas.microsoft.com/office/drawing/2017/decorative" val="1"/>
+                </a:ext>
+              </a:extLst>
+            </p:cNvPr>
+            <p:cNvSpPr/>
+            <p:nvPr>
+              <p:extLst>
+                <p:ext uri="{386F3935-93C4-4BCD-93E2-E3B085C9AB24}">
+                  <p16:designElem xmlns:p16="http://schemas.microsoft.com/office/powerpoint/2015/main" val="1"/>
+                </p:ext>
+              </p:extLst>
+            </p:nvPr>
+          </p:nvSpPr>
+          <p:spPr bwMode="auto">
+            <a:xfrm>
+              <a:off x="1627188" y="5286375"/>
+              <a:ext cx="2130425" cy="1571625"/>
+            </a:xfrm>
+            <a:custGeom>
+              <a:avLst/>
+              <a:gdLst/>
+              <a:ahLst/>
+              <a:cxnLst/>
+              <a:rect l="0" t="0" r="r" b="b"/>
+              <a:pathLst>
+                <a:path w="1342" h="990">
+                  <a:moveTo>
+                    <a:pt x="0" y="3"/>
+                  </a:moveTo>
+                  <a:lnTo>
+                    <a:pt x="942" y="990"/>
+                  </a:lnTo>
+                  <a:lnTo>
+                    <a:pt x="1342" y="990"/>
+                  </a:lnTo>
+                  <a:lnTo>
+                    <a:pt x="156" y="27"/>
+                  </a:lnTo>
+                  <a:lnTo>
+                    <a:pt x="0" y="0"/>
+                  </a:lnTo>
+                  <a:lnTo>
+                    <a:pt x="0" y="3"/>
+                  </a:lnTo>
+                  <a:close/>
+                </a:path>
+              </a:pathLst>
+            </a:custGeom>
+            <a:solidFill>
+              <a:schemeClr val="accent1">
+                <a:lumMod val="75000"/>
+              </a:schemeClr>
+            </a:solidFill>
+            <a:ln>
+              <a:noFill/>
+            </a:ln>
+          </p:spPr>
+          <p:txBody>
+            <a:bodyPr/>
+            <a:lstStyle/>
+            <a:p>
+              <a:endParaRPr lang="en-AU"/>
+            </a:p>
+          </p:txBody>
+        </p:sp>
+        <p:sp>
+          <p:nvSpPr>
+            <p:cNvPr id="19" name="Freeform 11">
+              <a:extLst>
+                <a:ext uri="{FF2B5EF4-FFF2-40B4-BE49-F238E27FC236}">
+                  <a16:creationId xmlns:a16="http://schemas.microsoft.com/office/drawing/2014/main" id="{EAB50995-FA10-4035-B16D-7D3989B2B62E}"/>
+                </a:ext>
+                <a:ext uri="{C183D7F6-B498-43B3-948B-1728B52AA6E4}">
+                  <adec:decorative xmlns:adec="http://schemas.microsoft.com/office/drawing/2017/decorative" val="1"/>
+                </a:ext>
+              </a:extLst>
+            </p:cNvPr>
+            <p:cNvSpPr/>
+            <p:nvPr>
+              <p:extLst>
+                <p:ext uri="{386F3935-93C4-4BCD-93E2-E3B085C9AB24}">
+                  <p16:designElem xmlns:p16="http://schemas.microsoft.com/office/powerpoint/2015/main" val="1"/>
+                </p:ext>
+              </p:extLst>
+            </p:nvPr>
+          </p:nvSpPr>
+          <p:spPr bwMode="auto">
+            <a:xfrm>
+              <a:off x="1320800" y="5238750"/>
+              <a:ext cx="1695450" cy="1619250"/>
+            </a:xfrm>
+            <a:custGeom>
+              <a:avLst/>
+              <a:gdLst/>
+              <a:ahLst/>
+              <a:cxnLst/>
+              <a:rect l="0" t="0" r="r" b="b"/>
+              <a:pathLst>
+                <a:path w="1068" h="1020">
+                  <a:moveTo>
+                    <a:pt x="1068" y="1020"/>
+                  </a:moveTo>
+                  <a:lnTo>
+                    <a:pt x="184" y="60"/>
+                  </a:lnTo>
+                  <a:lnTo>
+                    <a:pt x="154" y="27"/>
+                  </a:lnTo>
+                  <a:lnTo>
+                    <a:pt x="157" y="27"/>
+                  </a:lnTo>
+                  <a:lnTo>
+                    <a:pt x="157" y="24"/>
+                  </a:lnTo>
+                  <a:lnTo>
+                    <a:pt x="154" y="24"/>
+                  </a:lnTo>
+                  <a:lnTo>
+                    <a:pt x="0" y="0"/>
+                  </a:lnTo>
+                  <a:lnTo>
+                    <a:pt x="0" y="0"/>
+                  </a:lnTo>
+                  <a:lnTo>
+                    <a:pt x="774" y="1020"/>
+                  </a:lnTo>
+                  <a:lnTo>
+                    <a:pt x="1068" y="1020"/>
+                  </a:lnTo>
+                  <a:close/>
+                </a:path>
+              </a:pathLst>
+            </a:custGeom>
+            <a:solidFill>
+              <a:schemeClr val="tx1">
+                <a:lumMod val="75000"/>
+                <a:lumOff val="25000"/>
+              </a:schemeClr>
+            </a:solidFill>
+            <a:ln>
+              <a:noFill/>
+            </a:ln>
+          </p:spPr>
+          <p:txBody>
+            <a:bodyPr/>
+            <a:lstStyle/>
+            <a:p>
+              <a:endParaRPr lang="en-AU"/>
+            </a:p>
+          </p:txBody>
+        </p:sp>
+      </p:grpSp>
+      <p:sp>
+        <p:nvSpPr>
+          <p:cNvPr id="21" name="Rectangle 20">
+            <a:extLst>
+              <a:ext uri="{FF2B5EF4-FFF2-40B4-BE49-F238E27FC236}">
+                <a16:creationId xmlns:a16="http://schemas.microsoft.com/office/drawing/2014/main" id="{63336871-0118-4F6E-8DBD-20AEFC62A9AD}"/>
+              </a:ext>
+              <a:ext uri="{C183D7F6-B498-43B3-948B-1728B52AA6E4}">
+                <adec:decorative xmlns:adec="http://schemas.microsoft.com/office/drawing/2017/decorative" val="1"/>
+              </a:ext>
+            </a:extLst>
+          </p:cNvPr>
+          <p:cNvSpPr>
+            <a:spLocks noGrp="1" noRot="1" noChangeAspect="1" noMove="1" noResize="1" noEditPoints="1" noAdjustHandles="1" noChangeArrowheads="1" noChangeShapeType="1" noTextEdit="1"/>
+          </p:cNvSpPr>
+          <p:nvPr>
+            <p:extLst>
+              <p:ext uri="{386F3935-93C4-4BCD-93E2-E3B085C9AB24}">
+                <p16:designElem xmlns:p16="http://schemas.microsoft.com/office/powerpoint/2015/main" val="1"/>
+              </p:ext>
+            </p:extLst>
+          </p:nvPr>
+        </p:nvSpPr>
+        <p:spPr>
+          <a:xfrm>
+            <a:off x="7736306" y="1"/>
+            <a:ext cx="4455694" cy="6858000"/>
+          </a:xfrm>
+          <a:prstGeom prst="rect">
+            <a:avLst/>
+          </a:prstGeom>
+          <a:ln>
+            <a:noFill/>
+          </a:ln>
+        </p:spPr>
+        <p:style>
+          <a:lnRef idx="2">
+            <a:schemeClr val="accent1">
+              <a:shade val="50000"/>
+            </a:schemeClr>
+          </a:lnRef>
+          <a:fillRef idx="1003">
+            <a:schemeClr val="lt2"/>
+          </a:fillRef>
+          <a:effectRef idx="0">
+            <a:schemeClr val="accent1"/>
+          </a:effectRef>
+          <a:fontRef idx="minor">
+            <a:schemeClr val="lt1"/>
+          </a:fontRef>
+        </p:style>
+        <p:txBody>
+          <a:bodyPr rtlCol="0" anchor="ctr"/>
+          <a:lstStyle/>
+          <a:p>
+            <a:pPr algn="ctr"/>
+            <a:endParaRPr lang="en-US"/>
+          </a:p>
+        </p:txBody>
+      </p:sp>
+      <p:sp>
+        <p:nvSpPr>
+          <p:cNvPr id="5" name="Title 4">
+            <a:extLst>
+              <a:ext uri="{FF2B5EF4-FFF2-40B4-BE49-F238E27FC236}">
+                <a16:creationId xmlns:a16="http://schemas.microsoft.com/office/drawing/2014/main" id="{379F4DD7-6CEB-6EC9-4290-D6F96A971961}"/>
+              </a:ext>
+            </a:extLst>
+          </p:cNvPr>
           <p:cNvSpPr>
             <a:spLocks noGrp="1"/>
           </p:cNvSpPr>
@@ -6902,18 +7177,23 @@
             <p:ph type="title"/>
           </p:nvPr>
         </p:nvSpPr>
-        <p:spPr/>
-        <p:txBody>
-          <a:bodyPr>
+        <p:spPr>
+          <a:xfrm>
+            <a:off x="9171392" y="1074392"/>
+            <a:ext cx="2443433" cy="4377961"/>
+          </a:xfrm>
+        </p:spPr>
+        <p:txBody>
+          <a:bodyPr vert="horz" lIns="91440" tIns="45720" rIns="91440" bIns="45720" rtlCol="0" anchor="ctr">
             <a:normAutofit/>
           </a:bodyPr>
           <a:lstStyle/>
           <a:p>
             <a:r>
-              <a:rPr lang="en-US" sz="4800" dirty="0">
+              <a:rPr lang="en-US" dirty="0">
                 <a:ln w="0">
                   <a:solidFill>
-                    <a:schemeClr val="tx2"/>
+                    <a:schemeClr val="tx1"/>
                   </a:solidFill>
                 </a:ln>
                 <a:solidFill>
@@ -6927,281 +7207,1541 @@
                   </a:outerShdw>
                 </a:effectLst>
               </a:rPr>
-              <a:t>Investigate Trends In Emission Data</a:t>
-            </a:r>
-            <a:endParaRPr lang="en-AU" sz="4800" dirty="0">
-              <a:ln w="0">
-                <a:solidFill>
-                  <a:schemeClr val="tx2"/>
-                </a:solidFill>
-              </a:ln>
-              <a:solidFill>
-                <a:schemeClr val="accent1"/>
-              </a:solidFill>
-              <a:effectLst>
-                <a:outerShdw blurRad="38100" dist="25400" dir="5400000" algn="ctr" rotWithShape="0">
-                  <a:srgbClr val="6E747A">
-                    <a:alpha val="43000"/>
-                  </a:srgbClr>
-                </a:outerShdw>
-              </a:effectLst>
-            </a:endParaRPr>
-          </a:p>
-        </p:txBody>
-      </p:sp>
-      <p:sp>
-        <p:nvSpPr>
-          <p:cNvPr id="14" name="Text Placeholder 13">
+              <a:t>Cause &amp; Effect </a:t>
+            </a:r>
+          </a:p>
+        </p:txBody>
+      </p:sp>
+      <p:sp useBgFill="1">
+        <p:nvSpPr>
+          <p:cNvPr id="23" name="Freeform: Shape 22">
             <a:extLst>
               <a:ext uri="{FF2B5EF4-FFF2-40B4-BE49-F238E27FC236}">
-                <a16:creationId xmlns:a16="http://schemas.microsoft.com/office/drawing/2014/main" id="{C4F5B6E4-5417-E08B-12D8-855217586E5D}"/>
+                <a16:creationId xmlns:a16="http://schemas.microsoft.com/office/drawing/2014/main" id="{F03CC8D0-33AF-417F-8454-1FDB6C22DD25}"/>
+              </a:ext>
+              <a:ext uri="{C183D7F6-B498-43B3-948B-1728B52AA6E4}">
+                <adec:decorative xmlns:adec="http://schemas.microsoft.com/office/drawing/2017/decorative" val="1"/>
               </a:ext>
             </a:extLst>
           </p:cNvPr>
           <p:cNvSpPr>
-            <a:spLocks noGrp="1"/>
-          </p:cNvSpPr>
-          <p:nvPr>
-            <p:ph type="body" idx="1"/>
+            <a:spLocks noGrp="1" noRot="1" noChangeAspect="1" noMove="1" noResize="1" noEditPoints="1" noAdjustHandles="1" noChangeArrowheads="1" noChangeShapeType="1" noTextEdit="1"/>
+          </p:cNvSpPr>
+          <p:nvPr>
+            <p:extLst>
+              <p:ext uri="{386F3935-93C4-4BCD-93E2-E3B085C9AB24}">
+                <p16:designElem xmlns:p16="http://schemas.microsoft.com/office/powerpoint/2015/main" val="1"/>
+              </p:ext>
+            </p:extLst>
           </p:nvPr>
         </p:nvSpPr>
         <p:spPr>
-          <a:xfrm>
-            <a:off x="1484311" y="2746597"/>
-            <a:ext cx="4607188" cy="576262"/>
+          <a:xfrm flipV="1">
+            <a:off x="0" y="0"/>
+            <a:ext cx="9032100" cy="6858000"/>
           </a:xfrm>
+          <a:custGeom>
+            <a:avLst/>
+            <a:gdLst>
+              <a:gd name="connsiteX0" fmla="*/ 7891921 w 9032100"/>
+              <a:gd name="connsiteY0" fmla="*/ 1602751 h 6858000"/>
+              <a:gd name="connsiteX1" fmla="*/ 9032100 w 9032100"/>
+              <a:gd name="connsiteY1" fmla="*/ 0 h 6858000"/>
+              <a:gd name="connsiteX2" fmla="*/ 7880182 w 9032100"/>
+              <a:gd name="connsiteY2" fmla="*/ 0 h 6858000"/>
+              <a:gd name="connsiteX3" fmla="*/ 7880182 w 9032100"/>
+              <a:gd name="connsiteY3" fmla="*/ 1528762 h 6858000"/>
+              <a:gd name="connsiteX4" fmla="*/ 7880182 w 9032100"/>
+              <a:gd name="connsiteY4" fmla="*/ 6858000 h 6858000"/>
+              <a:gd name="connsiteX5" fmla="*/ 8725712 w 9032100"/>
+              <a:gd name="connsiteY5" fmla="*/ 6858000 h 6858000"/>
+              <a:gd name="connsiteX6" fmla="*/ 7891921 w 9032100"/>
+              <a:gd name="connsiteY6" fmla="*/ 1602751 h 6858000"/>
+              <a:gd name="connsiteX7" fmla="*/ 7880182 w 9032100"/>
+              <a:gd name="connsiteY7" fmla="*/ 1619252 h 6858000"/>
+              <a:gd name="connsiteX8" fmla="*/ 0 w 9032100"/>
+              <a:gd name="connsiteY8" fmla="*/ 6858000 h 6858000"/>
+              <a:gd name="connsiteX9" fmla="*/ 7880181 w 9032100"/>
+              <a:gd name="connsiteY9" fmla="*/ 6858000 h 6858000"/>
+              <a:gd name="connsiteX10" fmla="*/ 7880181 w 9032100"/>
+              <a:gd name="connsiteY10" fmla="*/ 0 h 6858000"/>
+              <a:gd name="connsiteX11" fmla="*/ 0 w 9032100"/>
+              <a:gd name="connsiteY11" fmla="*/ 0 h 6858000"/>
+            </a:gdLst>
+            <a:ahLst/>
+            <a:cxnLst>
+              <a:cxn ang="0">
+                <a:pos x="connsiteX0" y="connsiteY0"/>
+              </a:cxn>
+              <a:cxn ang="0">
+                <a:pos x="connsiteX1" y="connsiteY1"/>
+              </a:cxn>
+              <a:cxn ang="0">
+                <a:pos x="connsiteX2" y="connsiteY2"/>
+              </a:cxn>
+              <a:cxn ang="0">
+                <a:pos x="connsiteX3" y="connsiteY3"/>
+              </a:cxn>
+              <a:cxn ang="0">
+                <a:pos x="connsiteX4" y="connsiteY4"/>
+              </a:cxn>
+              <a:cxn ang="0">
+                <a:pos x="connsiteX5" y="connsiteY5"/>
+              </a:cxn>
+              <a:cxn ang="0">
+                <a:pos x="connsiteX6" y="connsiteY6"/>
+              </a:cxn>
+              <a:cxn ang="0">
+                <a:pos x="connsiteX7" y="connsiteY7"/>
+              </a:cxn>
+              <a:cxn ang="0">
+                <a:pos x="connsiteX8" y="connsiteY8"/>
+              </a:cxn>
+              <a:cxn ang="0">
+                <a:pos x="connsiteX9" y="connsiteY9"/>
+              </a:cxn>
+              <a:cxn ang="0">
+                <a:pos x="connsiteX10" y="connsiteY10"/>
+              </a:cxn>
+              <a:cxn ang="0">
+                <a:pos x="connsiteX11" y="connsiteY11"/>
+              </a:cxn>
+            </a:cxnLst>
+            <a:rect l="l" t="t" r="r" b="b"/>
+            <a:pathLst>
+              <a:path w="9032100" h="6858000">
+                <a:moveTo>
+                  <a:pt x="7891921" y="1602751"/>
+                </a:moveTo>
+                <a:lnTo>
+                  <a:pt x="9032100" y="0"/>
+                </a:lnTo>
+                <a:lnTo>
+                  <a:pt x="7880182" y="0"/>
+                </a:lnTo>
+                <a:lnTo>
+                  <a:pt x="7880182" y="1528762"/>
+                </a:lnTo>
+                <a:close/>
+                <a:moveTo>
+                  <a:pt x="7880182" y="6858000"/>
+                </a:moveTo>
+                <a:lnTo>
+                  <a:pt x="8725712" y="6858000"/>
+                </a:lnTo>
+                <a:lnTo>
+                  <a:pt x="7891921" y="1602751"/>
+                </a:lnTo>
+                <a:lnTo>
+                  <a:pt x="7880182" y="1619252"/>
+                </a:lnTo>
+                <a:close/>
+                <a:moveTo>
+                  <a:pt x="0" y="6858000"/>
+                </a:moveTo>
+                <a:lnTo>
+                  <a:pt x="7880181" y="6858000"/>
+                </a:lnTo>
+                <a:lnTo>
+                  <a:pt x="7880181" y="0"/>
+                </a:lnTo>
+                <a:lnTo>
+                  <a:pt x="0" y="0"/>
+                </a:lnTo>
+                <a:close/>
+              </a:path>
+            </a:pathLst>
+          </a:custGeom>
+          <a:ln>
+            <a:noFill/>
+          </a:ln>
         </p:spPr>
-        <p:txBody>
-          <a:bodyPr/>
+        <p:style>
+          <a:lnRef idx="2">
+            <a:schemeClr val="accent1">
+              <a:shade val="50000"/>
+            </a:schemeClr>
+          </a:lnRef>
+          <a:fillRef idx="1002">
+            <a:schemeClr val="dk1"/>
+          </a:fillRef>
+          <a:effectRef idx="0">
+            <a:schemeClr val="accent1"/>
+          </a:effectRef>
+          <a:fontRef idx="minor">
+            <a:schemeClr val="lt1"/>
+          </a:fontRef>
+        </p:style>
+        <p:txBody>
+          <a:bodyPr rtlCol="0" anchor="ctr"/>
           <a:lstStyle/>
           <a:p>
-            <a:r>
-              <a:rPr lang="en-US" dirty="0"/>
-              <a:t>Trends?</a:t>
-            </a:r>
-          </a:p>
-        </p:txBody>
-      </p:sp>
-      <p:sp>
-        <p:nvSpPr>
-          <p:cNvPr id="15" name="Content Placeholder 14">
+            <a:pPr algn="ctr"/>
+            <a:endParaRPr lang="en-US">
+              <a:solidFill>
+                <a:schemeClr val="tx1"/>
+              </a:solidFill>
+            </a:endParaRPr>
+          </a:p>
+        </p:txBody>
+      </p:sp>
+      <p:grpSp>
+        <p:nvGrpSpPr>
+          <p:cNvPr id="25" name="Group 24">
             <a:extLst>
               <a:ext uri="{FF2B5EF4-FFF2-40B4-BE49-F238E27FC236}">
-                <a16:creationId xmlns:a16="http://schemas.microsoft.com/office/drawing/2014/main" id="{411AC09D-918F-1DE4-92CE-D5A7FFE016FB}"/>
+                <a16:creationId xmlns:a16="http://schemas.microsoft.com/office/drawing/2014/main" id="{B5A08A69-9EE1-4A9E-96B6-D769D87C2F9E}"/>
+              </a:ext>
+              <a:ext uri="{C183D7F6-B498-43B3-948B-1728B52AA6E4}">
+                <adec:decorative xmlns:adec="http://schemas.microsoft.com/office/drawing/2017/decorative" val="1"/>
               </a:ext>
             </a:extLst>
           </p:cNvPr>
-          <p:cNvSpPr>
-            <a:spLocks noGrp="1"/>
-          </p:cNvSpPr>
-          <p:nvPr>
-            <p:ph sz="half" idx="2"/>
-          </p:nvPr>
-        </p:nvSpPr>
-        <p:spPr/>
-        <p:txBody>
-          <a:bodyPr/>
-          <a:lstStyle/>
-          <a:p>
-            <a:pPr>
-              <a:buFont typeface="Wingdings" panose="05000000000000000000" pitchFamily="2" charset="2"/>
-              <a:buChar char="Ø"/>
-            </a:pPr>
-            <a:r>
-              <a:rPr lang="en-US" dirty="0"/>
-              <a:t> Population vs Total emissions</a:t>
-            </a:r>
-          </a:p>
-          <a:p>
-            <a:pPr>
-              <a:buFont typeface="Wingdings" panose="05000000000000000000" pitchFamily="2" charset="2"/>
-              <a:buChar char="Ø"/>
-            </a:pPr>
-            <a:r>
-              <a:rPr lang="en-US" dirty="0"/>
-              <a:t>GDP vs Total emissions</a:t>
-            </a:r>
-          </a:p>
-          <a:p>
-            <a:pPr>
-              <a:buFont typeface="Wingdings" panose="05000000000000000000" pitchFamily="2" charset="2"/>
-              <a:buChar char="Ø"/>
-            </a:pPr>
-            <a:r>
-              <a:rPr lang="en-US" dirty="0"/>
-              <a:t>GDP  vs  Total Emissions ratio</a:t>
-            </a:r>
-          </a:p>
-          <a:p>
-            <a:pPr>
-              <a:buFont typeface="Wingdings" panose="05000000000000000000" pitchFamily="2" charset="2"/>
-              <a:buChar char="Ø"/>
-            </a:pPr>
-            <a:r>
-              <a:rPr lang="en-US" dirty="0"/>
-              <a:t>Emissions Per Person vs Daily Income</a:t>
-            </a:r>
-          </a:p>
-          <a:p>
-            <a:pPr>
-              <a:buFont typeface="Wingdings" panose="05000000000000000000" pitchFamily="2" charset="2"/>
-              <a:buChar char="Ø"/>
-            </a:pPr>
-            <a:r>
-              <a:rPr lang="en-US" dirty="0"/>
-              <a:t>Change over time?</a:t>
-            </a:r>
-          </a:p>
-          <a:p>
-            <a:pPr>
-              <a:buFont typeface="Wingdings" panose="05000000000000000000" pitchFamily="2" charset="2"/>
-              <a:buChar char="Ø"/>
-            </a:pPr>
-            <a:endParaRPr lang="en-US" dirty="0"/>
-          </a:p>
-          <a:p>
-            <a:pPr>
-              <a:buFont typeface="Wingdings" panose="05000000000000000000" pitchFamily="2" charset="2"/>
-              <a:buChar char="Ø"/>
-            </a:pPr>
-            <a:endParaRPr lang="en-AU" dirty="0"/>
-          </a:p>
-        </p:txBody>
-      </p:sp>
-      <p:sp>
-        <p:nvSpPr>
-          <p:cNvPr id="16" name="Text Placeholder 15">
+          <p:cNvGrpSpPr>
+            <a:grpSpLocks noGrp="1" noUngrp="1" noRot="1" noChangeAspect="1" noMove="1" noResize="1"/>
+          </p:cNvGrpSpPr>
+          <p:nvPr>
+            <p:extLst>
+              <p:ext uri="{386F3935-93C4-4BCD-93E2-E3B085C9AB24}">
+                <p16:designElem xmlns:p16="http://schemas.microsoft.com/office/powerpoint/2015/main" val="1"/>
+              </p:ext>
+            </p:extLst>
+          </p:nvPr>
+        </p:nvGrpSpPr>
+        <p:grpSpPr>
+          <a:xfrm>
+            <a:off x="7942667" y="0"/>
+            <a:ext cx="2436813" cy="6858001"/>
+            <a:chOff x="1320800" y="0"/>
+            <a:chExt cx="2436813" cy="6858001"/>
+          </a:xfrm>
+        </p:grpSpPr>
+        <p:sp>
+          <p:nvSpPr>
+            <p:cNvPr id="26" name="Freeform 6">
+              <a:extLst>
+                <a:ext uri="{FF2B5EF4-FFF2-40B4-BE49-F238E27FC236}">
+                  <a16:creationId xmlns:a16="http://schemas.microsoft.com/office/drawing/2014/main" id="{4E4F433A-15D2-423F-8739-13AEA4E47C31}"/>
+                </a:ext>
+                <a:ext uri="{C183D7F6-B498-43B3-948B-1728B52AA6E4}">
+                  <adec:decorative xmlns:adec="http://schemas.microsoft.com/office/drawing/2017/decorative" val="1"/>
+                </a:ext>
+              </a:extLst>
+            </p:cNvPr>
+            <p:cNvSpPr/>
+            <p:nvPr>
+              <p:extLst>
+                <p:ext uri="{386F3935-93C4-4BCD-93E2-E3B085C9AB24}">
+                  <p16:designElem xmlns:p16="http://schemas.microsoft.com/office/powerpoint/2015/main" val="1"/>
+                </p:ext>
+              </p:extLst>
+            </p:nvPr>
+          </p:nvSpPr>
+          <p:spPr bwMode="auto">
+            <a:xfrm>
+              <a:off x="1627188" y="0"/>
+              <a:ext cx="1122363" cy="5329238"/>
+            </a:xfrm>
+            <a:custGeom>
+              <a:avLst/>
+              <a:gdLst/>
+              <a:ahLst/>
+              <a:cxnLst/>
+              <a:rect l="0" t="0" r="r" b="b"/>
+              <a:pathLst>
+                <a:path w="707" h="3357">
+                  <a:moveTo>
+                    <a:pt x="0" y="3330"/>
+                  </a:moveTo>
+                  <a:lnTo>
+                    <a:pt x="156" y="3357"/>
+                  </a:lnTo>
+                  <a:lnTo>
+                    <a:pt x="707" y="0"/>
+                  </a:lnTo>
+                  <a:lnTo>
+                    <a:pt x="547" y="0"/>
+                  </a:lnTo>
+                  <a:lnTo>
+                    <a:pt x="0" y="3330"/>
+                  </a:lnTo>
+                  <a:close/>
+                </a:path>
+              </a:pathLst>
+            </a:custGeom>
+            <a:solidFill>
+              <a:schemeClr val="accent1"/>
+            </a:solidFill>
+            <a:ln>
+              <a:noFill/>
+            </a:ln>
+          </p:spPr>
+          <p:txBody>
+            <a:bodyPr/>
+            <a:lstStyle/>
+            <a:p>
+              <a:endParaRPr lang="en-AU"/>
+            </a:p>
+          </p:txBody>
+        </p:sp>
+        <p:sp>
+          <p:nvSpPr>
+            <p:cNvPr id="27" name="Freeform 7">
+              <a:extLst>
+                <a:ext uri="{FF2B5EF4-FFF2-40B4-BE49-F238E27FC236}">
+                  <a16:creationId xmlns:a16="http://schemas.microsoft.com/office/drawing/2014/main" id="{4021F900-DEF3-4537-92E5-C37ECB7AE9DF}"/>
+                </a:ext>
+                <a:ext uri="{C183D7F6-B498-43B3-948B-1728B52AA6E4}">
+                  <adec:decorative xmlns:adec="http://schemas.microsoft.com/office/drawing/2017/decorative" val="1"/>
+                </a:ext>
+              </a:extLst>
+            </p:cNvPr>
+            <p:cNvSpPr/>
+            <p:nvPr>
+              <p:extLst>
+                <p:ext uri="{386F3935-93C4-4BCD-93E2-E3B085C9AB24}">
+                  <p16:designElem xmlns:p16="http://schemas.microsoft.com/office/powerpoint/2015/main" val="1"/>
+                </p:ext>
+              </p:extLst>
+            </p:nvPr>
+          </p:nvSpPr>
+          <p:spPr bwMode="auto">
+            <a:xfrm>
+              <a:off x="1320800" y="0"/>
+              <a:ext cx="1117600" cy="5276850"/>
+            </a:xfrm>
+            <a:custGeom>
+              <a:avLst/>
+              <a:gdLst/>
+              <a:ahLst/>
+              <a:cxnLst/>
+              <a:rect l="0" t="0" r="r" b="b"/>
+              <a:pathLst>
+                <a:path w="704" h="3324">
+                  <a:moveTo>
+                    <a:pt x="704" y="0"/>
+                  </a:moveTo>
+                  <a:lnTo>
+                    <a:pt x="545" y="0"/>
+                  </a:lnTo>
+                  <a:lnTo>
+                    <a:pt x="0" y="3300"/>
+                  </a:lnTo>
+                  <a:lnTo>
+                    <a:pt x="157" y="3324"/>
+                  </a:lnTo>
+                  <a:lnTo>
+                    <a:pt x="704" y="0"/>
+                  </a:lnTo>
+                  <a:close/>
+                </a:path>
+              </a:pathLst>
+            </a:custGeom>
+            <a:solidFill>
+              <a:schemeClr val="tx1">
+                <a:lumMod val="65000"/>
+                <a:lumOff val="35000"/>
+              </a:schemeClr>
+            </a:solidFill>
+            <a:ln>
+              <a:noFill/>
+            </a:ln>
+          </p:spPr>
+          <p:txBody>
+            <a:bodyPr/>
+            <a:lstStyle/>
+            <a:p>
+              <a:endParaRPr lang="en-AU"/>
+            </a:p>
+          </p:txBody>
+        </p:sp>
+        <p:sp>
+          <p:nvSpPr>
+            <p:cNvPr id="28" name="Freeform 8">
+              <a:extLst>
+                <a:ext uri="{FF2B5EF4-FFF2-40B4-BE49-F238E27FC236}">
+                  <a16:creationId xmlns:a16="http://schemas.microsoft.com/office/drawing/2014/main" id="{653620E7-B03C-48E2-8561-FCA918F8D0DF}"/>
+                </a:ext>
+                <a:ext uri="{C183D7F6-B498-43B3-948B-1728B52AA6E4}">
+                  <adec:decorative xmlns:adec="http://schemas.microsoft.com/office/drawing/2017/decorative" val="1"/>
+                </a:ext>
+              </a:extLst>
+            </p:cNvPr>
+            <p:cNvSpPr/>
+            <p:nvPr>
+              <p:extLst>
+                <p:ext uri="{386F3935-93C4-4BCD-93E2-E3B085C9AB24}">
+                  <p16:designElem xmlns:p16="http://schemas.microsoft.com/office/powerpoint/2015/main" val="1"/>
+                </p:ext>
+              </p:extLst>
+            </p:nvPr>
+          </p:nvSpPr>
+          <p:spPr bwMode="auto">
+            <a:xfrm>
+              <a:off x="1320800" y="5238750"/>
+              <a:ext cx="1228725" cy="1619250"/>
+            </a:xfrm>
+            <a:custGeom>
+              <a:avLst/>
+              <a:gdLst/>
+              <a:ahLst/>
+              <a:cxnLst/>
+              <a:rect l="0" t="0" r="r" b="b"/>
+              <a:pathLst>
+                <a:path w="774" h="1020">
+                  <a:moveTo>
+                    <a:pt x="0" y="0"/>
+                  </a:moveTo>
+                  <a:lnTo>
+                    <a:pt x="740" y="1020"/>
+                  </a:lnTo>
+                  <a:lnTo>
+                    <a:pt x="774" y="1020"/>
+                  </a:lnTo>
+                  <a:lnTo>
+                    <a:pt x="0" y="0"/>
+                  </a:lnTo>
+                  <a:close/>
+                </a:path>
+              </a:pathLst>
+            </a:custGeom>
+            <a:solidFill>
+              <a:schemeClr val="tx1">
+                <a:lumMod val="85000"/>
+                <a:lumOff val="15000"/>
+              </a:schemeClr>
+            </a:solidFill>
+            <a:ln>
+              <a:noFill/>
+            </a:ln>
+          </p:spPr>
+          <p:txBody>
+            <a:bodyPr/>
+            <a:lstStyle/>
+            <a:p>
+              <a:endParaRPr lang="en-AU"/>
+            </a:p>
+          </p:txBody>
+        </p:sp>
+        <p:sp>
+          <p:nvSpPr>
+            <p:cNvPr id="29" name="Freeform 9">
+              <a:extLst>
+                <a:ext uri="{FF2B5EF4-FFF2-40B4-BE49-F238E27FC236}">
+                  <a16:creationId xmlns:a16="http://schemas.microsoft.com/office/drawing/2014/main" id="{108701B4-8FEE-43D1-9954-9C064D75C4A5}"/>
+                </a:ext>
+                <a:ext uri="{C183D7F6-B498-43B3-948B-1728B52AA6E4}">
+                  <adec:decorative xmlns:adec="http://schemas.microsoft.com/office/drawing/2017/decorative" val="1"/>
+                </a:ext>
+              </a:extLst>
+            </p:cNvPr>
+            <p:cNvSpPr/>
+            <p:nvPr>
+              <p:extLst>
+                <p:ext uri="{386F3935-93C4-4BCD-93E2-E3B085C9AB24}">
+                  <p16:designElem xmlns:p16="http://schemas.microsoft.com/office/powerpoint/2015/main" val="1"/>
+                </p:ext>
+              </p:extLst>
+            </p:nvPr>
+          </p:nvSpPr>
+          <p:spPr bwMode="auto">
+            <a:xfrm>
+              <a:off x="1627188" y="5291138"/>
+              <a:ext cx="1495425" cy="1566863"/>
+            </a:xfrm>
+            <a:custGeom>
+              <a:avLst/>
+              <a:gdLst/>
+              <a:ahLst/>
+              <a:cxnLst/>
+              <a:rect l="0" t="0" r="r" b="b"/>
+              <a:pathLst>
+                <a:path w="942" h="987">
+                  <a:moveTo>
+                    <a:pt x="0" y="0"/>
+                  </a:moveTo>
+                  <a:lnTo>
+                    <a:pt x="909" y="987"/>
+                  </a:lnTo>
+                  <a:lnTo>
+                    <a:pt x="942" y="987"/>
+                  </a:lnTo>
+                  <a:lnTo>
+                    <a:pt x="0" y="0"/>
+                  </a:lnTo>
+                  <a:close/>
+                </a:path>
+              </a:pathLst>
+            </a:custGeom>
+            <a:solidFill>
+              <a:schemeClr val="accent1">
+                <a:lumMod val="50000"/>
+              </a:schemeClr>
+            </a:solidFill>
+            <a:ln>
+              <a:noFill/>
+            </a:ln>
+          </p:spPr>
+          <p:txBody>
+            <a:bodyPr/>
+            <a:lstStyle/>
+            <a:p>
+              <a:endParaRPr lang="en-AU"/>
+            </a:p>
+          </p:txBody>
+        </p:sp>
+        <p:sp>
+          <p:nvSpPr>
+            <p:cNvPr id="30" name="Freeform 10">
+              <a:extLst>
+                <a:ext uri="{FF2B5EF4-FFF2-40B4-BE49-F238E27FC236}">
+                  <a16:creationId xmlns:a16="http://schemas.microsoft.com/office/drawing/2014/main" id="{99E0FE54-1668-4AD5-9242-892A6323B9DC}"/>
+                </a:ext>
+                <a:ext uri="{C183D7F6-B498-43B3-948B-1728B52AA6E4}">
+                  <adec:decorative xmlns:adec="http://schemas.microsoft.com/office/drawing/2017/decorative" val="1"/>
+                </a:ext>
+              </a:extLst>
+            </p:cNvPr>
+            <p:cNvSpPr/>
+            <p:nvPr>
+              <p:extLst>
+                <p:ext uri="{386F3935-93C4-4BCD-93E2-E3B085C9AB24}">
+                  <p16:designElem xmlns:p16="http://schemas.microsoft.com/office/powerpoint/2015/main" val="1"/>
+                </p:ext>
+              </p:extLst>
+            </p:nvPr>
+          </p:nvSpPr>
+          <p:spPr bwMode="auto">
+            <a:xfrm>
+              <a:off x="1627188" y="5286375"/>
+              <a:ext cx="2130425" cy="1571625"/>
+            </a:xfrm>
+            <a:custGeom>
+              <a:avLst/>
+              <a:gdLst/>
+              <a:ahLst/>
+              <a:cxnLst/>
+              <a:rect l="0" t="0" r="r" b="b"/>
+              <a:pathLst>
+                <a:path w="1342" h="990">
+                  <a:moveTo>
+                    <a:pt x="0" y="3"/>
+                  </a:moveTo>
+                  <a:lnTo>
+                    <a:pt x="942" y="990"/>
+                  </a:lnTo>
+                  <a:lnTo>
+                    <a:pt x="1342" y="990"/>
+                  </a:lnTo>
+                  <a:lnTo>
+                    <a:pt x="156" y="27"/>
+                  </a:lnTo>
+                  <a:lnTo>
+                    <a:pt x="0" y="0"/>
+                  </a:lnTo>
+                  <a:lnTo>
+                    <a:pt x="0" y="3"/>
+                  </a:lnTo>
+                  <a:close/>
+                </a:path>
+              </a:pathLst>
+            </a:custGeom>
+            <a:solidFill>
+              <a:schemeClr val="accent1">
+                <a:lumMod val="75000"/>
+              </a:schemeClr>
+            </a:solidFill>
+            <a:ln>
+              <a:noFill/>
+            </a:ln>
+          </p:spPr>
+          <p:txBody>
+            <a:bodyPr/>
+            <a:lstStyle/>
+            <a:p>
+              <a:endParaRPr lang="en-AU"/>
+            </a:p>
+          </p:txBody>
+        </p:sp>
+        <p:sp>
+          <p:nvSpPr>
+            <p:cNvPr id="31" name="Freeform 11">
+              <a:extLst>
+                <a:ext uri="{FF2B5EF4-FFF2-40B4-BE49-F238E27FC236}">
+                  <a16:creationId xmlns:a16="http://schemas.microsoft.com/office/drawing/2014/main" id="{75498FE5-B57D-4FD9-81E0-4E1CB65C0E1A}"/>
+                </a:ext>
+                <a:ext uri="{C183D7F6-B498-43B3-948B-1728B52AA6E4}">
+                  <adec:decorative xmlns:adec="http://schemas.microsoft.com/office/drawing/2017/decorative" val="1"/>
+                </a:ext>
+              </a:extLst>
+            </p:cNvPr>
+            <p:cNvSpPr/>
+            <p:nvPr>
+              <p:extLst>
+                <p:ext uri="{386F3935-93C4-4BCD-93E2-E3B085C9AB24}">
+                  <p16:designElem xmlns:p16="http://schemas.microsoft.com/office/powerpoint/2015/main" val="1"/>
+                </p:ext>
+              </p:extLst>
+            </p:nvPr>
+          </p:nvSpPr>
+          <p:spPr bwMode="auto">
+            <a:xfrm>
+              <a:off x="1320800" y="5238750"/>
+              <a:ext cx="1695450" cy="1619250"/>
+            </a:xfrm>
+            <a:custGeom>
+              <a:avLst/>
+              <a:gdLst/>
+              <a:ahLst/>
+              <a:cxnLst/>
+              <a:rect l="0" t="0" r="r" b="b"/>
+              <a:pathLst>
+                <a:path w="1068" h="1020">
+                  <a:moveTo>
+                    <a:pt x="1068" y="1020"/>
+                  </a:moveTo>
+                  <a:lnTo>
+                    <a:pt x="184" y="60"/>
+                  </a:lnTo>
+                  <a:lnTo>
+                    <a:pt x="154" y="27"/>
+                  </a:lnTo>
+                  <a:lnTo>
+                    <a:pt x="157" y="27"/>
+                  </a:lnTo>
+                  <a:lnTo>
+                    <a:pt x="157" y="24"/>
+                  </a:lnTo>
+                  <a:lnTo>
+                    <a:pt x="154" y="24"/>
+                  </a:lnTo>
+                  <a:lnTo>
+                    <a:pt x="0" y="0"/>
+                  </a:lnTo>
+                  <a:lnTo>
+                    <a:pt x="0" y="0"/>
+                  </a:lnTo>
+                  <a:lnTo>
+                    <a:pt x="774" y="1020"/>
+                  </a:lnTo>
+                  <a:lnTo>
+                    <a:pt x="1068" y="1020"/>
+                  </a:lnTo>
+                  <a:close/>
+                </a:path>
+              </a:pathLst>
+            </a:custGeom>
+            <a:solidFill>
+              <a:schemeClr val="tx1">
+                <a:lumMod val="75000"/>
+                <a:lumOff val="25000"/>
+              </a:schemeClr>
+            </a:solidFill>
+            <a:ln>
+              <a:noFill/>
+            </a:ln>
+          </p:spPr>
+          <p:txBody>
+            <a:bodyPr/>
+            <a:lstStyle/>
+            <a:p>
+              <a:endParaRPr lang="en-AU"/>
+            </a:p>
+          </p:txBody>
+        </p:sp>
+      </p:grpSp>
+      <p:pic>
+        <p:nvPicPr>
+          <p:cNvPr id="8" name="Picture 7" descr="A graph showing the growth of a company&#10;&#10;Description automatically generated">
             <a:extLst>
               <a:ext uri="{FF2B5EF4-FFF2-40B4-BE49-F238E27FC236}">
-                <a16:creationId xmlns:a16="http://schemas.microsoft.com/office/drawing/2014/main" id="{08F1A80E-02D1-C542-21BD-8EF82BCA9363}"/>
+                <a16:creationId xmlns:a16="http://schemas.microsoft.com/office/drawing/2014/main" id="{D6F6F872-FB4A-4B18-B4AD-E7C22137880F}"/>
               </a:ext>
             </a:extLst>
           </p:cNvPr>
-          <p:cNvSpPr>
-            <a:spLocks noGrp="1"/>
-          </p:cNvSpPr>
-          <p:nvPr>
-            <p:ph type="body" sz="quarter" idx="3"/>
-          </p:nvPr>
-        </p:nvSpPr>
+          <p:cNvPicPr>
+            <a:picLocks noChangeAspect="1"/>
+          </p:cNvPicPr>
+          <p:nvPr/>
+        </p:nvPicPr>
+        <p:blipFill>
+          <a:blip r:embed="rId2">
+            <a:extLst>
+              <a:ext uri="{28A0092B-C50C-407E-A947-70E740481C1C}">
+                <a14:useLocalDpi xmlns:a14="http://schemas.microsoft.com/office/drawing/2010/main" val="0"/>
+              </a:ext>
+            </a:extLst>
+          </a:blip>
+          <a:stretch>
+            <a:fillRect/>
+          </a:stretch>
+        </p:blipFill>
         <p:spPr>
           <a:xfrm>
-            <a:off x="6607967" y="2746597"/>
-            <a:ext cx="4895056" cy="576262"/>
+            <a:off x="410971" y="339496"/>
+            <a:ext cx="5685029" cy="3979211"/>
           </a:xfrm>
+          <a:prstGeom prst="rect">
+            <a:avLst/>
+          </a:prstGeom>
         </p:spPr>
-        <p:txBody>
-          <a:bodyPr/>
-          <a:lstStyle/>
-          <a:p>
-            <a:r>
-              <a:rPr lang="en-US" dirty="0"/>
-              <a:t>Major Contributors?</a:t>
-            </a:r>
-          </a:p>
-        </p:txBody>
-      </p:sp>
-      <p:sp>
-        <p:nvSpPr>
-          <p:cNvPr id="17" name="Content Placeholder 16">
+      </p:pic>
+      <p:graphicFrame>
+        <p:nvGraphicFramePr>
+          <p:cNvPr id="11" name="Table 10">
             <a:extLst>
               <a:ext uri="{FF2B5EF4-FFF2-40B4-BE49-F238E27FC236}">
-                <a16:creationId xmlns:a16="http://schemas.microsoft.com/office/drawing/2014/main" id="{400F3555-92B0-41A4-B265-726493F82DD2}"/>
+                <a16:creationId xmlns:a16="http://schemas.microsoft.com/office/drawing/2014/main" id="{EE99C4A7-BADC-576D-5B37-5FEF1A9FF1B9}"/>
               </a:ext>
             </a:extLst>
           </p:cNvPr>
-          <p:cNvSpPr>
-            <a:spLocks noGrp="1"/>
-          </p:cNvSpPr>
-          <p:nvPr>
-            <p:ph sz="quarter" idx="4"/>
-          </p:nvPr>
-        </p:nvSpPr>
-        <p:spPr/>
-        <p:txBody>
-          <a:bodyPr/>
-          <a:lstStyle/>
-          <a:p>
-            <a:pPr>
-              <a:buFont typeface="Wingdings" panose="05000000000000000000" pitchFamily="2" charset="2"/>
-              <a:buChar char="Ø"/>
-            </a:pPr>
-            <a:r>
-              <a:rPr lang="en-US" dirty="0"/>
-              <a:t>Economic conditions</a:t>
-            </a:r>
-          </a:p>
-          <a:p>
-            <a:pPr lvl="1">
-              <a:buFont typeface="Wingdings" panose="05000000000000000000" pitchFamily="2" charset="2"/>
-              <a:buChar char="§"/>
-            </a:pPr>
-            <a:r>
-              <a:rPr lang="en-US" dirty="0"/>
-              <a:t>Average income</a:t>
-            </a:r>
-          </a:p>
-          <a:p>
-            <a:pPr lvl="1">
-              <a:buFont typeface="Wingdings" panose="05000000000000000000" pitchFamily="2" charset="2"/>
-              <a:buChar char="§"/>
-            </a:pPr>
-            <a:r>
-              <a:rPr lang="en-US" dirty="0"/>
-              <a:t>GDP vs Population</a:t>
-            </a:r>
-          </a:p>
-          <a:p>
-            <a:pPr>
-              <a:buFont typeface="Wingdings" panose="05000000000000000000" pitchFamily="2" charset="2"/>
-              <a:buChar char="Ø"/>
-            </a:pPr>
-            <a:r>
-              <a:rPr lang="en-US" dirty="0"/>
-              <a:t>Country </a:t>
-            </a:r>
-            <a:r>
-              <a:rPr lang="en-US" dirty="0" err="1"/>
-              <a:t>categorisation</a:t>
-            </a:r>
-            <a:r>
-              <a:rPr lang="en-US" dirty="0"/>
-              <a:t> </a:t>
-            </a:r>
-          </a:p>
-          <a:p>
-            <a:pPr lvl="1">
-              <a:buFont typeface="Wingdings" panose="05000000000000000000" pitchFamily="2" charset="2"/>
-              <a:buChar char="§"/>
-            </a:pPr>
-            <a:r>
-              <a:rPr lang="en-US" dirty="0"/>
-              <a:t>Better or worse?</a:t>
-            </a:r>
-          </a:p>
-          <a:p>
-            <a:pPr>
-              <a:buFont typeface="Wingdings" panose="05000000000000000000" pitchFamily="2" charset="2"/>
-              <a:buChar char="§"/>
-            </a:pPr>
-            <a:endParaRPr lang="en-AU" dirty="0"/>
-          </a:p>
-        </p:txBody>
-      </p:sp>
+          <p:cNvGraphicFramePr>
+            <a:graphicFrameLocks noGrp="1"/>
+          </p:cNvGraphicFramePr>
+          <p:nvPr>
+            <p:extLst>
+              <p:ext uri="{D42A27DB-BD31-4B8C-83A1-F6EECF244321}">
+                <p14:modId xmlns:p14="http://schemas.microsoft.com/office/powerpoint/2010/main" val="1775871190"/>
+              </p:ext>
+            </p:extLst>
+          </p:nvPr>
+        </p:nvGraphicFramePr>
+        <p:xfrm>
+          <a:off x="143174" y="4519149"/>
+          <a:ext cx="7214681" cy="1845174"/>
+        </p:xfrm>
+        <a:graphic>
+          <a:graphicData uri="http://schemas.openxmlformats.org/drawingml/2006/table">
+            <a:tbl>
+              <a:tblPr firstRow="1" bandRow="1">
+                <a:tableStyleId>{5C22544A-7EE6-4342-B048-85BDC9FD1C3A}</a:tableStyleId>
+              </a:tblPr>
+              <a:tblGrid>
+                <a:gridCol w="1823999">
+                  <a:extLst>
+                    <a:ext uri="{9D8B030D-6E8A-4147-A177-3AD203B41FA5}">
+                      <a16:colId xmlns:a16="http://schemas.microsoft.com/office/drawing/2014/main" val="3327816420"/>
+                    </a:ext>
+                  </a:extLst>
+                </a:gridCol>
+                <a:gridCol w="1796894">
+                  <a:extLst>
+                    <a:ext uri="{9D8B030D-6E8A-4147-A177-3AD203B41FA5}">
+                      <a16:colId xmlns:a16="http://schemas.microsoft.com/office/drawing/2014/main" val="2739071117"/>
+                    </a:ext>
+                  </a:extLst>
+                </a:gridCol>
+                <a:gridCol w="1796894">
+                  <a:extLst>
+                    <a:ext uri="{9D8B030D-6E8A-4147-A177-3AD203B41FA5}">
+                      <a16:colId xmlns:a16="http://schemas.microsoft.com/office/drawing/2014/main" val="576044105"/>
+                    </a:ext>
+                  </a:extLst>
+                </a:gridCol>
+                <a:gridCol w="1796894">
+                  <a:extLst>
+                    <a:ext uri="{9D8B030D-6E8A-4147-A177-3AD203B41FA5}">
+                      <a16:colId xmlns:a16="http://schemas.microsoft.com/office/drawing/2014/main" val="2070890420"/>
+                    </a:ext>
+                  </a:extLst>
+                </a:gridCol>
+              </a:tblGrid>
+              <a:tr h="391895">
+                <a:tc gridSpan="4">
+                  <a:txBody>
+                    <a:bodyPr/>
+                    <a:lstStyle/>
+                    <a:p>
+                      <a:pPr algn="ctr"/>
+                      <a:r>
+                        <a:rPr lang="en-US" sz="1800" b="1" kern="1200" dirty="0">
+                          <a:solidFill>
+                            <a:schemeClr val="tx1"/>
+                          </a:solidFill>
+                          <a:latin typeface="+mn-lt"/>
+                          <a:ea typeface="+mn-ea"/>
+                          <a:cs typeface="+mn-cs"/>
+                        </a:rPr>
+                        <a:t>CO2 emissions growth</a:t>
+                      </a:r>
+                      <a:endParaRPr lang="en-AU" dirty="0"/>
+                    </a:p>
+                  </a:txBody>
+                  <a:tcPr/>
+                </a:tc>
+                <a:tc hMerge="1">
+                  <a:txBody>
+                    <a:bodyPr/>
+                    <a:lstStyle/>
+                    <a:p>
+                      <a:endParaRPr lang="en-AU" dirty="0"/>
+                    </a:p>
+                  </a:txBody>
+                  <a:tcPr/>
+                </a:tc>
+                <a:tc hMerge="1">
+                  <a:txBody>
+                    <a:bodyPr/>
+                    <a:lstStyle/>
+                    <a:p>
+                      <a:pPr algn="ctr"/>
+                      <a:endParaRPr lang="en-AU" dirty="0"/>
+                    </a:p>
+                  </a:txBody>
+                  <a:tcPr/>
+                </a:tc>
+                <a:tc hMerge="1">
+                  <a:txBody>
+                    <a:bodyPr/>
+                    <a:lstStyle/>
+                    <a:p>
+                      <a:pPr algn="ctr"/>
+                      <a:endParaRPr lang="en-AU" dirty="0"/>
+                    </a:p>
+                  </a:txBody>
+                  <a:tcPr/>
+                </a:tc>
+                <a:extLst>
+                  <a:ext uri="{0D108BD9-81ED-4DB2-BD59-A6C34878D82A}">
+                    <a16:rowId xmlns:a16="http://schemas.microsoft.com/office/drawing/2014/main" val="4243932218"/>
+                  </a:ext>
+                </a:extLst>
+              </a:tr>
+              <a:tr h="685817">
+                <a:tc>
+                  <a:txBody>
+                    <a:bodyPr/>
+                    <a:lstStyle/>
+                    <a:p>
+                      <a:pPr marL="0" marR="0" lvl="0" indent="0" algn="l" defTabSz="457200" rtl="0" eaLnBrk="1" fontAlgn="auto" latinLnBrk="0" hangingPunct="1">
+                        <a:lnSpc>
+                          <a:spcPct val="100000"/>
+                        </a:lnSpc>
+                        <a:spcBef>
+                          <a:spcPts val="0"/>
+                        </a:spcBef>
+                        <a:spcAft>
+                          <a:spcPts val="0"/>
+                        </a:spcAft>
+                        <a:buClrTx/>
+                        <a:buSzTx/>
+                        <a:buFontTx/>
+                        <a:buNone/>
+                        <a:tabLst/>
+                        <a:defRPr/>
+                      </a:pPr>
+                      <a:r>
+                        <a:rPr lang="en-US" sz="1800" kern="1200" dirty="0">
+                          <a:solidFill>
+                            <a:schemeClr val="tx1"/>
+                          </a:solidFill>
+                          <a:latin typeface="+mn-lt"/>
+                          <a:ea typeface="+mn-ea"/>
+                          <a:cs typeface="+mn-cs"/>
+                        </a:rPr>
+                        <a:t>1950’s – </a:t>
+                      </a:r>
+                      <a:r>
+                        <a:rPr lang="en-US" sz="1800" b="1" kern="1200" dirty="0">
+                          <a:solidFill>
+                            <a:schemeClr val="tx1"/>
+                          </a:solidFill>
+                          <a:latin typeface="+mn-lt"/>
+                          <a:ea typeface="+mn-ea"/>
+                          <a:cs typeface="+mn-cs"/>
+                        </a:rPr>
+                        <a:t>42.15%</a:t>
+                      </a:r>
+                    </a:p>
+                    <a:p>
+                      <a:endParaRPr lang="en-AU" dirty="0"/>
+                    </a:p>
+                  </a:txBody>
+                  <a:tcPr/>
+                </a:tc>
+                <a:tc>
+                  <a:txBody>
+                    <a:bodyPr/>
+                    <a:lstStyle/>
+                    <a:p>
+                      <a:pPr marL="0" marR="0" lvl="0" indent="0" algn="l" defTabSz="457200" rtl="0" eaLnBrk="1" fontAlgn="auto" latinLnBrk="0" hangingPunct="1">
+                        <a:lnSpc>
+                          <a:spcPct val="100000"/>
+                        </a:lnSpc>
+                        <a:spcBef>
+                          <a:spcPts val="0"/>
+                        </a:spcBef>
+                        <a:spcAft>
+                          <a:spcPts val="0"/>
+                        </a:spcAft>
+                        <a:buClrTx/>
+                        <a:buSzTx/>
+                        <a:buFontTx/>
+                        <a:buNone/>
+                        <a:tabLst/>
+                        <a:defRPr/>
+                      </a:pPr>
+                      <a:r>
+                        <a:rPr lang="en-US" sz="1800" kern="1200" dirty="0">
+                          <a:solidFill>
+                            <a:schemeClr val="tx1"/>
+                          </a:solidFill>
+                          <a:latin typeface="+mn-lt"/>
+                          <a:ea typeface="+mn-ea"/>
+                          <a:cs typeface="+mn-cs"/>
+                        </a:rPr>
+                        <a:t>1960’s – 16.33%</a:t>
+                      </a:r>
+                    </a:p>
+                    <a:p>
+                      <a:endParaRPr lang="en-AU" dirty="0"/>
+                    </a:p>
+                  </a:txBody>
+                  <a:tcPr/>
+                </a:tc>
+                <a:tc>
+                  <a:txBody>
+                    <a:bodyPr/>
+                    <a:lstStyle/>
+                    <a:p>
+                      <a:pPr marL="0" marR="0" lvl="0" indent="0" algn="l" defTabSz="457200" rtl="0" eaLnBrk="1" fontAlgn="auto" latinLnBrk="0" hangingPunct="1">
+                        <a:lnSpc>
+                          <a:spcPct val="100000"/>
+                        </a:lnSpc>
+                        <a:spcBef>
+                          <a:spcPts val="0"/>
+                        </a:spcBef>
+                        <a:spcAft>
+                          <a:spcPts val="0"/>
+                        </a:spcAft>
+                        <a:buClrTx/>
+                        <a:buSzTx/>
+                        <a:buFontTx/>
+                        <a:buNone/>
+                        <a:tabLst/>
+                        <a:defRPr/>
+                      </a:pPr>
+                      <a:r>
+                        <a:rPr lang="en-US" sz="1800" kern="1200" dirty="0">
+                          <a:solidFill>
+                            <a:schemeClr val="tx1"/>
+                          </a:solidFill>
+                          <a:latin typeface="+mn-lt"/>
+                          <a:ea typeface="+mn-ea"/>
+                          <a:cs typeface="+mn-cs"/>
+                        </a:rPr>
+                        <a:t>1970’s – 8.28%</a:t>
+                      </a:r>
+                    </a:p>
+                    <a:p>
+                      <a:endParaRPr lang="en-AU" dirty="0"/>
+                    </a:p>
+                  </a:txBody>
+                  <a:tcPr/>
+                </a:tc>
+                <a:tc>
+                  <a:txBody>
+                    <a:bodyPr/>
+                    <a:lstStyle/>
+                    <a:p>
+                      <a:pPr marL="0" marR="0" lvl="0" indent="0" algn="l" defTabSz="457200" rtl="0" eaLnBrk="1" fontAlgn="auto" latinLnBrk="0" hangingPunct="1">
+                        <a:lnSpc>
+                          <a:spcPct val="100000"/>
+                        </a:lnSpc>
+                        <a:spcBef>
+                          <a:spcPts val="0"/>
+                        </a:spcBef>
+                        <a:spcAft>
+                          <a:spcPts val="0"/>
+                        </a:spcAft>
+                        <a:buClrTx/>
+                        <a:buSzTx/>
+                        <a:buFontTx/>
+                        <a:buNone/>
+                        <a:tabLst/>
+                        <a:defRPr/>
+                      </a:pPr>
+                      <a:r>
+                        <a:rPr lang="en-US" sz="1800" kern="1200" dirty="0">
+                          <a:solidFill>
+                            <a:schemeClr val="tx1"/>
+                          </a:solidFill>
+                          <a:latin typeface="+mn-lt"/>
+                          <a:ea typeface="+mn-ea"/>
+                          <a:cs typeface="+mn-cs"/>
+                        </a:rPr>
+                        <a:t>1980’s – 4.39%</a:t>
+                      </a:r>
+                    </a:p>
+                    <a:p>
+                      <a:endParaRPr lang="en-AU" dirty="0"/>
+                    </a:p>
+                  </a:txBody>
+                  <a:tcPr/>
+                </a:tc>
+                <a:extLst>
+                  <a:ext uri="{0D108BD9-81ED-4DB2-BD59-A6C34878D82A}">
+                    <a16:rowId xmlns:a16="http://schemas.microsoft.com/office/drawing/2014/main" val="3055730974"/>
+                  </a:ext>
+                </a:extLst>
+              </a:tr>
+              <a:tr h="767462">
+                <a:tc>
+                  <a:txBody>
+                    <a:bodyPr/>
+                    <a:lstStyle/>
+                    <a:p>
+                      <a:pPr defTabSz="306324">
+                        <a:spcAft>
+                          <a:spcPts val="600"/>
+                        </a:spcAft>
+                        <a:buFont typeface="Wingdings" panose="05000000000000000000" pitchFamily="2" charset="2"/>
+                        <a:buNone/>
+                      </a:pPr>
+                      <a:r>
+                        <a:rPr lang="en-US" sz="1800" kern="1200" dirty="0">
+                          <a:solidFill>
+                            <a:schemeClr val="tx1"/>
+                          </a:solidFill>
+                          <a:latin typeface="+mn-lt"/>
+                          <a:ea typeface="+mn-ea"/>
+                          <a:cs typeface="+mn-cs"/>
+                        </a:rPr>
+                        <a:t>1990’s – 4.95%</a:t>
+                      </a:r>
+                    </a:p>
+                    <a:p>
+                      <a:endParaRPr lang="en-AU" dirty="0"/>
+                    </a:p>
+                  </a:txBody>
+                  <a:tcPr/>
+                </a:tc>
+                <a:tc>
+                  <a:txBody>
+                    <a:bodyPr/>
+                    <a:lstStyle/>
+                    <a:p>
+                      <a:pPr marL="0" marR="0" lvl="0" indent="0" algn="l" defTabSz="457200" rtl="0" eaLnBrk="1" fontAlgn="auto" latinLnBrk="0" hangingPunct="1">
+                        <a:lnSpc>
+                          <a:spcPct val="100000"/>
+                        </a:lnSpc>
+                        <a:spcBef>
+                          <a:spcPts val="0"/>
+                        </a:spcBef>
+                        <a:spcAft>
+                          <a:spcPts val="0"/>
+                        </a:spcAft>
+                        <a:buClrTx/>
+                        <a:buSzTx/>
+                        <a:buFontTx/>
+                        <a:buNone/>
+                        <a:tabLst/>
+                        <a:defRPr/>
+                      </a:pPr>
+                      <a:r>
+                        <a:rPr lang="en-US" sz="1800" kern="1200" dirty="0">
+                          <a:solidFill>
+                            <a:schemeClr val="tx1"/>
+                          </a:solidFill>
+                          <a:latin typeface="+mn-lt"/>
+                          <a:ea typeface="+mn-ea"/>
+                          <a:cs typeface="+mn-cs"/>
+                        </a:rPr>
+                        <a:t>2000’s - </a:t>
+                      </a:r>
+                      <a:r>
+                        <a:rPr lang="en-US" sz="1800" b="1" kern="1200" dirty="0">
+                          <a:solidFill>
+                            <a:schemeClr val="tx1"/>
+                          </a:solidFill>
+                          <a:latin typeface="+mn-lt"/>
+                          <a:ea typeface="+mn-ea"/>
+                          <a:cs typeface="+mn-cs"/>
+                        </a:rPr>
+                        <a:t>5.26%</a:t>
+                      </a:r>
+                    </a:p>
+                    <a:p>
+                      <a:endParaRPr lang="en-AU" dirty="0"/>
+                    </a:p>
+                  </a:txBody>
+                  <a:tcPr/>
+                </a:tc>
+                <a:tc>
+                  <a:txBody>
+                    <a:bodyPr/>
+                    <a:lstStyle/>
+                    <a:p>
+                      <a:pPr marL="0" marR="0" lvl="0" indent="0" algn="l" defTabSz="457200" rtl="0" eaLnBrk="1" fontAlgn="auto" latinLnBrk="0" hangingPunct="1">
+                        <a:lnSpc>
+                          <a:spcPct val="100000"/>
+                        </a:lnSpc>
+                        <a:spcBef>
+                          <a:spcPts val="0"/>
+                        </a:spcBef>
+                        <a:spcAft>
+                          <a:spcPts val="0"/>
+                        </a:spcAft>
+                        <a:buClrTx/>
+                        <a:buSzTx/>
+                        <a:buFontTx/>
+                        <a:buNone/>
+                        <a:tabLst/>
+                        <a:defRPr/>
+                      </a:pPr>
+                      <a:r>
+                        <a:rPr lang="en-US" sz="1800" kern="1200" dirty="0">
+                          <a:solidFill>
+                            <a:schemeClr val="tx1"/>
+                          </a:solidFill>
+                          <a:latin typeface="+mn-lt"/>
+                          <a:ea typeface="+mn-ea"/>
+                          <a:cs typeface="+mn-cs"/>
+                        </a:rPr>
+                        <a:t>2010’s - 2.92%</a:t>
+                      </a:r>
+                      <a:endParaRPr lang="en-AU" dirty="0"/>
+                    </a:p>
+                    <a:p>
+                      <a:endParaRPr lang="en-AU" dirty="0"/>
+                    </a:p>
+                  </a:txBody>
+                  <a:tcPr/>
+                </a:tc>
+                <a:tc>
+                  <a:txBody>
+                    <a:bodyPr/>
+                    <a:lstStyle/>
+                    <a:p>
+                      <a:endParaRPr lang="en-AU" dirty="0"/>
+                    </a:p>
+                  </a:txBody>
+                  <a:tcPr/>
+                </a:tc>
+                <a:extLst>
+                  <a:ext uri="{0D108BD9-81ED-4DB2-BD59-A6C34878D82A}">
+                    <a16:rowId xmlns:a16="http://schemas.microsoft.com/office/drawing/2014/main" val="1756029741"/>
+                  </a:ext>
+                </a:extLst>
+              </a:tr>
+            </a:tbl>
+          </a:graphicData>
+        </a:graphic>
+      </p:graphicFrame>
+      <p:graphicFrame>
+        <p:nvGraphicFramePr>
+          <p:cNvPr id="10" name="Table 9">
+            <a:extLst>
+              <a:ext uri="{FF2B5EF4-FFF2-40B4-BE49-F238E27FC236}">
+                <a16:creationId xmlns:a16="http://schemas.microsoft.com/office/drawing/2014/main" id="{24CB3069-A418-D936-584D-922DF9774CA2}"/>
+              </a:ext>
+            </a:extLst>
+          </p:cNvPr>
+          <p:cNvGraphicFramePr>
+            <a:graphicFrameLocks noGrp="1"/>
+          </p:cNvGraphicFramePr>
+          <p:nvPr>
+            <p:extLst>
+              <p:ext uri="{D42A27DB-BD31-4B8C-83A1-F6EECF244321}">
+                <p14:modId xmlns:p14="http://schemas.microsoft.com/office/powerpoint/2010/main" val="1538397573"/>
+              </p:ext>
+            </p:extLst>
+          </p:nvPr>
+        </p:nvGraphicFramePr>
+        <p:xfrm>
+          <a:off x="150811" y="4519149"/>
+          <a:ext cx="7214681" cy="1845172"/>
+        </p:xfrm>
+        <a:graphic>
+          <a:graphicData uri="http://schemas.openxmlformats.org/drawingml/2006/table">
+            <a:tbl>
+              <a:tblPr firstRow="1" bandRow="1">
+                <a:tableStyleId>{5C22544A-7EE6-4342-B048-85BDC9FD1C3A}</a:tableStyleId>
+              </a:tblPr>
+              <a:tblGrid>
+                <a:gridCol w="3553821">
+                  <a:extLst>
+                    <a:ext uri="{9D8B030D-6E8A-4147-A177-3AD203B41FA5}">
+                      <a16:colId xmlns:a16="http://schemas.microsoft.com/office/drawing/2014/main" val="3798173697"/>
+                    </a:ext>
+                  </a:extLst>
+                </a:gridCol>
+                <a:gridCol w="3660860">
+                  <a:extLst>
+                    <a:ext uri="{9D8B030D-6E8A-4147-A177-3AD203B41FA5}">
+                      <a16:colId xmlns:a16="http://schemas.microsoft.com/office/drawing/2014/main" val="106571549"/>
+                    </a:ext>
+                  </a:extLst>
+                </a:gridCol>
+              </a:tblGrid>
+              <a:tr h="429956">
+                <a:tc gridSpan="2">
+                  <a:txBody>
+                    <a:bodyPr/>
+                    <a:lstStyle/>
+                    <a:p>
+                      <a:pPr marL="0" marR="0" lvl="0" indent="0" algn="ctr" defTabSz="457200" rtl="0" eaLnBrk="1" fontAlgn="auto" latinLnBrk="0" hangingPunct="1">
+                        <a:lnSpc>
+                          <a:spcPct val="100000"/>
+                        </a:lnSpc>
+                        <a:spcBef>
+                          <a:spcPts val="0"/>
+                        </a:spcBef>
+                        <a:spcAft>
+                          <a:spcPts val="0"/>
+                        </a:spcAft>
+                        <a:buClrTx/>
+                        <a:buSzTx/>
+                        <a:buFontTx/>
+                        <a:buNone/>
+                        <a:tabLst/>
+                        <a:defRPr/>
+                      </a:pPr>
+                      <a:r>
+                        <a:rPr lang="en-US" sz="1800" b="1" kern="1200" cap="none" dirty="0">
+                          <a:solidFill>
+                            <a:schemeClr val="tx1"/>
+                          </a:solidFill>
+                          <a:effectLst/>
+                          <a:latin typeface="+mn-lt"/>
+                          <a:ea typeface="+mn-ea"/>
+                          <a:cs typeface="+mn-cs"/>
+                        </a:rPr>
+                        <a:t>Emission Causes</a:t>
+                      </a:r>
+                    </a:p>
+                  </a:txBody>
+                  <a:tcPr/>
+                </a:tc>
+                <a:tc hMerge="1">
+                  <a:txBody>
+                    <a:bodyPr/>
+                    <a:lstStyle/>
+                    <a:p>
+                      <a:endParaRPr lang="en-AU" dirty="0"/>
+                    </a:p>
+                  </a:txBody>
+                  <a:tcPr/>
+                </a:tc>
+                <a:extLst>
+                  <a:ext uri="{0D108BD9-81ED-4DB2-BD59-A6C34878D82A}">
+                    <a16:rowId xmlns:a16="http://schemas.microsoft.com/office/drawing/2014/main" val="547582345"/>
+                  </a:ext>
+                </a:extLst>
+              </a:tr>
+              <a:tr h="519435">
+                <a:tc>
+                  <a:txBody>
+                    <a:bodyPr/>
+                    <a:lstStyle/>
+                    <a:p>
+                      <a:pPr marL="191453" indent="-191453" defTabSz="306324">
+                        <a:lnSpc>
+                          <a:spcPct val="90000"/>
+                        </a:lnSpc>
+                        <a:spcAft>
+                          <a:spcPts val="402"/>
+                        </a:spcAft>
+                        <a:buFont typeface="Wingdings" panose="05000000000000000000" pitchFamily="2" charset="2"/>
+                        <a:buChar char="Ø"/>
+                      </a:pPr>
+                      <a:r>
+                        <a:rPr lang="en-US" sz="1800" kern="1200" cap="none" dirty="0">
+                          <a:solidFill>
+                            <a:schemeClr val="tx1"/>
+                          </a:solidFill>
+                          <a:effectLst/>
+                          <a:latin typeface="+mn-lt"/>
+                          <a:ea typeface="+mn-ea"/>
+                          <a:cs typeface="+mn-cs"/>
+                        </a:rPr>
+                        <a:t>Generating Power</a:t>
+                      </a:r>
+                    </a:p>
+                  </a:txBody>
+                  <a:tcPr/>
+                </a:tc>
+                <a:tc>
+                  <a:txBody>
+                    <a:bodyPr/>
+                    <a:lstStyle/>
+                    <a:p>
+                      <a:pPr marL="191453" indent="-191453" defTabSz="306324">
+                        <a:lnSpc>
+                          <a:spcPct val="90000"/>
+                        </a:lnSpc>
+                        <a:spcAft>
+                          <a:spcPts val="402"/>
+                        </a:spcAft>
+                        <a:buFont typeface="Wingdings" panose="05000000000000000000" pitchFamily="2" charset="2"/>
+                        <a:buChar char="Ø"/>
+                      </a:pPr>
+                      <a:r>
+                        <a:rPr lang="en-US" sz="1800" kern="1200" cap="none" dirty="0">
+                          <a:solidFill>
+                            <a:schemeClr val="tx1"/>
+                          </a:solidFill>
+                          <a:effectLst/>
+                          <a:latin typeface="+mn-lt"/>
+                          <a:ea typeface="+mn-ea"/>
+                          <a:cs typeface="+mn-cs"/>
+                        </a:rPr>
+                        <a:t>Manufacturing Goods</a:t>
+                      </a:r>
+                      <a:endParaRPr lang="en-AU" dirty="0"/>
+                    </a:p>
+                  </a:txBody>
+                  <a:tcPr/>
+                </a:tc>
+                <a:extLst>
+                  <a:ext uri="{0D108BD9-81ED-4DB2-BD59-A6C34878D82A}">
+                    <a16:rowId xmlns:a16="http://schemas.microsoft.com/office/drawing/2014/main" val="1426923699"/>
+                  </a:ext>
+                </a:extLst>
+              </a:tr>
+              <a:tr h="451067">
+                <a:tc>
+                  <a:txBody>
+                    <a:bodyPr/>
+                    <a:lstStyle/>
+                    <a:p>
+                      <a:pPr marL="191453" indent="-191453" defTabSz="306324">
+                        <a:lnSpc>
+                          <a:spcPct val="90000"/>
+                        </a:lnSpc>
+                        <a:spcAft>
+                          <a:spcPts val="402"/>
+                        </a:spcAft>
+                        <a:buFont typeface="Wingdings" panose="05000000000000000000" pitchFamily="2" charset="2"/>
+                        <a:buChar char="Ø"/>
+                      </a:pPr>
+                      <a:r>
+                        <a:rPr lang="en-US" sz="1800" kern="1200" cap="none" dirty="0">
+                          <a:solidFill>
+                            <a:schemeClr val="tx1"/>
+                          </a:solidFill>
+                          <a:effectLst/>
+                          <a:latin typeface="+mn-lt"/>
+                          <a:ea typeface="+mn-ea"/>
+                          <a:cs typeface="+mn-cs"/>
+                        </a:rPr>
+                        <a:t>Using Transportation</a:t>
+                      </a:r>
+                      <a:endParaRPr lang="en-AU" dirty="0"/>
+                    </a:p>
+                  </a:txBody>
+                  <a:tcPr/>
+                </a:tc>
+                <a:tc>
+                  <a:txBody>
+                    <a:bodyPr/>
+                    <a:lstStyle/>
+                    <a:p>
+                      <a:pPr marL="191453" indent="-191453" defTabSz="306324">
+                        <a:lnSpc>
+                          <a:spcPct val="90000"/>
+                        </a:lnSpc>
+                        <a:spcAft>
+                          <a:spcPts val="402"/>
+                        </a:spcAft>
+                        <a:buFont typeface="Wingdings" panose="05000000000000000000" pitchFamily="2" charset="2"/>
+                        <a:buChar char="Ø"/>
+                      </a:pPr>
+                      <a:r>
+                        <a:rPr lang="en-US" sz="1800" kern="1200" cap="none" dirty="0">
+                          <a:solidFill>
+                            <a:schemeClr val="tx1"/>
+                          </a:solidFill>
+                          <a:effectLst/>
+                          <a:latin typeface="+mn-lt"/>
+                          <a:ea typeface="+mn-ea"/>
+                          <a:cs typeface="+mn-cs"/>
+                        </a:rPr>
+                        <a:t>Powering Buildings</a:t>
+                      </a:r>
+                      <a:endParaRPr lang="en-AU" dirty="0"/>
+                    </a:p>
+                  </a:txBody>
+                  <a:tcPr/>
+                </a:tc>
+                <a:extLst>
+                  <a:ext uri="{0D108BD9-81ED-4DB2-BD59-A6C34878D82A}">
+                    <a16:rowId xmlns:a16="http://schemas.microsoft.com/office/drawing/2014/main" val="1119236115"/>
+                  </a:ext>
+                </a:extLst>
+              </a:tr>
+              <a:tr h="444714">
+                <a:tc>
+                  <a:txBody>
+                    <a:bodyPr/>
+                    <a:lstStyle/>
+                    <a:p>
+                      <a:pPr marL="191453" indent="-191453" defTabSz="306324">
+                        <a:lnSpc>
+                          <a:spcPct val="90000"/>
+                        </a:lnSpc>
+                        <a:spcAft>
+                          <a:spcPts val="402"/>
+                        </a:spcAft>
+                        <a:buFont typeface="Wingdings" panose="05000000000000000000" pitchFamily="2" charset="2"/>
+                        <a:buChar char="Ø"/>
+                      </a:pPr>
+                      <a:r>
+                        <a:rPr lang="en-US" sz="1800" kern="1200" cap="none" dirty="0">
+                          <a:solidFill>
+                            <a:schemeClr val="tx1"/>
+                          </a:solidFill>
+                          <a:effectLst/>
+                          <a:latin typeface="+mn-lt"/>
+                          <a:ea typeface="+mn-ea"/>
+                          <a:cs typeface="+mn-cs"/>
+                        </a:rPr>
+                        <a:t>Producing Food</a:t>
+                      </a:r>
+                      <a:endParaRPr lang="en-AU" dirty="0"/>
+                    </a:p>
+                  </a:txBody>
+                  <a:tcPr/>
+                </a:tc>
+                <a:tc>
+                  <a:txBody>
+                    <a:bodyPr/>
+                    <a:lstStyle/>
+                    <a:p>
+                      <a:pPr marL="191453" indent="-191453" defTabSz="306324">
+                        <a:lnSpc>
+                          <a:spcPct val="90000"/>
+                        </a:lnSpc>
+                        <a:spcAft>
+                          <a:spcPts val="402"/>
+                        </a:spcAft>
+                        <a:buFont typeface="Wingdings" panose="05000000000000000000" pitchFamily="2" charset="2"/>
+                        <a:buChar char="Ø"/>
+                      </a:pPr>
+                      <a:r>
+                        <a:rPr lang="en-US" sz="1800" kern="1200" cap="none" dirty="0">
+                          <a:solidFill>
+                            <a:schemeClr val="tx1"/>
+                          </a:solidFill>
+                          <a:effectLst/>
+                          <a:latin typeface="+mn-lt"/>
+                          <a:ea typeface="+mn-ea"/>
+                          <a:cs typeface="+mn-cs"/>
+                        </a:rPr>
+                        <a:t>Consumption</a:t>
+                      </a:r>
+                      <a:endParaRPr lang="en-AU" dirty="0"/>
+                    </a:p>
+                  </a:txBody>
+                  <a:tcPr/>
+                </a:tc>
+                <a:extLst>
+                  <a:ext uri="{0D108BD9-81ED-4DB2-BD59-A6C34878D82A}">
+                    <a16:rowId xmlns:a16="http://schemas.microsoft.com/office/drawing/2014/main" val="791265009"/>
+                  </a:ext>
+                </a:extLst>
+              </a:tr>
+            </a:tbl>
+          </a:graphicData>
+        </a:graphic>
+      </p:graphicFrame>
     </p:spTree>
     <p:extLst>
       <p:ext uri="{BB962C8B-B14F-4D97-AF65-F5344CB8AC3E}">
-        <p14:creationId xmlns:p14="http://schemas.microsoft.com/office/powerpoint/2010/main" val="2694325006"/>
+        <p14:creationId xmlns:p14="http://schemas.microsoft.com/office/powerpoint/2010/main" val="1821918453"/>
       </p:ext>
     </p:extLst>
   </p:cSld>
   <p:clrMapOvr>
     <a:masterClrMapping/>
   </p:clrMapOvr>
+  <p:timing>
+    <p:tnLst>
+      <p:par>
+        <p:cTn id="1" dur="indefinite" restart="never" nodeType="tmRoot">
+          <p:childTnLst>
+            <p:seq concurrent="1" nextAc="seek">
+              <p:cTn id="2" dur="indefinite" nodeType="mainSeq">
+                <p:childTnLst>
+                  <p:par>
+                    <p:cTn id="3" fill="hold">
+                      <p:stCondLst>
+                        <p:cond delay="indefinite"/>
+                      </p:stCondLst>
+                      <p:childTnLst>
+                        <p:par>
+                          <p:cTn id="4" fill="hold">
+                            <p:stCondLst>
+                              <p:cond delay="0"/>
+                            </p:stCondLst>
+                            <p:childTnLst>
+                              <p:par>
+                                <p:cTn id="5" presetID="10" presetClass="entr" presetSubtype="0" fill="hold" nodeType="clickEffect">
+                                  <p:stCondLst>
+                                    <p:cond delay="0"/>
+                                  </p:stCondLst>
+                                  <p:childTnLst>
+                                    <p:set>
+                                      <p:cBhvr>
+                                        <p:cTn id="6" dur="1" fill="hold">
+                                          <p:stCondLst>
+                                            <p:cond delay="0"/>
+                                          </p:stCondLst>
+                                        </p:cTn>
+                                        <p:tgtEl>
+                                          <p:spTgt spid="10"/>
+                                        </p:tgtEl>
+                                        <p:attrNameLst>
+                                          <p:attrName>style.visibility</p:attrName>
+                                        </p:attrNameLst>
+                                      </p:cBhvr>
+                                      <p:to>
+                                        <p:strVal val="visible"/>
+                                      </p:to>
+                                    </p:set>
+                                    <p:animEffect transition="in" filter="fade">
+                                      <p:cBhvr>
+                                        <p:cTn id="7" dur="1500"/>
+                                        <p:tgtEl>
+                                          <p:spTgt spid="10"/>
+                                        </p:tgtEl>
+                                      </p:cBhvr>
+                                    </p:animEffect>
+                                  </p:childTnLst>
+                                </p:cTn>
+                              </p:par>
+                            </p:childTnLst>
+                          </p:cTn>
+                        </p:par>
+                      </p:childTnLst>
+                    </p:cTn>
+                  </p:par>
+                </p:childTnLst>
+              </p:cTn>
+              <p:prevCondLst>
+                <p:cond evt="onPrev" delay="0">
+                  <p:tgtEl>
+                    <p:sldTgt/>
+                  </p:tgtEl>
+                </p:cond>
+              </p:prevCondLst>
+              <p:nextCondLst>
+                <p:cond evt="onNext" delay="0">
+                  <p:tgtEl>
+                    <p:sldTgt/>
+                  </p:tgtEl>
+                </p:cond>
+              </p:nextCondLst>
+            </p:seq>
+          </p:childTnLst>
+        </p:cTn>
+      </p:par>
+    </p:tnLst>
+  </p:timing>
 </p:sld>
 </file>
 
-<file path=ppt/slides/slide4.xml><?xml version="1.0" encoding="utf-8"?>
+<file path=ppt/slides/slide3.xml><?xml version="1.0" encoding="utf-8"?>
 <p:sld xmlns:a="http://schemas.openxmlformats.org/drawingml/2006/main" xmlns:r="http://schemas.openxmlformats.org/officeDocument/2006/relationships" xmlns:p="http://schemas.openxmlformats.org/presentationml/2006/main">
   <p:cSld>
     <p:spTree>
@@ -7970,6 +9510,677 @@
     <p:extLst>
       <p:ext uri="{BB962C8B-B14F-4D97-AF65-F5344CB8AC3E}">
         <p14:creationId xmlns:p14="http://schemas.microsoft.com/office/powerpoint/2010/main" val="1330347484"/>
+      </p:ext>
+    </p:extLst>
+  </p:cSld>
+  <p:clrMapOvr>
+    <a:masterClrMapping/>
+  </p:clrMapOvr>
+</p:sld>
+</file>
+
+<file path=ppt/slides/slide4.xml><?xml version="1.0" encoding="utf-8"?>
+<p:sld xmlns:a="http://schemas.openxmlformats.org/drawingml/2006/main" xmlns:r="http://schemas.openxmlformats.org/officeDocument/2006/relationships" xmlns:p="http://schemas.openxmlformats.org/presentationml/2006/main">
+  <p:cSld>
+    <p:bg>
+      <p:bgPr>
+        <a:blipFill dpi="0" rotWithShape="1">
+          <a:blip r:embed="rId2">
+            <a:duotone>
+              <a:schemeClr val="bg2">
+                <a:shade val="76000"/>
+                <a:satMod val="180000"/>
+              </a:schemeClr>
+              <a:schemeClr val="bg2">
+                <a:tint val="80000"/>
+                <a:satMod val="120000"/>
+                <a:lumMod val="180000"/>
+              </a:schemeClr>
+            </a:duotone>
+            <a:lum/>
+          </a:blip>
+          <a:srcRect/>
+          <a:stretch>
+            <a:fillRect/>
+          </a:stretch>
+        </a:blipFill>
+        <a:effectLst/>
+      </p:bgPr>
+    </p:bg>
+    <p:spTree>
+      <p:nvGrpSpPr>
+        <p:cNvPr id="1" name=""/>
+        <p:cNvGrpSpPr/>
+        <p:nvPr/>
+      </p:nvGrpSpPr>
+      <p:grpSpPr>
+        <a:xfrm>
+          <a:off x="0" y="0"/>
+          <a:ext cx="0" cy="0"/>
+          <a:chOff x="0" y="0"/>
+          <a:chExt cx="0" cy="0"/>
+        </a:xfrm>
+      </p:grpSpPr>
+      <p:sp>
+        <p:nvSpPr>
+          <p:cNvPr id="13" name="Title 12">
+            <a:extLst>
+              <a:ext uri="{FF2B5EF4-FFF2-40B4-BE49-F238E27FC236}">
+                <a16:creationId xmlns:a16="http://schemas.microsoft.com/office/drawing/2014/main" id="{9843AC1B-6679-3685-C925-9EE69154550D}"/>
+              </a:ext>
+            </a:extLst>
+          </p:cNvPr>
+          <p:cNvSpPr>
+            <a:spLocks noGrp="1"/>
+          </p:cNvSpPr>
+          <p:nvPr>
+            <p:ph type="title"/>
+          </p:nvPr>
+        </p:nvSpPr>
+        <p:spPr/>
+        <p:txBody>
+          <a:bodyPr>
+            <a:normAutofit/>
+          </a:bodyPr>
+          <a:lstStyle/>
+          <a:p>
+            <a:r>
+              <a:rPr lang="en-US" sz="4800" dirty="0">
+                <a:ln w="0">
+                  <a:solidFill>
+                    <a:schemeClr val="tx2"/>
+                  </a:solidFill>
+                </a:ln>
+                <a:solidFill>
+                  <a:schemeClr val="accent1"/>
+                </a:solidFill>
+                <a:effectLst>
+                  <a:outerShdw blurRad="38100" dist="25400" dir="5400000" algn="ctr" rotWithShape="0">
+                    <a:srgbClr val="6E747A">
+                      <a:alpha val="43000"/>
+                    </a:srgbClr>
+                  </a:outerShdw>
+                </a:effectLst>
+              </a:rPr>
+              <a:t>Investigate Trends In Emission Data</a:t>
+            </a:r>
+            <a:endParaRPr lang="en-AU" sz="4800" dirty="0">
+              <a:ln w="0">
+                <a:solidFill>
+                  <a:schemeClr val="tx2"/>
+                </a:solidFill>
+              </a:ln>
+              <a:solidFill>
+                <a:schemeClr val="accent1"/>
+              </a:solidFill>
+              <a:effectLst>
+                <a:outerShdw blurRad="38100" dist="25400" dir="5400000" algn="ctr" rotWithShape="0">
+                  <a:srgbClr val="6E747A">
+                    <a:alpha val="43000"/>
+                  </a:srgbClr>
+                </a:outerShdw>
+              </a:effectLst>
+            </a:endParaRPr>
+          </a:p>
+        </p:txBody>
+      </p:sp>
+      <p:sp>
+        <p:nvSpPr>
+          <p:cNvPr id="14" name="Text Placeholder 13">
+            <a:extLst>
+              <a:ext uri="{FF2B5EF4-FFF2-40B4-BE49-F238E27FC236}">
+                <a16:creationId xmlns:a16="http://schemas.microsoft.com/office/drawing/2014/main" id="{C4F5B6E4-5417-E08B-12D8-855217586E5D}"/>
+              </a:ext>
+            </a:extLst>
+          </p:cNvPr>
+          <p:cNvSpPr>
+            <a:spLocks noGrp="1"/>
+          </p:cNvSpPr>
+          <p:nvPr>
+            <p:ph type="body" idx="1"/>
+          </p:nvPr>
+        </p:nvSpPr>
+        <p:spPr>
+          <a:xfrm>
+            <a:off x="1484311" y="2746597"/>
+            <a:ext cx="4607188" cy="576262"/>
+          </a:xfrm>
+        </p:spPr>
+        <p:txBody>
+          <a:bodyPr/>
+          <a:lstStyle/>
+          <a:p>
+            <a:r>
+              <a:rPr lang="en-US" dirty="0"/>
+              <a:t>Examples of Trends</a:t>
+            </a:r>
+          </a:p>
+        </p:txBody>
+      </p:sp>
+      <p:sp>
+        <p:nvSpPr>
+          <p:cNvPr id="15" name="Content Placeholder 14">
+            <a:extLst>
+              <a:ext uri="{FF2B5EF4-FFF2-40B4-BE49-F238E27FC236}">
+                <a16:creationId xmlns:a16="http://schemas.microsoft.com/office/drawing/2014/main" id="{411AC09D-918F-1DE4-92CE-D5A7FFE016FB}"/>
+              </a:ext>
+            </a:extLst>
+          </p:cNvPr>
+          <p:cNvSpPr>
+            <a:spLocks noGrp="1"/>
+          </p:cNvSpPr>
+          <p:nvPr>
+            <p:ph sz="half" idx="2"/>
+          </p:nvPr>
+        </p:nvSpPr>
+        <p:spPr/>
+        <p:txBody>
+          <a:bodyPr>
+            <a:normAutofit fontScale="92500" lnSpcReduction="10000"/>
+          </a:bodyPr>
+          <a:lstStyle/>
+          <a:p>
+            <a:pPr>
+              <a:buFont typeface="Wingdings" panose="05000000000000000000" pitchFamily="2" charset="2"/>
+              <a:buChar char="Ø"/>
+            </a:pPr>
+            <a:r>
+              <a:rPr lang="en-US" dirty="0"/>
+              <a:t> Population vs Total emissions</a:t>
+            </a:r>
+          </a:p>
+          <a:p>
+            <a:pPr>
+              <a:buFont typeface="Wingdings" panose="05000000000000000000" pitchFamily="2" charset="2"/>
+              <a:buChar char="Ø"/>
+            </a:pPr>
+            <a:r>
+              <a:rPr lang="en-US" dirty="0"/>
+              <a:t>GDP vs Total emissions</a:t>
+            </a:r>
+          </a:p>
+          <a:p>
+            <a:pPr>
+              <a:buFont typeface="Wingdings" panose="05000000000000000000" pitchFamily="2" charset="2"/>
+              <a:buChar char="Ø"/>
+            </a:pPr>
+            <a:r>
+              <a:rPr lang="en-US" dirty="0"/>
+              <a:t>GDP  vs  Total Emissions ratio</a:t>
+            </a:r>
+          </a:p>
+          <a:p>
+            <a:pPr>
+              <a:buFont typeface="Wingdings" panose="05000000000000000000" pitchFamily="2" charset="2"/>
+              <a:buChar char="Ø"/>
+            </a:pPr>
+            <a:r>
+              <a:rPr lang="en-US" dirty="0"/>
+              <a:t>Emissions Per Person vs Daily Income</a:t>
+            </a:r>
+          </a:p>
+          <a:p>
+            <a:pPr>
+              <a:buFont typeface="Wingdings" panose="05000000000000000000" pitchFamily="2" charset="2"/>
+              <a:buChar char="Ø"/>
+            </a:pPr>
+            <a:r>
+              <a:rPr lang="en-US" dirty="0"/>
+              <a:t>Change over time?</a:t>
+            </a:r>
+          </a:p>
+          <a:p>
+            <a:pPr>
+              <a:buFont typeface="Wingdings" panose="05000000000000000000" pitchFamily="2" charset="2"/>
+              <a:buChar char="Ø"/>
+            </a:pPr>
+            <a:endParaRPr lang="en-US" dirty="0"/>
+          </a:p>
+          <a:p>
+            <a:pPr>
+              <a:buFont typeface="Wingdings" panose="05000000000000000000" pitchFamily="2" charset="2"/>
+              <a:buChar char="Ø"/>
+            </a:pPr>
+            <a:endParaRPr lang="en-AU" dirty="0"/>
+          </a:p>
+        </p:txBody>
+      </p:sp>
+      <p:sp>
+        <p:nvSpPr>
+          <p:cNvPr id="16" name="Text Placeholder 15">
+            <a:extLst>
+              <a:ext uri="{FF2B5EF4-FFF2-40B4-BE49-F238E27FC236}">
+                <a16:creationId xmlns:a16="http://schemas.microsoft.com/office/drawing/2014/main" id="{08F1A80E-02D1-C542-21BD-8EF82BCA9363}"/>
+              </a:ext>
+            </a:extLst>
+          </p:cNvPr>
+          <p:cNvSpPr>
+            <a:spLocks noGrp="1"/>
+          </p:cNvSpPr>
+          <p:nvPr>
+            <p:ph type="body" sz="quarter" idx="3"/>
+          </p:nvPr>
+        </p:nvSpPr>
+        <p:spPr>
+          <a:xfrm>
+            <a:off x="6607967" y="2746597"/>
+            <a:ext cx="4895056" cy="576262"/>
+          </a:xfrm>
+        </p:spPr>
+        <p:txBody>
+          <a:bodyPr/>
+          <a:lstStyle/>
+          <a:p>
+            <a:r>
+              <a:rPr lang="en-US" dirty="0"/>
+              <a:t>Major Contributors?</a:t>
+            </a:r>
+          </a:p>
+        </p:txBody>
+      </p:sp>
+      <p:sp>
+        <p:nvSpPr>
+          <p:cNvPr id="17" name="Content Placeholder 16">
+            <a:extLst>
+              <a:ext uri="{FF2B5EF4-FFF2-40B4-BE49-F238E27FC236}">
+                <a16:creationId xmlns:a16="http://schemas.microsoft.com/office/drawing/2014/main" id="{400F3555-92B0-41A4-B265-726493F82DD2}"/>
+              </a:ext>
+            </a:extLst>
+          </p:cNvPr>
+          <p:cNvSpPr>
+            <a:spLocks noGrp="1"/>
+          </p:cNvSpPr>
+          <p:nvPr>
+            <p:ph sz="quarter" idx="4"/>
+          </p:nvPr>
+        </p:nvSpPr>
+        <p:spPr/>
+        <p:txBody>
+          <a:bodyPr>
+            <a:normAutofit fontScale="92500" lnSpcReduction="10000"/>
+          </a:bodyPr>
+          <a:lstStyle/>
+          <a:p>
+            <a:pPr>
+              <a:buFont typeface="Wingdings" panose="05000000000000000000" pitchFamily="2" charset="2"/>
+              <a:buChar char="Ø"/>
+            </a:pPr>
+            <a:r>
+              <a:rPr lang="en-US" sz="1900" dirty="0"/>
+              <a:t>Economic conditions</a:t>
+            </a:r>
+          </a:p>
+          <a:p>
+            <a:pPr lvl="1">
+              <a:buFont typeface="Wingdings" panose="05000000000000000000" pitchFamily="2" charset="2"/>
+              <a:buChar char="§"/>
+            </a:pPr>
+            <a:r>
+              <a:rPr lang="en-US" sz="1900" dirty="0"/>
+              <a:t>Average income</a:t>
+            </a:r>
+          </a:p>
+          <a:p>
+            <a:pPr lvl="1">
+              <a:buFont typeface="Wingdings" panose="05000000000000000000" pitchFamily="2" charset="2"/>
+              <a:buChar char="§"/>
+            </a:pPr>
+            <a:r>
+              <a:rPr lang="en-US" sz="1900" dirty="0"/>
+              <a:t>GDP vs Population</a:t>
+            </a:r>
+          </a:p>
+          <a:p>
+            <a:pPr>
+              <a:buFont typeface="Wingdings" panose="05000000000000000000" pitchFamily="2" charset="2"/>
+              <a:buChar char="Ø"/>
+            </a:pPr>
+            <a:r>
+              <a:rPr lang="en-US" sz="1900" dirty="0"/>
+              <a:t>Country </a:t>
+            </a:r>
+            <a:r>
+              <a:rPr lang="en-US" sz="1900" dirty="0" err="1"/>
+              <a:t>categorisation</a:t>
+            </a:r>
+            <a:r>
+              <a:rPr lang="en-US" sz="1900" dirty="0"/>
+              <a:t> </a:t>
+            </a:r>
+          </a:p>
+          <a:p>
+            <a:pPr lvl="1">
+              <a:buFont typeface="Wingdings" panose="05000000000000000000" pitchFamily="2" charset="2"/>
+              <a:buChar char="§"/>
+            </a:pPr>
+            <a:r>
+              <a:rPr lang="en-US" sz="1900" dirty="0"/>
+              <a:t>Does the overall development classification of the country impact it’s CO2 emissions?</a:t>
+            </a:r>
+          </a:p>
+          <a:p>
+            <a:pPr>
+              <a:buFont typeface="Wingdings" panose="05000000000000000000" pitchFamily="2" charset="2"/>
+              <a:buChar char="§"/>
+            </a:pPr>
+            <a:endParaRPr lang="en-AU" dirty="0"/>
+          </a:p>
+        </p:txBody>
+      </p:sp>
+    </p:spTree>
+    <p:extLst>
+      <p:ext uri="{BB962C8B-B14F-4D97-AF65-F5344CB8AC3E}">
+        <p14:creationId xmlns:p14="http://schemas.microsoft.com/office/powerpoint/2010/main" val="2694325006"/>
+      </p:ext>
+    </p:extLst>
+  </p:cSld>
+  <p:clrMapOvr>
+    <a:masterClrMapping/>
+  </p:clrMapOvr>
+</p:sld>
+</file>
+
+<file path=ppt/slides/slide5.xml><?xml version="1.0" encoding="utf-8"?>
+<p:sld xmlns:a="http://schemas.openxmlformats.org/drawingml/2006/main" xmlns:r="http://schemas.openxmlformats.org/officeDocument/2006/relationships" xmlns:p="http://schemas.openxmlformats.org/presentationml/2006/main">
+  <p:cSld>
+    <p:spTree>
+      <p:nvGrpSpPr>
+        <p:cNvPr id="1" name=""/>
+        <p:cNvGrpSpPr/>
+        <p:nvPr/>
+      </p:nvGrpSpPr>
+      <p:grpSpPr>
+        <a:xfrm>
+          <a:off x="0" y="0"/>
+          <a:ext cx="0" cy="0"/>
+          <a:chOff x="0" y="0"/>
+          <a:chExt cx="0" cy="0"/>
+        </a:xfrm>
+      </p:grpSpPr>
+      <p:sp>
+        <p:nvSpPr>
+          <p:cNvPr id="2" name="Title 1">
+            <a:extLst>
+              <a:ext uri="{FF2B5EF4-FFF2-40B4-BE49-F238E27FC236}">
+                <a16:creationId xmlns:a16="http://schemas.microsoft.com/office/drawing/2014/main" id="{D3F9BB59-538C-E700-DDC0-4AFCC1AE7335}"/>
+              </a:ext>
+            </a:extLst>
+          </p:cNvPr>
+          <p:cNvSpPr>
+            <a:spLocks noGrp="1"/>
+          </p:cNvSpPr>
+          <p:nvPr>
+            <p:ph type="title"/>
+          </p:nvPr>
+        </p:nvSpPr>
+        <p:spPr/>
+        <p:txBody>
+          <a:bodyPr/>
+          <a:lstStyle/>
+          <a:p>
+            <a:endParaRPr lang="en-AU"/>
+          </a:p>
+        </p:txBody>
+      </p:sp>
+      <p:sp>
+        <p:nvSpPr>
+          <p:cNvPr id="3" name="Text Placeholder 2">
+            <a:extLst>
+              <a:ext uri="{FF2B5EF4-FFF2-40B4-BE49-F238E27FC236}">
+                <a16:creationId xmlns:a16="http://schemas.microsoft.com/office/drawing/2014/main" id="{19BE8F63-7D94-F461-1396-034913018CD5}"/>
+              </a:ext>
+            </a:extLst>
+          </p:cNvPr>
+          <p:cNvSpPr>
+            <a:spLocks noGrp="1"/>
+          </p:cNvSpPr>
+          <p:nvPr>
+            <p:ph type="body" idx="1"/>
+          </p:nvPr>
+        </p:nvSpPr>
+        <p:spPr/>
+        <p:txBody>
+          <a:bodyPr/>
+          <a:lstStyle/>
+          <a:p>
+            <a:endParaRPr lang="en-AU"/>
+          </a:p>
+        </p:txBody>
+      </p:sp>
+      <p:sp>
+        <p:nvSpPr>
+          <p:cNvPr id="4" name="Content Placeholder 3">
+            <a:extLst>
+              <a:ext uri="{FF2B5EF4-FFF2-40B4-BE49-F238E27FC236}">
+                <a16:creationId xmlns:a16="http://schemas.microsoft.com/office/drawing/2014/main" id="{5137588E-0807-B16F-BA77-56829DF03D42}"/>
+              </a:ext>
+            </a:extLst>
+          </p:cNvPr>
+          <p:cNvSpPr>
+            <a:spLocks noGrp="1"/>
+          </p:cNvSpPr>
+          <p:nvPr>
+            <p:ph sz="half" idx="2"/>
+          </p:nvPr>
+        </p:nvSpPr>
+        <p:spPr/>
+        <p:txBody>
+          <a:bodyPr/>
+          <a:lstStyle/>
+          <a:p>
+            <a:endParaRPr lang="en-AU"/>
+          </a:p>
+        </p:txBody>
+      </p:sp>
+      <p:sp>
+        <p:nvSpPr>
+          <p:cNvPr id="5" name="Text Placeholder 4">
+            <a:extLst>
+              <a:ext uri="{FF2B5EF4-FFF2-40B4-BE49-F238E27FC236}">
+                <a16:creationId xmlns:a16="http://schemas.microsoft.com/office/drawing/2014/main" id="{C8E7865B-7356-3706-475F-B343351101FF}"/>
+              </a:ext>
+            </a:extLst>
+          </p:cNvPr>
+          <p:cNvSpPr>
+            <a:spLocks noGrp="1"/>
+          </p:cNvSpPr>
+          <p:nvPr>
+            <p:ph type="body" sz="quarter" idx="3"/>
+          </p:nvPr>
+        </p:nvSpPr>
+        <p:spPr/>
+        <p:txBody>
+          <a:bodyPr/>
+          <a:lstStyle/>
+          <a:p>
+            <a:endParaRPr lang="en-AU"/>
+          </a:p>
+        </p:txBody>
+      </p:sp>
+      <p:sp>
+        <p:nvSpPr>
+          <p:cNvPr id="6" name="Content Placeholder 5">
+            <a:extLst>
+              <a:ext uri="{FF2B5EF4-FFF2-40B4-BE49-F238E27FC236}">
+                <a16:creationId xmlns:a16="http://schemas.microsoft.com/office/drawing/2014/main" id="{031A05B2-8EFA-3E0C-B8CD-0B41F4C4FA8F}"/>
+              </a:ext>
+            </a:extLst>
+          </p:cNvPr>
+          <p:cNvSpPr>
+            <a:spLocks noGrp="1"/>
+          </p:cNvSpPr>
+          <p:nvPr>
+            <p:ph sz="quarter" idx="4"/>
+          </p:nvPr>
+        </p:nvSpPr>
+        <p:spPr/>
+        <p:txBody>
+          <a:bodyPr/>
+          <a:lstStyle/>
+          <a:p>
+            <a:endParaRPr lang="en-AU"/>
+          </a:p>
+        </p:txBody>
+      </p:sp>
+    </p:spTree>
+    <p:extLst>
+      <p:ext uri="{BB962C8B-B14F-4D97-AF65-F5344CB8AC3E}">
+        <p14:creationId xmlns:p14="http://schemas.microsoft.com/office/powerpoint/2010/main" val="390070912"/>
+      </p:ext>
+    </p:extLst>
+  </p:cSld>
+  <p:clrMapOvr>
+    <a:masterClrMapping/>
+  </p:clrMapOvr>
+</p:sld>
+</file>
+
+<file path=ppt/slides/slide6.xml><?xml version="1.0" encoding="utf-8"?>
+<p:sld xmlns:a="http://schemas.openxmlformats.org/drawingml/2006/main" xmlns:r="http://schemas.openxmlformats.org/officeDocument/2006/relationships" xmlns:p="http://schemas.openxmlformats.org/presentationml/2006/main">
+  <p:cSld>
+    <p:spTree>
+      <p:nvGrpSpPr>
+        <p:cNvPr id="1" name=""/>
+        <p:cNvGrpSpPr/>
+        <p:nvPr/>
+      </p:nvGrpSpPr>
+      <p:grpSpPr>
+        <a:xfrm>
+          <a:off x="0" y="0"/>
+          <a:ext cx="0" cy="0"/>
+          <a:chOff x="0" y="0"/>
+          <a:chExt cx="0" cy="0"/>
+        </a:xfrm>
+      </p:grpSpPr>
+      <p:sp>
+        <p:nvSpPr>
+          <p:cNvPr id="2" name="Title 1">
+            <a:extLst>
+              <a:ext uri="{FF2B5EF4-FFF2-40B4-BE49-F238E27FC236}">
+                <a16:creationId xmlns:a16="http://schemas.microsoft.com/office/drawing/2014/main" id="{B9880D84-1D50-48A0-33E3-C436D50999A8}"/>
+              </a:ext>
+            </a:extLst>
+          </p:cNvPr>
+          <p:cNvSpPr>
+            <a:spLocks noGrp="1"/>
+          </p:cNvSpPr>
+          <p:nvPr>
+            <p:ph type="title"/>
+          </p:nvPr>
+        </p:nvSpPr>
+        <p:spPr/>
+        <p:txBody>
+          <a:bodyPr/>
+          <a:lstStyle/>
+          <a:p>
+            <a:endParaRPr lang="en-AU"/>
+          </a:p>
+        </p:txBody>
+      </p:sp>
+      <p:sp>
+        <p:nvSpPr>
+          <p:cNvPr id="3" name="Text Placeholder 2">
+            <a:extLst>
+              <a:ext uri="{FF2B5EF4-FFF2-40B4-BE49-F238E27FC236}">
+                <a16:creationId xmlns:a16="http://schemas.microsoft.com/office/drawing/2014/main" id="{A6DBD242-BA01-A6F4-6BBF-7D25F935910E}"/>
+              </a:ext>
+            </a:extLst>
+          </p:cNvPr>
+          <p:cNvSpPr>
+            <a:spLocks noGrp="1"/>
+          </p:cNvSpPr>
+          <p:nvPr>
+            <p:ph type="body" idx="1"/>
+          </p:nvPr>
+        </p:nvSpPr>
+        <p:spPr/>
+        <p:txBody>
+          <a:bodyPr/>
+          <a:lstStyle/>
+          <a:p>
+            <a:endParaRPr lang="en-AU"/>
+          </a:p>
+        </p:txBody>
+      </p:sp>
+      <p:sp>
+        <p:nvSpPr>
+          <p:cNvPr id="4" name="Content Placeholder 3">
+            <a:extLst>
+              <a:ext uri="{FF2B5EF4-FFF2-40B4-BE49-F238E27FC236}">
+                <a16:creationId xmlns:a16="http://schemas.microsoft.com/office/drawing/2014/main" id="{B181F507-59FA-75B2-C5DA-F8BCA5E94640}"/>
+              </a:ext>
+            </a:extLst>
+          </p:cNvPr>
+          <p:cNvSpPr>
+            <a:spLocks noGrp="1"/>
+          </p:cNvSpPr>
+          <p:nvPr>
+            <p:ph sz="half" idx="2"/>
+          </p:nvPr>
+        </p:nvSpPr>
+        <p:spPr/>
+        <p:txBody>
+          <a:bodyPr/>
+          <a:lstStyle/>
+          <a:p>
+            <a:endParaRPr lang="en-AU"/>
+          </a:p>
+        </p:txBody>
+      </p:sp>
+      <p:sp>
+        <p:nvSpPr>
+          <p:cNvPr id="5" name="Text Placeholder 4">
+            <a:extLst>
+              <a:ext uri="{FF2B5EF4-FFF2-40B4-BE49-F238E27FC236}">
+                <a16:creationId xmlns:a16="http://schemas.microsoft.com/office/drawing/2014/main" id="{466278AB-B155-3EE5-24D8-7E3A0312806A}"/>
+              </a:ext>
+            </a:extLst>
+          </p:cNvPr>
+          <p:cNvSpPr>
+            <a:spLocks noGrp="1"/>
+          </p:cNvSpPr>
+          <p:nvPr>
+            <p:ph type="body" sz="quarter" idx="3"/>
+          </p:nvPr>
+        </p:nvSpPr>
+        <p:spPr/>
+        <p:txBody>
+          <a:bodyPr/>
+          <a:lstStyle/>
+          <a:p>
+            <a:endParaRPr lang="en-AU"/>
+          </a:p>
+        </p:txBody>
+      </p:sp>
+      <p:sp>
+        <p:nvSpPr>
+          <p:cNvPr id="6" name="Content Placeholder 5">
+            <a:extLst>
+              <a:ext uri="{FF2B5EF4-FFF2-40B4-BE49-F238E27FC236}">
+                <a16:creationId xmlns:a16="http://schemas.microsoft.com/office/drawing/2014/main" id="{BDE24370-B7DA-F3A1-23DC-104FA568B665}"/>
+              </a:ext>
+            </a:extLst>
+          </p:cNvPr>
+          <p:cNvSpPr>
+            <a:spLocks noGrp="1"/>
+          </p:cNvSpPr>
+          <p:nvPr>
+            <p:ph sz="quarter" idx="4"/>
+          </p:nvPr>
+        </p:nvSpPr>
+        <p:spPr/>
+        <p:txBody>
+          <a:bodyPr/>
+          <a:lstStyle/>
+          <a:p>
+            <a:endParaRPr lang="en-AU"/>
+          </a:p>
+        </p:txBody>
+      </p:sp>
+    </p:spTree>
+    <p:extLst>
+      <p:ext uri="{BB962C8B-B14F-4D97-AF65-F5344CB8AC3E}">
+        <p14:creationId xmlns:p14="http://schemas.microsoft.com/office/powerpoint/2010/main" val="2578436974"/>
       </p:ext>
     </p:extLst>
   </p:cSld>

</xml_diff>

<commit_message>
added presso and choropleth snapshot
</commit_message>
<xml_diff>
--- a/Presentation.pptx
+++ b/Presentation.pptx
@@ -5,15 +5,17 @@
     <p:sldMasterId id="2147483804" r:id="rId1"/>
   </p:sldMasterIdLst>
   <p:notesMasterIdLst>
-    <p:notesMasterId r:id="rId8"/>
+    <p:notesMasterId r:id="rId10"/>
   </p:notesMasterIdLst>
   <p:sldIdLst>
     <p:sldId id="256" r:id="rId2"/>
     <p:sldId id="260" r:id="rId3"/>
     <p:sldId id="258" r:id="rId4"/>
     <p:sldId id="259" r:id="rId5"/>
-    <p:sldId id="261" r:id="rId6"/>
-    <p:sldId id="262" r:id="rId7"/>
+    <p:sldId id="263" r:id="rId6"/>
+    <p:sldId id="264" r:id="rId7"/>
+    <p:sldId id="261" r:id="rId8"/>
+    <p:sldId id="262" r:id="rId9"/>
   </p:sldIdLst>
   <p:sldSz cx="12192000" cy="6858000"/>
   <p:notesSz cx="6858000" cy="9144000"/>
@@ -3760,11 +3762,14 @@
         <a:bodyPr/>
         <a:lstStyle/>
         <a:p>
+          <a:pPr>
+            <a:buFont typeface="Wingdings" panose="05000000000000000000" pitchFamily="2" charset="2"/>
+            <a:buChar char="§"/>
+          </a:pPr>
           <a:r>
-            <a:rPr lang="en-US"/>
+            <a:rPr lang="en-US" dirty="0"/>
             <a:t>Average income</a:t>
           </a:r>
-          <a:endParaRPr lang="en-US" dirty="0"/>
         </a:p>
       </dgm:t>
     </dgm:pt>
@@ -3797,11 +3802,14 @@
         <a:bodyPr/>
         <a:lstStyle/>
         <a:p>
+          <a:pPr>
+            <a:buFont typeface="Wingdings" panose="05000000000000000000" pitchFamily="2" charset="2"/>
+            <a:buChar char="§"/>
+          </a:pPr>
           <a:r>
-            <a:rPr lang="en-US"/>
+            <a:rPr lang="en-US" dirty="0"/>
             <a:t>GDP vs Population</a:t>
           </a:r>
-          <a:endParaRPr lang="en-US" dirty="0"/>
         </a:p>
       </dgm:t>
     </dgm:pt>
@@ -5501,13 +5509,13 @@
             <a:spcAft>
               <a:spcPct val="15000"/>
             </a:spcAft>
-            <a:buChar char="•"/>
+            <a:buFont typeface="Wingdings" panose="05000000000000000000" pitchFamily="2" charset="2"/>
+            <a:buChar char="§"/>
           </a:pPr>
           <a:r>
-            <a:rPr lang="en-US" sz="2500" kern="1200"/>
+            <a:rPr lang="en-US" sz="2500" kern="1200" dirty="0"/>
             <a:t>Average income</a:t>
           </a:r>
-          <a:endParaRPr lang="en-US" sz="2500" kern="1200" dirty="0"/>
         </a:p>
         <a:p>
           <a:pPr marL="457200" lvl="2" indent="-228600" algn="l" defTabSz="1111250">
@@ -5520,13 +5528,13 @@
             <a:spcAft>
               <a:spcPct val="15000"/>
             </a:spcAft>
-            <a:buChar char="•"/>
+            <a:buFont typeface="Wingdings" panose="05000000000000000000" pitchFamily="2" charset="2"/>
+            <a:buChar char="§"/>
           </a:pPr>
           <a:r>
-            <a:rPr lang="en-US" sz="2500" kern="1200"/>
+            <a:rPr lang="en-US" sz="2500" kern="1200" dirty="0"/>
             <a:t>GDP vs Population</a:t>
           </a:r>
-          <a:endParaRPr lang="en-US" sz="2500" kern="1200" dirty="0"/>
         </a:p>
         <a:p>
           <a:pPr marL="228600" lvl="1" indent="-228600" algn="l" defTabSz="1111250">
@@ -12828,6 +12836,90 @@
     </a:lvl9pPr>
   </p:notesStyle>
 </p:notesMaster>
+</file>
+
+<file path=ppt/notesSlides/notesSlide1.xml><?xml version="1.0" encoding="utf-8"?>
+<p:notes xmlns:a="http://schemas.openxmlformats.org/drawingml/2006/main" xmlns:r="http://schemas.openxmlformats.org/officeDocument/2006/relationships" xmlns:p="http://schemas.openxmlformats.org/presentationml/2006/main">
+  <p:cSld>
+    <p:spTree>
+      <p:nvGrpSpPr>
+        <p:cNvPr id="1" name=""/>
+        <p:cNvGrpSpPr/>
+        <p:nvPr/>
+      </p:nvGrpSpPr>
+      <p:grpSpPr>
+        <a:xfrm>
+          <a:off x="0" y="0"/>
+          <a:ext cx="0" cy="0"/>
+          <a:chOff x="0" y="0"/>
+          <a:chExt cx="0" cy="0"/>
+        </a:xfrm>
+      </p:grpSpPr>
+      <p:sp>
+        <p:nvSpPr>
+          <p:cNvPr id="2" name="Slide Image Placeholder 1"/>
+          <p:cNvSpPr>
+            <a:spLocks noGrp="1" noRot="1" noChangeAspect="1"/>
+          </p:cNvSpPr>
+          <p:nvPr>
+            <p:ph type="sldImg"/>
+          </p:nvPr>
+        </p:nvSpPr>
+        <p:spPr/>
+      </p:sp>
+      <p:sp>
+        <p:nvSpPr>
+          <p:cNvPr id="3" name="Notes Placeholder 2"/>
+          <p:cNvSpPr>
+            <a:spLocks noGrp="1"/>
+          </p:cNvSpPr>
+          <p:nvPr>
+            <p:ph type="body" idx="1"/>
+          </p:nvPr>
+        </p:nvSpPr>
+        <p:spPr/>
+        <p:txBody>
+          <a:bodyPr/>
+          <a:lstStyle/>
+          <a:p>
+            <a:endParaRPr lang="en-AU" dirty="0"/>
+          </a:p>
+        </p:txBody>
+      </p:sp>
+      <p:sp>
+        <p:nvSpPr>
+          <p:cNvPr id="4" name="Slide Number Placeholder 3"/>
+          <p:cNvSpPr>
+            <a:spLocks noGrp="1"/>
+          </p:cNvSpPr>
+          <p:nvPr>
+            <p:ph type="sldNum" sz="quarter" idx="5"/>
+          </p:nvPr>
+        </p:nvSpPr>
+        <p:spPr/>
+        <p:txBody>
+          <a:bodyPr/>
+          <a:lstStyle/>
+          <a:p>
+            <a:fld id="{010CE597-78A0-4769-A8FA-42EAD8C3E8D3}" type="slidenum">
+              <a:rPr lang="en-AU" smtClean="0"/>
+              <a:t>5</a:t>
+            </a:fld>
+            <a:endParaRPr lang="en-AU"/>
+          </a:p>
+        </p:txBody>
+      </p:sp>
+    </p:spTree>
+    <p:extLst>
+      <p:ext uri="{BB962C8B-B14F-4D97-AF65-F5344CB8AC3E}">
+        <p14:creationId xmlns:p14="http://schemas.microsoft.com/office/powerpoint/2010/main" val="1952932808"/>
+      </p:ext>
+    </p:extLst>
+  </p:cSld>
+  <p:clrMapOvr>
+    <a:masterClrMapping/>
+  </p:clrMapOvr>
+</p:notes>
 </file>
 
 <file path=ppt/slideLayouts/slideLayout1.xml><?xml version="1.0" encoding="utf-8"?>
@@ -21953,7 +22045,7 @@
           <p:nvPr>
             <p:extLst>
               <p:ext uri="{D42A27DB-BD31-4B8C-83A1-F6EECF244321}">
-                <p14:modId xmlns:p14="http://schemas.microsoft.com/office/powerpoint/2010/main" val="1583374506"/>
+                <p14:modId xmlns:p14="http://schemas.microsoft.com/office/powerpoint/2010/main" val="3934416652"/>
               </p:ext>
             </p:extLst>
           </p:nvPr>
@@ -21982,6 +22074,1163 @@
 </file>
 
 <file path=ppt/slides/slide5.xml><?xml version="1.0" encoding="utf-8"?>
+<p:sld xmlns:a="http://schemas.openxmlformats.org/drawingml/2006/main" xmlns:r="http://schemas.openxmlformats.org/officeDocument/2006/relationships" xmlns:p="http://schemas.openxmlformats.org/presentationml/2006/main">
+  <p:cSld>
+    <p:bg>
+      <p:bgPr>
+        <a:blipFill rotWithShape="1">
+          <a:blip r:embed="rId3">
+            <a:duotone>
+              <a:schemeClr val="bg2">
+                <a:shade val="76000"/>
+                <a:satMod val="180000"/>
+              </a:schemeClr>
+              <a:schemeClr val="bg2">
+                <a:tint val="80000"/>
+                <a:satMod val="120000"/>
+                <a:lumMod val="180000"/>
+              </a:schemeClr>
+            </a:duotone>
+          </a:blip>
+          <a:stretch/>
+        </a:blipFill>
+        <a:effectLst/>
+      </p:bgPr>
+    </p:bg>
+    <p:spTree>
+      <p:nvGrpSpPr>
+        <p:cNvPr id="1" name=""/>
+        <p:cNvGrpSpPr/>
+        <p:nvPr/>
+      </p:nvGrpSpPr>
+      <p:grpSpPr>
+        <a:xfrm>
+          <a:off x="0" y="0"/>
+          <a:ext cx="0" cy="0"/>
+          <a:chOff x="0" y="0"/>
+          <a:chExt cx="0" cy="0"/>
+        </a:xfrm>
+      </p:grpSpPr>
+      <p:grpSp>
+        <p:nvGrpSpPr>
+          <p:cNvPr id="57" name="Group 56">
+            <a:extLst>
+              <a:ext uri="{FF2B5EF4-FFF2-40B4-BE49-F238E27FC236}">
+                <a16:creationId xmlns:a16="http://schemas.microsoft.com/office/drawing/2014/main" id="{FDB0F91E-E08B-4543-B4C0-6DF9094A0106}"/>
+              </a:ext>
+              <a:ext uri="{C183D7F6-B498-43B3-948B-1728B52AA6E4}">
+                <adec:decorative xmlns:adec="http://schemas.microsoft.com/office/drawing/2017/decorative" val="1"/>
+              </a:ext>
+            </a:extLst>
+          </p:cNvPr>
+          <p:cNvGrpSpPr>
+            <a:grpSpLocks noGrp="1" noUngrp="1" noRot="1" noChangeAspect="1" noMove="1" noResize="1"/>
+          </p:cNvGrpSpPr>
+          <p:nvPr>
+            <p:extLst>
+              <p:ext uri="{386F3935-93C4-4BCD-93E2-E3B085C9AB24}">
+                <p16:designElem xmlns:p16="http://schemas.microsoft.com/office/powerpoint/2015/main" val="1"/>
+              </p:ext>
+            </p:extLst>
+          </p:nvPr>
+        </p:nvGrpSpPr>
+        <p:grpSpPr>
+          <a:xfrm>
+            <a:off x="150812" y="0"/>
+            <a:ext cx="2436813" cy="6858001"/>
+            <a:chOff x="1320800" y="0"/>
+            <a:chExt cx="2436813" cy="6858001"/>
+          </a:xfrm>
+        </p:grpSpPr>
+        <p:sp>
+          <p:nvSpPr>
+            <p:cNvPr id="58" name="Freeform 6">
+              <a:extLst>
+                <a:ext uri="{FF2B5EF4-FFF2-40B4-BE49-F238E27FC236}">
+                  <a16:creationId xmlns:a16="http://schemas.microsoft.com/office/drawing/2014/main" id="{CAA7E6E8-7988-4714-A434-6B552010B547}"/>
+                </a:ext>
+                <a:ext uri="{C183D7F6-B498-43B3-948B-1728B52AA6E4}">
+                  <adec:decorative xmlns:adec="http://schemas.microsoft.com/office/drawing/2017/decorative" val="1"/>
+                </a:ext>
+              </a:extLst>
+            </p:cNvPr>
+            <p:cNvSpPr/>
+            <p:nvPr>
+              <p:extLst>
+                <p:ext uri="{386F3935-93C4-4BCD-93E2-E3B085C9AB24}">
+                  <p16:designElem xmlns:p16="http://schemas.microsoft.com/office/powerpoint/2015/main" val="1"/>
+                </p:ext>
+              </p:extLst>
+            </p:nvPr>
+          </p:nvSpPr>
+          <p:spPr bwMode="auto">
+            <a:xfrm>
+              <a:off x="1627188" y="0"/>
+              <a:ext cx="1122363" cy="5329238"/>
+            </a:xfrm>
+            <a:custGeom>
+              <a:avLst/>
+              <a:gdLst/>
+              <a:ahLst/>
+              <a:cxnLst/>
+              <a:rect l="0" t="0" r="r" b="b"/>
+              <a:pathLst>
+                <a:path w="707" h="3357">
+                  <a:moveTo>
+                    <a:pt x="0" y="3330"/>
+                  </a:moveTo>
+                  <a:lnTo>
+                    <a:pt x="156" y="3357"/>
+                  </a:lnTo>
+                  <a:lnTo>
+                    <a:pt x="707" y="0"/>
+                  </a:lnTo>
+                  <a:lnTo>
+                    <a:pt x="547" y="0"/>
+                  </a:lnTo>
+                  <a:lnTo>
+                    <a:pt x="0" y="3330"/>
+                  </a:lnTo>
+                  <a:close/>
+                </a:path>
+              </a:pathLst>
+            </a:custGeom>
+            <a:solidFill>
+              <a:schemeClr val="accent1"/>
+            </a:solidFill>
+            <a:ln>
+              <a:noFill/>
+            </a:ln>
+          </p:spPr>
+          <p:txBody>
+            <a:bodyPr/>
+            <a:lstStyle/>
+            <a:p>
+              <a:endParaRPr lang="en-AU"/>
+            </a:p>
+          </p:txBody>
+        </p:sp>
+        <p:sp>
+          <p:nvSpPr>
+            <p:cNvPr id="59" name="Freeform 7">
+              <a:extLst>
+                <a:ext uri="{FF2B5EF4-FFF2-40B4-BE49-F238E27FC236}">
+                  <a16:creationId xmlns:a16="http://schemas.microsoft.com/office/drawing/2014/main" id="{A2736B6B-CF60-477E-8405-C77A6B60D519}"/>
+                </a:ext>
+                <a:ext uri="{C183D7F6-B498-43B3-948B-1728B52AA6E4}">
+                  <adec:decorative xmlns:adec="http://schemas.microsoft.com/office/drawing/2017/decorative" val="1"/>
+                </a:ext>
+              </a:extLst>
+            </p:cNvPr>
+            <p:cNvSpPr/>
+            <p:nvPr>
+              <p:extLst>
+                <p:ext uri="{386F3935-93C4-4BCD-93E2-E3B085C9AB24}">
+                  <p16:designElem xmlns:p16="http://schemas.microsoft.com/office/powerpoint/2015/main" val="1"/>
+                </p:ext>
+              </p:extLst>
+            </p:nvPr>
+          </p:nvSpPr>
+          <p:spPr bwMode="auto">
+            <a:xfrm>
+              <a:off x="1320800" y="0"/>
+              <a:ext cx="1117600" cy="5276850"/>
+            </a:xfrm>
+            <a:custGeom>
+              <a:avLst/>
+              <a:gdLst/>
+              <a:ahLst/>
+              <a:cxnLst/>
+              <a:rect l="0" t="0" r="r" b="b"/>
+              <a:pathLst>
+                <a:path w="704" h="3324">
+                  <a:moveTo>
+                    <a:pt x="704" y="0"/>
+                  </a:moveTo>
+                  <a:lnTo>
+                    <a:pt x="545" y="0"/>
+                  </a:lnTo>
+                  <a:lnTo>
+                    <a:pt x="0" y="3300"/>
+                  </a:lnTo>
+                  <a:lnTo>
+                    <a:pt x="157" y="3324"/>
+                  </a:lnTo>
+                  <a:lnTo>
+                    <a:pt x="704" y="0"/>
+                  </a:lnTo>
+                  <a:close/>
+                </a:path>
+              </a:pathLst>
+            </a:custGeom>
+            <a:solidFill>
+              <a:schemeClr val="tx1">
+                <a:lumMod val="65000"/>
+                <a:lumOff val="35000"/>
+              </a:schemeClr>
+            </a:solidFill>
+            <a:ln>
+              <a:noFill/>
+            </a:ln>
+          </p:spPr>
+          <p:txBody>
+            <a:bodyPr/>
+            <a:lstStyle/>
+            <a:p>
+              <a:endParaRPr lang="en-AU"/>
+            </a:p>
+          </p:txBody>
+        </p:sp>
+        <p:sp>
+          <p:nvSpPr>
+            <p:cNvPr id="60" name="Freeform 8">
+              <a:extLst>
+                <a:ext uri="{FF2B5EF4-FFF2-40B4-BE49-F238E27FC236}">
+                  <a16:creationId xmlns:a16="http://schemas.microsoft.com/office/drawing/2014/main" id="{96C54F74-7D7A-4327-AC54-03A0C30CA132}"/>
+                </a:ext>
+                <a:ext uri="{C183D7F6-B498-43B3-948B-1728B52AA6E4}">
+                  <adec:decorative xmlns:adec="http://schemas.microsoft.com/office/drawing/2017/decorative" val="1"/>
+                </a:ext>
+              </a:extLst>
+            </p:cNvPr>
+            <p:cNvSpPr/>
+            <p:nvPr>
+              <p:extLst>
+                <p:ext uri="{386F3935-93C4-4BCD-93E2-E3B085C9AB24}">
+                  <p16:designElem xmlns:p16="http://schemas.microsoft.com/office/powerpoint/2015/main" val="1"/>
+                </p:ext>
+              </p:extLst>
+            </p:nvPr>
+          </p:nvSpPr>
+          <p:spPr bwMode="auto">
+            <a:xfrm>
+              <a:off x="1320800" y="5238750"/>
+              <a:ext cx="1228725" cy="1619250"/>
+            </a:xfrm>
+            <a:custGeom>
+              <a:avLst/>
+              <a:gdLst/>
+              <a:ahLst/>
+              <a:cxnLst/>
+              <a:rect l="0" t="0" r="r" b="b"/>
+              <a:pathLst>
+                <a:path w="774" h="1020">
+                  <a:moveTo>
+                    <a:pt x="0" y="0"/>
+                  </a:moveTo>
+                  <a:lnTo>
+                    <a:pt x="740" y="1020"/>
+                  </a:lnTo>
+                  <a:lnTo>
+                    <a:pt x="774" y="1020"/>
+                  </a:lnTo>
+                  <a:lnTo>
+                    <a:pt x="0" y="0"/>
+                  </a:lnTo>
+                  <a:close/>
+                </a:path>
+              </a:pathLst>
+            </a:custGeom>
+            <a:solidFill>
+              <a:schemeClr val="tx1">
+                <a:lumMod val="85000"/>
+                <a:lumOff val="15000"/>
+              </a:schemeClr>
+            </a:solidFill>
+            <a:ln>
+              <a:noFill/>
+            </a:ln>
+          </p:spPr>
+          <p:txBody>
+            <a:bodyPr/>
+            <a:lstStyle/>
+            <a:p>
+              <a:endParaRPr lang="en-AU"/>
+            </a:p>
+          </p:txBody>
+        </p:sp>
+        <p:sp>
+          <p:nvSpPr>
+            <p:cNvPr id="61" name="Freeform 9">
+              <a:extLst>
+                <a:ext uri="{FF2B5EF4-FFF2-40B4-BE49-F238E27FC236}">
+                  <a16:creationId xmlns:a16="http://schemas.microsoft.com/office/drawing/2014/main" id="{40790CC2-4075-407E-B51B-01EBAB18A02B}"/>
+                </a:ext>
+                <a:ext uri="{C183D7F6-B498-43B3-948B-1728B52AA6E4}">
+                  <adec:decorative xmlns:adec="http://schemas.microsoft.com/office/drawing/2017/decorative" val="1"/>
+                </a:ext>
+              </a:extLst>
+            </p:cNvPr>
+            <p:cNvSpPr/>
+            <p:nvPr>
+              <p:extLst>
+                <p:ext uri="{386F3935-93C4-4BCD-93E2-E3B085C9AB24}">
+                  <p16:designElem xmlns:p16="http://schemas.microsoft.com/office/powerpoint/2015/main" val="1"/>
+                </p:ext>
+              </p:extLst>
+            </p:nvPr>
+          </p:nvSpPr>
+          <p:spPr bwMode="auto">
+            <a:xfrm>
+              <a:off x="1627188" y="5291138"/>
+              <a:ext cx="1495425" cy="1566863"/>
+            </a:xfrm>
+            <a:custGeom>
+              <a:avLst/>
+              <a:gdLst/>
+              <a:ahLst/>
+              <a:cxnLst/>
+              <a:rect l="0" t="0" r="r" b="b"/>
+              <a:pathLst>
+                <a:path w="942" h="987">
+                  <a:moveTo>
+                    <a:pt x="0" y="0"/>
+                  </a:moveTo>
+                  <a:lnTo>
+                    <a:pt x="909" y="987"/>
+                  </a:lnTo>
+                  <a:lnTo>
+                    <a:pt x="942" y="987"/>
+                  </a:lnTo>
+                  <a:lnTo>
+                    <a:pt x="0" y="0"/>
+                  </a:lnTo>
+                  <a:close/>
+                </a:path>
+              </a:pathLst>
+            </a:custGeom>
+            <a:solidFill>
+              <a:schemeClr val="accent1">
+                <a:lumMod val="50000"/>
+              </a:schemeClr>
+            </a:solidFill>
+            <a:ln>
+              <a:noFill/>
+            </a:ln>
+          </p:spPr>
+          <p:txBody>
+            <a:bodyPr/>
+            <a:lstStyle/>
+            <a:p>
+              <a:endParaRPr lang="en-AU"/>
+            </a:p>
+          </p:txBody>
+        </p:sp>
+        <p:sp>
+          <p:nvSpPr>
+            <p:cNvPr id="44" name="Freeform 10">
+              <a:extLst>
+                <a:ext uri="{FF2B5EF4-FFF2-40B4-BE49-F238E27FC236}">
+                  <a16:creationId xmlns:a16="http://schemas.microsoft.com/office/drawing/2014/main" id="{808D79CE-C1DC-4640-82F8-32DDB31DF496}"/>
+                </a:ext>
+                <a:ext uri="{C183D7F6-B498-43B3-948B-1728B52AA6E4}">
+                  <adec:decorative xmlns:adec="http://schemas.microsoft.com/office/drawing/2017/decorative" val="1"/>
+                </a:ext>
+              </a:extLst>
+            </p:cNvPr>
+            <p:cNvSpPr/>
+            <p:nvPr>
+              <p:extLst>
+                <p:ext uri="{386F3935-93C4-4BCD-93E2-E3B085C9AB24}">
+                  <p16:designElem xmlns:p16="http://schemas.microsoft.com/office/powerpoint/2015/main" val="1"/>
+                </p:ext>
+              </p:extLst>
+            </p:nvPr>
+          </p:nvSpPr>
+          <p:spPr bwMode="auto">
+            <a:xfrm>
+              <a:off x="1627188" y="5286375"/>
+              <a:ext cx="2130425" cy="1571625"/>
+            </a:xfrm>
+            <a:custGeom>
+              <a:avLst/>
+              <a:gdLst/>
+              <a:ahLst/>
+              <a:cxnLst/>
+              <a:rect l="0" t="0" r="r" b="b"/>
+              <a:pathLst>
+                <a:path w="1342" h="990">
+                  <a:moveTo>
+                    <a:pt x="0" y="3"/>
+                  </a:moveTo>
+                  <a:lnTo>
+                    <a:pt x="942" y="990"/>
+                  </a:lnTo>
+                  <a:lnTo>
+                    <a:pt x="1342" y="990"/>
+                  </a:lnTo>
+                  <a:lnTo>
+                    <a:pt x="156" y="27"/>
+                  </a:lnTo>
+                  <a:lnTo>
+                    <a:pt x="0" y="0"/>
+                  </a:lnTo>
+                  <a:lnTo>
+                    <a:pt x="0" y="3"/>
+                  </a:lnTo>
+                  <a:close/>
+                </a:path>
+              </a:pathLst>
+            </a:custGeom>
+            <a:solidFill>
+              <a:schemeClr val="accent1">
+                <a:lumMod val="75000"/>
+              </a:schemeClr>
+            </a:solidFill>
+            <a:ln>
+              <a:noFill/>
+            </a:ln>
+          </p:spPr>
+          <p:txBody>
+            <a:bodyPr/>
+            <a:lstStyle/>
+            <a:p>
+              <a:endParaRPr lang="en-AU"/>
+            </a:p>
+          </p:txBody>
+        </p:sp>
+        <p:sp>
+          <p:nvSpPr>
+            <p:cNvPr id="62" name="Freeform 11">
+              <a:extLst>
+                <a:ext uri="{FF2B5EF4-FFF2-40B4-BE49-F238E27FC236}">
+                  <a16:creationId xmlns:a16="http://schemas.microsoft.com/office/drawing/2014/main" id="{7690EB4B-9665-453E-A536-FA9DA06D1C9E}"/>
+                </a:ext>
+                <a:ext uri="{C183D7F6-B498-43B3-948B-1728B52AA6E4}">
+                  <adec:decorative xmlns:adec="http://schemas.microsoft.com/office/drawing/2017/decorative" val="1"/>
+                </a:ext>
+              </a:extLst>
+            </p:cNvPr>
+            <p:cNvSpPr/>
+            <p:nvPr>
+              <p:extLst>
+                <p:ext uri="{386F3935-93C4-4BCD-93E2-E3B085C9AB24}">
+                  <p16:designElem xmlns:p16="http://schemas.microsoft.com/office/powerpoint/2015/main" val="1"/>
+                </p:ext>
+              </p:extLst>
+            </p:nvPr>
+          </p:nvSpPr>
+          <p:spPr bwMode="auto">
+            <a:xfrm>
+              <a:off x="1320800" y="5238750"/>
+              <a:ext cx="1695450" cy="1619250"/>
+            </a:xfrm>
+            <a:custGeom>
+              <a:avLst/>
+              <a:gdLst/>
+              <a:ahLst/>
+              <a:cxnLst/>
+              <a:rect l="0" t="0" r="r" b="b"/>
+              <a:pathLst>
+                <a:path w="1068" h="1020">
+                  <a:moveTo>
+                    <a:pt x="1068" y="1020"/>
+                  </a:moveTo>
+                  <a:lnTo>
+                    <a:pt x="184" y="60"/>
+                  </a:lnTo>
+                  <a:lnTo>
+                    <a:pt x="154" y="27"/>
+                  </a:lnTo>
+                  <a:lnTo>
+                    <a:pt x="157" y="27"/>
+                  </a:lnTo>
+                  <a:lnTo>
+                    <a:pt x="157" y="24"/>
+                  </a:lnTo>
+                  <a:lnTo>
+                    <a:pt x="154" y="24"/>
+                  </a:lnTo>
+                  <a:lnTo>
+                    <a:pt x="0" y="0"/>
+                  </a:lnTo>
+                  <a:lnTo>
+                    <a:pt x="0" y="0"/>
+                  </a:lnTo>
+                  <a:lnTo>
+                    <a:pt x="774" y="1020"/>
+                  </a:lnTo>
+                  <a:lnTo>
+                    <a:pt x="1068" y="1020"/>
+                  </a:lnTo>
+                  <a:close/>
+                </a:path>
+              </a:pathLst>
+            </a:custGeom>
+            <a:solidFill>
+              <a:schemeClr val="tx1">
+                <a:lumMod val="75000"/>
+                <a:lumOff val="25000"/>
+              </a:schemeClr>
+            </a:solidFill>
+            <a:ln>
+              <a:noFill/>
+            </a:ln>
+          </p:spPr>
+          <p:txBody>
+            <a:bodyPr/>
+            <a:lstStyle/>
+            <a:p>
+              <a:endParaRPr lang="en-AU"/>
+            </a:p>
+          </p:txBody>
+        </p:sp>
+      </p:grpSp>
+      <p:grpSp>
+        <p:nvGrpSpPr>
+          <p:cNvPr id="63" name="Group 62">
+            <a:extLst>
+              <a:ext uri="{FF2B5EF4-FFF2-40B4-BE49-F238E27FC236}">
+                <a16:creationId xmlns:a16="http://schemas.microsoft.com/office/drawing/2014/main" id="{2DAE90E3-8F91-4218-8153-F632799FB076}"/>
+              </a:ext>
+              <a:ext uri="{C183D7F6-B498-43B3-948B-1728B52AA6E4}">
+                <adec:decorative xmlns:adec="http://schemas.microsoft.com/office/drawing/2017/decorative" val="1"/>
+              </a:ext>
+            </a:extLst>
+          </p:cNvPr>
+          <p:cNvGrpSpPr>
+            <a:grpSpLocks noGrp="1" noUngrp="1" noRot="1" noChangeAspect="1" noMove="1" noResize="1"/>
+          </p:cNvGrpSpPr>
+          <p:nvPr>
+            <p:extLst>
+              <p:ext uri="{386F3935-93C4-4BCD-93E2-E3B085C9AB24}">
+                <p16:designElem xmlns:p16="http://schemas.microsoft.com/office/powerpoint/2015/main" val="1"/>
+              </p:ext>
+            </p:extLst>
+          </p:nvPr>
+        </p:nvGrpSpPr>
+        <p:grpSpPr>
+          <a:xfrm>
+            <a:off x="150812" y="0"/>
+            <a:ext cx="2436813" cy="6858001"/>
+            <a:chOff x="1320800" y="0"/>
+            <a:chExt cx="2436813" cy="6858001"/>
+          </a:xfrm>
+        </p:grpSpPr>
+        <p:sp>
+          <p:nvSpPr>
+            <p:cNvPr id="64" name="Freeform 6">
+              <a:extLst>
+                <a:ext uri="{FF2B5EF4-FFF2-40B4-BE49-F238E27FC236}">
+                  <a16:creationId xmlns:a16="http://schemas.microsoft.com/office/drawing/2014/main" id="{C1DC6993-96FE-4235-985E-52489B4237A3}"/>
+                </a:ext>
+                <a:ext uri="{C183D7F6-B498-43B3-948B-1728B52AA6E4}">
+                  <adec:decorative xmlns:adec="http://schemas.microsoft.com/office/drawing/2017/decorative" val="1"/>
+                </a:ext>
+              </a:extLst>
+            </p:cNvPr>
+            <p:cNvSpPr/>
+            <p:nvPr>
+              <p:extLst>
+                <p:ext uri="{386F3935-93C4-4BCD-93E2-E3B085C9AB24}">
+                  <p16:designElem xmlns:p16="http://schemas.microsoft.com/office/powerpoint/2015/main" val="1"/>
+                </p:ext>
+              </p:extLst>
+            </p:nvPr>
+          </p:nvSpPr>
+          <p:spPr bwMode="auto">
+            <a:xfrm>
+              <a:off x="1627188" y="0"/>
+              <a:ext cx="1122363" cy="5329238"/>
+            </a:xfrm>
+            <a:custGeom>
+              <a:avLst/>
+              <a:gdLst/>
+              <a:ahLst/>
+              <a:cxnLst/>
+              <a:rect l="0" t="0" r="r" b="b"/>
+              <a:pathLst>
+                <a:path w="707" h="3357">
+                  <a:moveTo>
+                    <a:pt x="0" y="3330"/>
+                  </a:moveTo>
+                  <a:lnTo>
+                    <a:pt x="156" y="3357"/>
+                  </a:lnTo>
+                  <a:lnTo>
+                    <a:pt x="707" y="0"/>
+                  </a:lnTo>
+                  <a:lnTo>
+                    <a:pt x="547" y="0"/>
+                  </a:lnTo>
+                  <a:lnTo>
+                    <a:pt x="0" y="3330"/>
+                  </a:lnTo>
+                  <a:close/>
+                </a:path>
+              </a:pathLst>
+            </a:custGeom>
+            <a:solidFill>
+              <a:schemeClr val="accent1"/>
+            </a:solidFill>
+            <a:ln>
+              <a:noFill/>
+            </a:ln>
+          </p:spPr>
+          <p:txBody>
+            <a:bodyPr/>
+            <a:lstStyle/>
+            <a:p>
+              <a:endParaRPr lang="en-AU"/>
+            </a:p>
+          </p:txBody>
+        </p:sp>
+        <p:sp>
+          <p:nvSpPr>
+            <p:cNvPr id="65" name="Freeform 7">
+              <a:extLst>
+                <a:ext uri="{FF2B5EF4-FFF2-40B4-BE49-F238E27FC236}">
+                  <a16:creationId xmlns:a16="http://schemas.microsoft.com/office/drawing/2014/main" id="{76D3DE8D-3DEC-4FF8-B4FC-1DAB2036441A}"/>
+                </a:ext>
+                <a:ext uri="{C183D7F6-B498-43B3-948B-1728B52AA6E4}">
+                  <adec:decorative xmlns:adec="http://schemas.microsoft.com/office/drawing/2017/decorative" val="1"/>
+                </a:ext>
+              </a:extLst>
+            </p:cNvPr>
+            <p:cNvSpPr/>
+            <p:nvPr>
+              <p:extLst>
+                <p:ext uri="{386F3935-93C4-4BCD-93E2-E3B085C9AB24}">
+                  <p16:designElem xmlns:p16="http://schemas.microsoft.com/office/powerpoint/2015/main" val="1"/>
+                </p:ext>
+              </p:extLst>
+            </p:nvPr>
+          </p:nvSpPr>
+          <p:spPr bwMode="auto">
+            <a:xfrm>
+              <a:off x="1320800" y="0"/>
+              <a:ext cx="1117600" cy="5276850"/>
+            </a:xfrm>
+            <a:custGeom>
+              <a:avLst/>
+              <a:gdLst/>
+              <a:ahLst/>
+              <a:cxnLst/>
+              <a:rect l="0" t="0" r="r" b="b"/>
+              <a:pathLst>
+                <a:path w="704" h="3324">
+                  <a:moveTo>
+                    <a:pt x="704" y="0"/>
+                  </a:moveTo>
+                  <a:lnTo>
+                    <a:pt x="545" y="0"/>
+                  </a:lnTo>
+                  <a:lnTo>
+                    <a:pt x="0" y="3300"/>
+                  </a:lnTo>
+                  <a:lnTo>
+                    <a:pt x="157" y="3324"/>
+                  </a:lnTo>
+                  <a:lnTo>
+                    <a:pt x="704" y="0"/>
+                  </a:lnTo>
+                  <a:close/>
+                </a:path>
+              </a:pathLst>
+            </a:custGeom>
+            <a:solidFill>
+              <a:schemeClr val="tx1">
+                <a:lumMod val="65000"/>
+                <a:lumOff val="35000"/>
+              </a:schemeClr>
+            </a:solidFill>
+            <a:ln>
+              <a:noFill/>
+            </a:ln>
+          </p:spPr>
+          <p:txBody>
+            <a:bodyPr/>
+            <a:lstStyle/>
+            <a:p>
+              <a:endParaRPr lang="en-AU"/>
+            </a:p>
+          </p:txBody>
+        </p:sp>
+        <p:sp>
+          <p:nvSpPr>
+            <p:cNvPr id="66" name="Freeform 8">
+              <a:extLst>
+                <a:ext uri="{FF2B5EF4-FFF2-40B4-BE49-F238E27FC236}">
+                  <a16:creationId xmlns:a16="http://schemas.microsoft.com/office/drawing/2014/main" id="{679297AF-1418-41DB-A81A-D77E0CAF4956}"/>
+                </a:ext>
+                <a:ext uri="{C183D7F6-B498-43B3-948B-1728B52AA6E4}">
+                  <adec:decorative xmlns:adec="http://schemas.microsoft.com/office/drawing/2017/decorative" val="1"/>
+                </a:ext>
+              </a:extLst>
+            </p:cNvPr>
+            <p:cNvSpPr/>
+            <p:nvPr>
+              <p:extLst>
+                <p:ext uri="{386F3935-93C4-4BCD-93E2-E3B085C9AB24}">
+                  <p16:designElem xmlns:p16="http://schemas.microsoft.com/office/powerpoint/2015/main" val="1"/>
+                </p:ext>
+              </p:extLst>
+            </p:nvPr>
+          </p:nvSpPr>
+          <p:spPr bwMode="auto">
+            <a:xfrm>
+              <a:off x="1320800" y="5238750"/>
+              <a:ext cx="1228725" cy="1619250"/>
+            </a:xfrm>
+            <a:custGeom>
+              <a:avLst/>
+              <a:gdLst/>
+              <a:ahLst/>
+              <a:cxnLst/>
+              <a:rect l="0" t="0" r="r" b="b"/>
+              <a:pathLst>
+                <a:path w="774" h="1020">
+                  <a:moveTo>
+                    <a:pt x="0" y="0"/>
+                  </a:moveTo>
+                  <a:lnTo>
+                    <a:pt x="740" y="1020"/>
+                  </a:lnTo>
+                  <a:lnTo>
+                    <a:pt x="774" y="1020"/>
+                  </a:lnTo>
+                  <a:lnTo>
+                    <a:pt x="0" y="0"/>
+                  </a:lnTo>
+                  <a:close/>
+                </a:path>
+              </a:pathLst>
+            </a:custGeom>
+            <a:solidFill>
+              <a:schemeClr val="tx1">
+                <a:lumMod val="85000"/>
+                <a:lumOff val="15000"/>
+              </a:schemeClr>
+            </a:solidFill>
+            <a:ln>
+              <a:noFill/>
+            </a:ln>
+          </p:spPr>
+          <p:txBody>
+            <a:bodyPr/>
+            <a:lstStyle/>
+            <a:p>
+              <a:endParaRPr lang="en-AU"/>
+            </a:p>
+          </p:txBody>
+        </p:sp>
+        <p:sp>
+          <p:nvSpPr>
+            <p:cNvPr id="67" name="Freeform 9">
+              <a:extLst>
+                <a:ext uri="{FF2B5EF4-FFF2-40B4-BE49-F238E27FC236}">
+                  <a16:creationId xmlns:a16="http://schemas.microsoft.com/office/drawing/2014/main" id="{F6AD388B-2E71-431B-90AB-B2F71F9F9DDC}"/>
+                </a:ext>
+                <a:ext uri="{C183D7F6-B498-43B3-948B-1728B52AA6E4}">
+                  <adec:decorative xmlns:adec="http://schemas.microsoft.com/office/drawing/2017/decorative" val="1"/>
+                </a:ext>
+              </a:extLst>
+            </p:cNvPr>
+            <p:cNvSpPr/>
+            <p:nvPr>
+              <p:extLst>
+                <p:ext uri="{386F3935-93C4-4BCD-93E2-E3B085C9AB24}">
+                  <p16:designElem xmlns:p16="http://schemas.microsoft.com/office/powerpoint/2015/main" val="1"/>
+                </p:ext>
+              </p:extLst>
+            </p:nvPr>
+          </p:nvSpPr>
+          <p:spPr bwMode="auto">
+            <a:xfrm>
+              <a:off x="1627188" y="5291138"/>
+              <a:ext cx="1495425" cy="1566863"/>
+            </a:xfrm>
+            <a:custGeom>
+              <a:avLst/>
+              <a:gdLst/>
+              <a:ahLst/>
+              <a:cxnLst/>
+              <a:rect l="0" t="0" r="r" b="b"/>
+              <a:pathLst>
+                <a:path w="942" h="987">
+                  <a:moveTo>
+                    <a:pt x="0" y="0"/>
+                  </a:moveTo>
+                  <a:lnTo>
+                    <a:pt x="909" y="987"/>
+                  </a:lnTo>
+                  <a:lnTo>
+                    <a:pt x="942" y="987"/>
+                  </a:lnTo>
+                  <a:lnTo>
+                    <a:pt x="0" y="0"/>
+                  </a:lnTo>
+                  <a:close/>
+                </a:path>
+              </a:pathLst>
+            </a:custGeom>
+            <a:solidFill>
+              <a:schemeClr val="accent1">
+                <a:lumMod val="50000"/>
+              </a:schemeClr>
+            </a:solidFill>
+            <a:ln>
+              <a:noFill/>
+            </a:ln>
+          </p:spPr>
+          <p:txBody>
+            <a:bodyPr/>
+            <a:lstStyle/>
+            <a:p>
+              <a:endParaRPr lang="en-AU"/>
+            </a:p>
+          </p:txBody>
+        </p:sp>
+        <p:sp>
+          <p:nvSpPr>
+            <p:cNvPr id="68" name="Freeform 10">
+              <a:extLst>
+                <a:ext uri="{FF2B5EF4-FFF2-40B4-BE49-F238E27FC236}">
+                  <a16:creationId xmlns:a16="http://schemas.microsoft.com/office/drawing/2014/main" id="{FA9972D4-1E8B-4A06-BD7C-B5140A3895FC}"/>
+                </a:ext>
+                <a:ext uri="{C183D7F6-B498-43B3-948B-1728B52AA6E4}">
+                  <adec:decorative xmlns:adec="http://schemas.microsoft.com/office/drawing/2017/decorative" val="1"/>
+                </a:ext>
+              </a:extLst>
+            </p:cNvPr>
+            <p:cNvSpPr/>
+            <p:nvPr>
+              <p:extLst>
+                <p:ext uri="{386F3935-93C4-4BCD-93E2-E3B085C9AB24}">
+                  <p16:designElem xmlns:p16="http://schemas.microsoft.com/office/powerpoint/2015/main" val="1"/>
+                </p:ext>
+              </p:extLst>
+            </p:nvPr>
+          </p:nvSpPr>
+          <p:spPr bwMode="auto">
+            <a:xfrm>
+              <a:off x="1627188" y="5286375"/>
+              <a:ext cx="2130425" cy="1571625"/>
+            </a:xfrm>
+            <a:custGeom>
+              <a:avLst/>
+              <a:gdLst/>
+              <a:ahLst/>
+              <a:cxnLst/>
+              <a:rect l="0" t="0" r="r" b="b"/>
+              <a:pathLst>
+                <a:path w="1342" h="990">
+                  <a:moveTo>
+                    <a:pt x="0" y="3"/>
+                  </a:moveTo>
+                  <a:lnTo>
+                    <a:pt x="942" y="990"/>
+                  </a:lnTo>
+                  <a:lnTo>
+                    <a:pt x="1342" y="990"/>
+                  </a:lnTo>
+                  <a:lnTo>
+                    <a:pt x="156" y="27"/>
+                  </a:lnTo>
+                  <a:lnTo>
+                    <a:pt x="0" y="0"/>
+                  </a:lnTo>
+                  <a:lnTo>
+                    <a:pt x="0" y="3"/>
+                  </a:lnTo>
+                  <a:close/>
+                </a:path>
+              </a:pathLst>
+            </a:custGeom>
+            <a:solidFill>
+              <a:schemeClr val="accent1">
+                <a:lumMod val="75000"/>
+              </a:schemeClr>
+            </a:solidFill>
+            <a:ln>
+              <a:noFill/>
+            </a:ln>
+          </p:spPr>
+          <p:txBody>
+            <a:bodyPr/>
+            <a:lstStyle/>
+            <a:p>
+              <a:endParaRPr lang="en-AU"/>
+            </a:p>
+          </p:txBody>
+        </p:sp>
+        <p:sp>
+          <p:nvSpPr>
+            <p:cNvPr id="69" name="Freeform 11">
+              <a:extLst>
+                <a:ext uri="{FF2B5EF4-FFF2-40B4-BE49-F238E27FC236}">
+                  <a16:creationId xmlns:a16="http://schemas.microsoft.com/office/drawing/2014/main" id="{528281FC-5068-4A18-832D-B47A0F1AC6E6}"/>
+                </a:ext>
+                <a:ext uri="{C183D7F6-B498-43B3-948B-1728B52AA6E4}">
+                  <adec:decorative xmlns:adec="http://schemas.microsoft.com/office/drawing/2017/decorative" val="1"/>
+                </a:ext>
+              </a:extLst>
+            </p:cNvPr>
+            <p:cNvSpPr/>
+            <p:nvPr>
+              <p:extLst>
+                <p:ext uri="{386F3935-93C4-4BCD-93E2-E3B085C9AB24}">
+                  <p16:designElem xmlns:p16="http://schemas.microsoft.com/office/powerpoint/2015/main" val="1"/>
+                </p:ext>
+              </p:extLst>
+            </p:nvPr>
+          </p:nvSpPr>
+          <p:spPr bwMode="auto">
+            <a:xfrm>
+              <a:off x="1320800" y="5238750"/>
+              <a:ext cx="1695450" cy="1619250"/>
+            </a:xfrm>
+            <a:custGeom>
+              <a:avLst/>
+              <a:gdLst/>
+              <a:ahLst/>
+              <a:cxnLst/>
+              <a:rect l="0" t="0" r="r" b="b"/>
+              <a:pathLst>
+                <a:path w="1068" h="1020">
+                  <a:moveTo>
+                    <a:pt x="1068" y="1020"/>
+                  </a:moveTo>
+                  <a:lnTo>
+                    <a:pt x="184" y="60"/>
+                  </a:lnTo>
+                  <a:lnTo>
+                    <a:pt x="154" y="27"/>
+                  </a:lnTo>
+                  <a:lnTo>
+                    <a:pt x="157" y="27"/>
+                  </a:lnTo>
+                  <a:lnTo>
+                    <a:pt x="157" y="24"/>
+                  </a:lnTo>
+                  <a:lnTo>
+                    <a:pt x="154" y="24"/>
+                  </a:lnTo>
+                  <a:lnTo>
+                    <a:pt x="0" y="0"/>
+                  </a:lnTo>
+                  <a:lnTo>
+                    <a:pt x="0" y="0"/>
+                  </a:lnTo>
+                  <a:lnTo>
+                    <a:pt x="774" y="1020"/>
+                  </a:lnTo>
+                  <a:lnTo>
+                    <a:pt x="1068" y="1020"/>
+                  </a:lnTo>
+                  <a:close/>
+                </a:path>
+              </a:pathLst>
+            </a:custGeom>
+            <a:solidFill>
+              <a:schemeClr val="tx1">
+                <a:lumMod val="75000"/>
+                <a:lumOff val="25000"/>
+              </a:schemeClr>
+            </a:solidFill>
+            <a:ln>
+              <a:noFill/>
+            </a:ln>
+          </p:spPr>
+          <p:txBody>
+            <a:bodyPr/>
+            <a:lstStyle/>
+            <a:p>
+              <a:endParaRPr lang="en-AU"/>
+            </a:p>
+          </p:txBody>
+        </p:sp>
+      </p:grpSp>
+      <p:pic>
+        <p:nvPicPr>
+          <p:cNvPr id="56" name="Content Placeholder 55" descr="A graph of different colored lines&#10;&#10;Description automatically generated">
+            <a:extLst>
+              <a:ext uri="{FF2B5EF4-FFF2-40B4-BE49-F238E27FC236}">
+                <a16:creationId xmlns:a16="http://schemas.microsoft.com/office/drawing/2014/main" id="{C7943034-2999-A311-7058-0E403556444F}"/>
+              </a:ext>
+            </a:extLst>
+          </p:cNvPr>
+          <p:cNvPicPr>
+            <a:picLocks noGrp="1" noChangeAspect="1"/>
+          </p:cNvPicPr>
+          <p:nvPr>
+            <p:ph sz="half" idx="1"/>
+          </p:nvPr>
+        </p:nvPicPr>
+        <p:blipFill>
+          <a:blip r:embed="rId4">
+            <a:extLst>
+              <a:ext uri="{28A0092B-C50C-407E-A947-70E740481C1C}">
+                <a14:useLocalDpi xmlns:a14="http://schemas.microsoft.com/office/drawing/2010/main" val="0"/>
+              </a:ext>
+            </a:extLst>
+          </a:blip>
+          <a:stretch>
+            <a:fillRect/>
+          </a:stretch>
+        </p:blipFill>
+        <p:spPr>
+          <a:xfrm>
+            <a:off x="150812" y="106532"/>
+            <a:ext cx="11890376" cy="6622742"/>
+          </a:xfrm>
+        </p:spPr>
+      </p:pic>
+    </p:spTree>
+    <p:extLst>
+      <p:ext uri="{BB962C8B-B14F-4D97-AF65-F5344CB8AC3E}">
+        <p14:creationId xmlns:p14="http://schemas.microsoft.com/office/powerpoint/2010/main" val="1012854074"/>
+      </p:ext>
+    </p:extLst>
+  </p:cSld>
+  <p:clrMapOvr>
+    <a:masterClrMapping/>
+  </p:clrMapOvr>
+</p:sld>
+</file>
+
+<file path=ppt/slides/slide6.xml><?xml version="1.0" encoding="utf-8"?>
+<p:sld xmlns:a="http://schemas.openxmlformats.org/drawingml/2006/main" xmlns:r="http://schemas.openxmlformats.org/officeDocument/2006/relationships" xmlns:p="http://schemas.openxmlformats.org/presentationml/2006/main">
+  <p:cSld>
+    <p:spTree>
+      <p:nvGrpSpPr>
+        <p:cNvPr id="1" name=""/>
+        <p:cNvGrpSpPr/>
+        <p:nvPr/>
+      </p:nvGrpSpPr>
+      <p:grpSpPr>
+        <a:xfrm>
+          <a:off x="0" y="0"/>
+          <a:ext cx="0" cy="0"/>
+          <a:chOff x="0" y="0"/>
+          <a:chExt cx="0" cy="0"/>
+        </a:xfrm>
+      </p:grpSpPr>
+      <p:pic>
+        <p:nvPicPr>
+          <p:cNvPr id="7" name="Content Placeholder 12" descr="A graph of different colored lines&#10;&#10;Description automatically generated">
+            <a:extLst>
+              <a:ext uri="{FF2B5EF4-FFF2-40B4-BE49-F238E27FC236}">
+                <a16:creationId xmlns:a16="http://schemas.microsoft.com/office/drawing/2014/main" id="{6839652A-B239-F06C-B975-EE8824DA2B87}"/>
+              </a:ext>
+            </a:extLst>
+          </p:cNvPr>
+          <p:cNvPicPr>
+            <a:picLocks noChangeAspect="1"/>
+          </p:cNvPicPr>
+          <p:nvPr/>
+        </p:nvPicPr>
+        <p:blipFill>
+          <a:blip r:embed="rId2">
+            <a:extLst>
+              <a:ext uri="{28A0092B-C50C-407E-A947-70E740481C1C}">
+                <a14:useLocalDpi xmlns:a14="http://schemas.microsoft.com/office/drawing/2010/main" val="0"/>
+              </a:ext>
+            </a:extLst>
+          </a:blip>
+          <a:stretch>
+            <a:fillRect/>
+          </a:stretch>
+        </p:blipFill>
+        <p:spPr>
+          <a:xfrm>
+            <a:off x="65738" y="115410"/>
+            <a:ext cx="12060524" cy="6649373"/>
+          </a:xfrm>
+          <a:prstGeom prst="rect">
+            <a:avLst/>
+          </a:prstGeom>
+        </p:spPr>
+      </p:pic>
+    </p:spTree>
+    <p:extLst>
+      <p:ext uri="{BB962C8B-B14F-4D97-AF65-F5344CB8AC3E}">
+        <p14:creationId xmlns:p14="http://schemas.microsoft.com/office/powerpoint/2010/main" val="2399737576"/>
+      </p:ext>
+    </p:extLst>
+  </p:cSld>
+  <p:clrMapOvr>
+    <a:masterClrMapping/>
+  </p:clrMapOvr>
+  <p:timing>
+    <p:tnLst>
+      <p:par>
+        <p:cTn id="1" dur="indefinite" restart="never" nodeType="tmRoot">
+          <p:childTnLst>
+            <p:seq concurrent="1" nextAc="seek">
+              <p:cTn id="2" dur="indefinite" nodeType="mainSeq">
+                <p:childTnLst>
+                  <p:par>
+                    <p:cTn id="3" fill="hold">
+                      <p:stCondLst>
+                        <p:cond delay="indefinite"/>
+                      </p:stCondLst>
+                      <p:childTnLst>
+                        <p:par>
+                          <p:cTn id="4" fill="hold">
+                            <p:stCondLst>
+                              <p:cond delay="0"/>
+                            </p:stCondLst>
+                            <p:childTnLst>
+                              <p:par>
+                                <p:cTn id="5" presetID="1" presetClass="entr" presetSubtype="0" fill="hold" nodeType="clickEffect">
+                                  <p:stCondLst>
+                                    <p:cond delay="0"/>
+                                  </p:stCondLst>
+                                  <p:childTnLst>
+                                    <p:set>
+                                      <p:cBhvr>
+                                        <p:cTn id="6" dur="1" fill="hold">
+                                          <p:stCondLst>
+                                            <p:cond delay="0"/>
+                                          </p:stCondLst>
+                                        </p:cTn>
+                                        <p:tgtEl>
+                                          <p:spTgt spid="7"/>
+                                        </p:tgtEl>
+                                        <p:attrNameLst>
+                                          <p:attrName>style.visibility</p:attrName>
+                                        </p:attrNameLst>
+                                      </p:cBhvr>
+                                      <p:to>
+                                        <p:strVal val="visible"/>
+                                      </p:to>
+                                    </p:set>
+                                  </p:childTnLst>
+                                </p:cTn>
+                              </p:par>
+                            </p:childTnLst>
+                          </p:cTn>
+                        </p:par>
+                      </p:childTnLst>
+                    </p:cTn>
+                  </p:par>
+                </p:childTnLst>
+              </p:cTn>
+              <p:prevCondLst>
+                <p:cond evt="onPrev" delay="0">
+                  <p:tgtEl>
+                    <p:sldTgt/>
+                  </p:tgtEl>
+                </p:cond>
+              </p:prevCondLst>
+              <p:nextCondLst>
+                <p:cond evt="onNext" delay="0">
+                  <p:tgtEl>
+                    <p:sldTgt/>
+                  </p:tgtEl>
+                </p:cond>
+              </p:nextCondLst>
+            </p:seq>
+          </p:childTnLst>
+        </p:cTn>
+      </p:par>
+    </p:tnLst>
+  </p:timing>
+</p:sld>
+</file>
+
+<file path=ppt/slides/slide7.xml><?xml version="1.0" encoding="utf-8"?>
 <p:sld xmlns:a="http://schemas.openxmlformats.org/drawingml/2006/main" xmlns:r="http://schemas.openxmlformats.org/officeDocument/2006/relationships" xmlns:p="http://schemas.openxmlformats.org/presentationml/2006/main">
   <p:cSld>
     <p:spTree>
@@ -22171,7 +23420,7 @@
 </p:sld>
 </file>
 
-<file path=ppt/slides/slide6.xml><?xml version="1.0" encoding="utf-8"?>
+<file path=ppt/slides/slide8.xml><?xml version="1.0" encoding="utf-8"?>
 <p:sld xmlns:a="http://schemas.openxmlformats.org/drawingml/2006/main" xmlns:r="http://schemas.openxmlformats.org/officeDocument/2006/relationships" xmlns:p="http://schemas.openxmlformats.org/presentationml/2006/main">
   <p:cSld>
     <p:spTree>

</xml_diff>